<commit_message>
Added cloc report and updated presentation
</commit_message>
<xml_diff>
--- a/Documents/ASE420_ExpenseTracker.pptx
+++ b/Documents/ASE420_ExpenseTracker.pptx
@@ -109,14 +109,6 @@
     </a:lvl9pPr>
   </p:defaultTextStyle>
 </p:presentation>
-</file>
-
-<file path=ppt/revisionInfo.xml><?xml version="1.0" encoding="utf-8"?>
-<p1510:revInfo xmlns:a="http://schemas.openxmlformats.org/drawingml/2006/main" xmlns:r="http://schemas.openxmlformats.org/officeDocument/2006/relationships" xmlns:p1510="http://schemas.microsoft.com/office/powerpoint/2015/10/main">
-  <p1510:revLst>
-    <p1510:client id="{75FFD054-D144-43BB-A8BB-570E83C5D58E}" v="2" dt="2024-12-02T23:28:18.071"/>
-  </p1510:revLst>
-</p1510:revInfo>
 </file>
 
 <file path=ppt/slideLayouts/slideLayout1.xml><?xml version="1.0" encoding="utf-8"?>
@@ -4924,6 +4916,66 @@
           <a:xfrm>
             <a:off x="869599" y="2386584"/>
             <a:ext cx="4671664" cy="3678936"/>
+          </a:xfrm>
+          <a:prstGeom prst="rect">
+            <a:avLst/>
+          </a:prstGeom>
+        </p:spPr>
+      </p:pic>
+      <p:pic>
+        <p:nvPicPr>
+          <p:cNvPr id="11" name="Picture 10">
+            <a:extLst>
+              <a:ext uri="{FF2B5EF4-FFF2-40B4-BE49-F238E27FC236}">
+                <a16:creationId xmlns:a16="http://schemas.microsoft.com/office/drawing/2014/main" id="{5879C014-2A57-2CCB-1774-10823FE6DF76}"/>
+              </a:ext>
+            </a:extLst>
+          </p:cNvPr>
+          <p:cNvPicPr>
+            <a:picLocks noChangeAspect="1"/>
+          </p:cNvPicPr>
+          <p:nvPr/>
+        </p:nvPicPr>
+        <p:blipFill>
+          <a:blip r:embed="rId4"/>
+          <a:stretch>
+            <a:fillRect/>
+          </a:stretch>
+        </p:blipFill>
+        <p:spPr>
+          <a:xfrm>
+            <a:off x="869599" y="2386584"/>
+            <a:ext cx="4717838" cy="3678936"/>
+          </a:xfrm>
+          <a:prstGeom prst="rect">
+            <a:avLst/>
+          </a:prstGeom>
+        </p:spPr>
+      </p:pic>
+      <p:pic>
+        <p:nvPicPr>
+          <p:cNvPr id="15" name="Picture 14">
+            <a:extLst>
+              <a:ext uri="{FF2B5EF4-FFF2-40B4-BE49-F238E27FC236}">
+                <a16:creationId xmlns:a16="http://schemas.microsoft.com/office/drawing/2014/main" id="{B5BDF61E-1C12-6D89-CA82-7581189F21EC}"/>
+              </a:ext>
+            </a:extLst>
+          </p:cNvPr>
+          <p:cNvPicPr>
+            <a:picLocks noChangeAspect="1"/>
+          </p:cNvPicPr>
+          <p:nvPr/>
+        </p:nvPicPr>
+        <p:blipFill>
+          <a:blip r:embed="rId5"/>
+          <a:stretch>
+            <a:fillRect/>
+          </a:stretch>
+        </p:blipFill>
+        <p:spPr>
+          <a:xfrm>
+            <a:off x="6650739" y="2442236"/>
+            <a:ext cx="4570107" cy="3567632"/>
           </a:xfrm>
           <a:prstGeom prst="rect">
             <a:avLst/>

</xml_diff>

<commit_message>
Added updated presentation and activity diagram
</commit_message>
<xml_diff>
--- a/Documents/ASE420_ExpenseTracker.pptx
+++ b/Documents/ASE420_ExpenseTracker.pptx
@@ -7,9 +7,22 @@
   <p:sldIdLst>
     <p:sldId id="256" r:id="rId2"/>
     <p:sldId id="257" r:id="rId3"/>
-    <p:sldId id="258" r:id="rId4"/>
-    <p:sldId id="259" r:id="rId5"/>
-    <p:sldId id="260" r:id="rId6"/>
+    <p:sldId id="261" r:id="rId4"/>
+    <p:sldId id="274" r:id="rId5"/>
+    <p:sldId id="275" r:id="rId6"/>
+    <p:sldId id="262" r:id="rId7"/>
+    <p:sldId id="263" r:id="rId8"/>
+    <p:sldId id="264" r:id="rId9"/>
+    <p:sldId id="265" r:id="rId10"/>
+    <p:sldId id="276" r:id="rId11"/>
+    <p:sldId id="267" r:id="rId12"/>
+    <p:sldId id="268" r:id="rId13"/>
+    <p:sldId id="270" r:id="rId14"/>
+    <p:sldId id="271" r:id="rId15"/>
+    <p:sldId id="272" r:id="rId16"/>
+    <p:sldId id="259" r:id="rId17"/>
+    <p:sldId id="260" r:id="rId18"/>
+    <p:sldId id="273" r:id="rId19"/>
   </p:sldIdLst>
   <p:sldSz cx="12192000" cy="6858000"/>
   <p:notesSz cx="6858000" cy="9144000"/>
@@ -108,7 +121,21 @@
       </a:defRPr>
     </a:lvl9pPr>
   </p:defaultTextStyle>
+  <p:extLst>
+    <p:ext uri="{EFAFB233-063F-42B5-8137-9DF3F51BA10A}">
+      <p15:sldGuideLst xmlns:p15="http://schemas.microsoft.com/office/powerpoint/2012/main"/>
+    </p:ext>
+  </p:extLst>
 </p:presentation>
+</file>
+
+<file path=ppt/revisionInfo.xml><?xml version="1.0" encoding="utf-8"?>
+<p1510:revInfo xmlns:a="http://schemas.openxmlformats.org/drawingml/2006/main" xmlns:r="http://schemas.openxmlformats.org/officeDocument/2006/relationships" xmlns:p1510="http://schemas.microsoft.com/office/powerpoint/2015/10/main">
+  <p1510:revLst>
+    <p1510:client id="{75FFD054-D144-43BB-A8BB-570E83C5D58E}" v="1" dt="2024-12-09T18:07:13.093"/>
+    <p1510:client id="{88322671-3437-2C41-CA1B-9A8E0898BF65}" v="362" dt="2024-12-09T01:15:00.103"/>
+  </p1510:revLst>
+</p1510:revInfo>
 </file>
 
 <file path=ppt/slideLayouts/slideLayout1.xml><?xml version="1.0" encoding="utf-8"?>
@@ -258,7 +285,7 @@
           <a:p>
             <a:fld id="{EA725600-3085-4E54-9308-911E28008CFD}" type="datetimeFigureOut">
               <a:rPr lang="en-US" smtClean="0"/>
-              <a:t>12/1/2024</a:t>
+              <a:t>12/9/2024</a:t>
             </a:fld>
             <a:endParaRPr lang="en-US"/>
           </a:p>
@@ -456,7 +483,7 @@
           <a:p>
             <a:fld id="{EA725600-3085-4E54-9308-911E28008CFD}" type="datetimeFigureOut">
               <a:rPr lang="en-US" smtClean="0"/>
-              <a:t>12/1/2024</a:t>
+              <a:t>12/9/2024</a:t>
             </a:fld>
             <a:endParaRPr lang="en-US"/>
           </a:p>
@@ -664,7 +691,7 @@
           <a:p>
             <a:fld id="{EA725600-3085-4E54-9308-911E28008CFD}" type="datetimeFigureOut">
               <a:rPr lang="en-US" smtClean="0"/>
-              <a:t>12/1/2024</a:t>
+              <a:t>12/9/2024</a:t>
             </a:fld>
             <a:endParaRPr lang="en-US"/>
           </a:p>
@@ -862,7 +889,7 @@
           <a:p>
             <a:fld id="{EA725600-3085-4E54-9308-911E28008CFD}" type="datetimeFigureOut">
               <a:rPr lang="en-US" smtClean="0"/>
-              <a:t>12/1/2024</a:t>
+              <a:t>12/9/2024</a:t>
             </a:fld>
             <a:endParaRPr lang="en-US"/>
           </a:p>
@@ -1137,7 +1164,7 @@
           <a:p>
             <a:fld id="{EA725600-3085-4E54-9308-911E28008CFD}" type="datetimeFigureOut">
               <a:rPr lang="en-US" smtClean="0"/>
-              <a:t>12/1/2024</a:t>
+              <a:t>12/9/2024</a:t>
             </a:fld>
             <a:endParaRPr lang="en-US"/>
           </a:p>
@@ -1402,7 +1429,7 @@
           <a:p>
             <a:fld id="{EA725600-3085-4E54-9308-911E28008CFD}" type="datetimeFigureOut">
               <a:rPr lang="en-US" smtClean="0"/>
-              <a:t>12/1/2024</a:t>
+              <a:t>12/9/2024</a:t>
             </a:fld>
             <a:endParaRPr lang="en-US"/>
           </a:p>
@@ -1814,7 +1841,7 @@
           <a:p>
             <a:fld id="{EA725600-3085-4E54-9308-911E28008CFD}" type="datetimeFigureOut">
               <a:rPr lang="en-US" smtClean="0"/>
-              <a:t>12/1/2024</a:t>
+              <a:t>12/9/2024</a:t>
             </a:fld>
             <a:endParaRPr lang="en-US"/>
           </a:p>
@@ -1955,7 +1982,7 @@
           <a:p>
             <a:fld id="{EA725600-3085-4E54-9308-911E28008CFD}" type="datetimeFigureOut">
               <a:rPr lang="en-US" smtClean="0"/>
-              <a:t>12/1/2024</a:t>
+              <a:t>12/9/2024</a:t>
             </a:fld>
             <a:endParaRPr lang="en-US"/>
           </a:p>
@@ -2068,7 +2095,7 @@
           <a:p>
             <a:fld id="{EA725600-3085-4E54-9308-911E28008CFD}" type="datetimeFigureOut">
               <a:rPr lang="en-US" smtClean="0"/>
-              <a:t>12/1/2024</a:t>
+              <a:t>12/9/2024</a:t>
             </a:fld>
             <a:endParaRPr lang="en-US"/>
           </a:p>
@@ -2379,7 +2406,7 @@
           <a:p>
             <a:fld id="{EA725600-3085-4E54-9308-911E28008CFD}" type="datetimeFigureOut">
               <a:rPr lang="en-US" smtClean="0"/>
-              <a:t>12/1/2024</a:t>
+              <a:t>12/9/2024</a:t>
             </a:fld>
             <a:endParaRPr lang="en-US"/>
           </a:p>
@@ -2667,7 +2694,7 @@
           <a:p>
             <a:fld id="{EA725600-3085-4E54-9308-911E28008CFD}" type="datetimeFigureOut">
               <a:rPr lang="en-US" smtClean="0"/>
-              <a:t>12/1/2024</a:t>
+              <a:t>12/9/2024</a:t>
             </a:fld>
             <a:endParaRPr lang="en-US"/>
           </a:p>
@@ -2908,7 +2935,7 @@
           <a:p>
             <a:fld id="{EA725600-3085-4E54-9308-911E28008CFD}" type="datetimeFigureOut">
               <a:rPr lang="en-US" smtClean="0"/>
-              <a:t>12/1/2024</a:t>
+              <a:t>12/9/2024</a:t>
             </a:fld>
             <a:endParaRPr lang="en-US"/>
           </a:p>
@@ -3394,7 +3421,7 @@
 </p:sld>
 </file>
 
-<file path=ppt/slides/slide2.xml><?xml version="1.0" encoding="utf-8"?>
+<file path=ppt/slides/slide10.xml><?xml version="1.0" encoding="utf-8"?>
 <p:sld xmlns:a="http://schemas.openxmlformats.org/drawingml/2006/main" xmlns:r="http://schemas.openxmlformats.org/officeDocument/2006/relationships" xmlns:p="http://schemas.openxmlformats.org/presentationml/2006/main">
   <p:cSld>
     <p:spTree>
@@ -3416,7 +3443,7 @@
           <p:cNvPr id="2" name="Title 1">
             <a:extLst>
               <a:ext uri="{FF2B5EF4-FFF2-40B4-BE49-F238E27FC236}">
-                <a16:creationId xmlns:a16="http://schemas.microsoft.com/office/drawing/2014/main" id="{B194EC0F-F300-BDFB-4FBB-D5A9E613D596}"/>
+                <a16:creationId xmlns:a16="http://schemas.microsoft.com/office/drawing/2014/main" id="{26C866F0-65D5-58E4-71E3-312A2E493E90}"/>
               </a:ext>
             </a:extLst>
           </p:cNvPr>
@@ -3434,50 +3461,51 @@
           <a:p>
             <a:r>
               <a:rPr lang="en-US" dirty="0"/>
-              <a:t>Project overview</a:t>
-            </a:r>
-          </a:p>
-        </p:txBody>
-      </p:sp>
-      <p:sp>
-        <p:nvSpPr>
-          <p:cNvPr id="3" name="Content Placeholder 2">
-            <a:extLst>
-              <a:ext uri="{FF2B5EF4-FFF2-40B4-BE49-F238E27FC236}">
-                <a16:creationId xmlns:a16="http://schemas.microsoft.com/office/drawing/2014/main" id="{2FA590CA-D6A3-57EA-96F3-701D293078BF}"/>
-              </a:ext>
-            </a:extLst>
-          </p:cNvPr>
-          <p:cNvSpPr>
-            <a:spLocks noGrp="1"/>
-          </p:cNvSpPr>
-          <p:nvPr>
-            <p:ph idx="1"/>
-          </p:nvPr>
-        </p:nvSpPr>
-        <p:spPr/>
-        <p:txBody>
-          <a:bodyPr/>
-          <a:lstStyle/>
-          <a:p>
-            <a:pPr marL="0" indent="0">
-              <a:buNone/>
-            </a:pPr>
-            <a:r>
-              <a:rPr lang="en-US" b="0" i="0" dirty="0">
-                <a:effectLst/>
-                <a:latin typeface="Arial" panose="020B0604020202020204" pitchFamily="34" charset="0"/>
-              </a:rPr>
-              <a:t>The Expense Tracker program is a desktop application designed to help you manage your personal finances by tracking expenses and savings. It provides an intuitive interface to add entries, view financial summaries, and analyze your data.</a:t>
-            </a:r>
-            <a:endParaRPr lang="en-US" dirty="0"/>
-          </a:p>
-        </p:txBody>
-      </p:sp>
+              <a:t>Savings Sequence Diagram</a:t>
+            </a:r>
+          </a:p>
+        </p:txBody>
+      </p:sp>
+      <p:pic>
+        <p:nvPicPr>
+          <p:cNvPr id="5" name="Picture 4" descr="A screenshot of a diagram&#10;&#10;Description automatically generated">
+            <a:extLst>
+              <a:ext uri="{FF2B5EF4-FFF2-40B4-BE49-F238E27FC236}">
+                <a16:creationId xmlns:a16="http://schemas.microsoft.com/office/drawing/2014/main" id="{6394505B-66D0-E201-01A9-B2C15D959404}"/>
+              </a:ext>
+            </a:extLst>
+          </p:cNvPr>
+          <p:cNvPicPr>
+            <a:picLocks noChangeAspect="1"/>
+          </p:cNvPicPr>
+          <p:nvPr/>
+        </p:nvPicPr>
+        <p:blipFill>
+          <a:blip r:embed="rId2">
+            <a:extLst>
+              <a:ext uri="{28A0092B-C50C-407E-A947-70E740481C1C}">
+                <a14:useLocalDpi xmlns:a14="http://schemas.microsoft.com/office/drawing/2010/main" val="0"/>
+              </a:ext>
+            </a:extLst>
+          </a:blip>
+          <a:stretch>
+            <a:fillRect/>
+          </a:stretch>
+        </p:blipFill>
+        <p:spPr>
+          <a:xfrm>
+            <a:off x="3494295" y="1423289"/>
+            <a:ext cx="5203410" cy="5069586"/>
+          </a:xfrm>
+          <a:prstGeom prst="rect">
+            <a:avLst/>
+          </a:prstGeom>
+        </p:spPr>
+      </p:pic>
     </p:spTree>
     <p:extLst>
       <p:ext uri="{BB962C8B-B14F-4D97-AF65-F5344CB8AC3E}">
-        <p14:creationId xmlns:p14="http://schemas.microsoft.com/office/powerpoint/2010/main" val="1491381442"/>
+        <p14:creationId xmlns:p14="http://schemas.microsoft.com/office/powerpoint/2010/main" val="3672462671"/>
       </p:ext>
     </p:extLst>
   </p:cSld>
@@ -3487,7 +3515,2179 @@
 </p:sld>
 </file>
 
-<file path=ppt/slides/slide3.xml><?xml version="1.0" encoding="utf-8"?>
+<file path=ppt/slides/slide11.xml><?xml version="1.0" encoding="utf-8"?>
+<p:sld xmlns:a="http://schemas.openxmlformats.org/drawingml/2006/main" xmlns:r="http://schemas.openxmlformats.org/officeDocument/2006/relationships" xmlns:p="http://schemas.openxmlformats.org/presentationml/2006/main">
+  <p:cSld>
+    <p:spTree>
+      <p:nvGrpSpPr>
+        <p:cNvPr id="1" name=""/>
+        <p:cNvGrpSpPr/>
+        <p:nvPr/>
+      </p:nvGrpSpPr>
+      <p:grpSpPr>
+        <a:xfrm>
+          <a:off x="0" y="0"/>
+          <a:ext cx="0" cy="0"/>
+          <a:chOff x="0" y="0"/>
+          <a:chExt cx="0" cy="0"/>
+        </a:xfrm>
+      </p:grpSpPr>
+      <p:sp>
+        <p:nvSpPr>
+          <p:cNvPr id="2" name="Title 1">
+            <a:extLst>
+              <a:ext uri="{FF2B5EF4-FFF2-40B4-BE49-F238E27FC236}">
+                <a16:creationId xmlns:a16="http://schemas.microsoft.com/office/drawing/2014/main" id="{709129F6-DD55-000E-DD62-CF311E8CEB40}"/>
+              </a:ext>
+            </a:extLst>
+          </p:cNvPr>
+          <p:cNvSpPr>
+            <a:spLocks noGrp="1"/>
+          </p:cNvSpPr>
+          <p:nvPr>
+            <p:ph type="title"/>
+          </p:nvPr>
+        </p:nvSpPr>
+        <p:spPr>
+          <a:xfrm>
+            <a:off x="838200" y="180068"/>
+            <a:ext cx="10515600" cy="1325563"/>
+          </a:xfrm>
+        </p:spPr>
+        <p:txBody>
+          <a:bodyPr>
+            <a:normAutofit/>
+          </a:bodyPr>
+          <a:lstStyle/>
+          <a:p>
+            <a:r>
+              <a:rPr lang="en-US" sz="3600" dirty="0"/>
+              <a:t>Activity Diagram</a:t>
+            </a:r>
+          </a:p>
+        </p:txBody>
+      </p:sp>
+      <p:pic>
+        <p:nvPicPr>
+          <p:cNvPr id="5" name="Content Placeholder 4" descr="A diagram of a company&#10;&#10;Description automatically generated">
+            <a:extLst>
+              <a:ext uri="{FF2B5EF4-FFF2-40B4-BE49-F238E27FC236}">
+                <a16:creationId xmlns:a16="http://schemas.microsoft.com/office/drawing/2014/main" id="{131080E3-FD53-CABB-6B30-9BB90A096EC3}"/>
+              </a:ext>
+            </a:extLst>
+          </p:cNvPr>
+          <p:cNvPicPr>
+            <a:picLocks noGrp="1" noChangeAspect="1"/>
+          </p:cNvPicPr>
+          <p:nvPr>
+            <p:ph idx="1"/>
+          </p:nvPr>
+        </p:nvPicPr>
+        <p:blipFill>
+          <a:blip r:embed="rId2">
+            <a:extLst>
+              <a:ext uri="{28A0092B-C50C-407E-A947-70E740481C1C}">
+                <a14:useLocalDpi xmlns:a14="http://schemas.microsoft.com/office/drawing/2010/main" val="0"/>
+              </a:ext>
+            </a:extLst>
+          </a:blip>
+          <a:stretch>
+            <a:fillRect/>
+          </a:stretch>
+        </p:blipFill>
+        <p:spPr>
+          <a:xfrm>
+            <a:off x="1135300" y="1077911"/>
+            <a:ext cx="9706222" cy="5600021"/>
+          </a:xfrm>
+        </p:spPr>
+      </p:pic>
+    </p:spTree>
+    <p:extLst>
+      <p:ext uri="{BB962C8B-B14F-4D97-AF65-F5344CB8AC3E}">
+        <p14:creationId xmlns:p14="http://schemas.microsoft.com/office/powerpoint/2010/main" val="2169554789"/>
+      </p:ext>
+    </p:extLst>
+  </p:cSld>
+  <p:clrMapOvr>
+    <a:masterClrMapping/>
+  </p:clrMapOvr>
+</p:sld>
+</file>
+
+<file path=ppt/slides/slide12.xml><?xml version="1.0" encoding="utf-8"?>
+<p:sld xmlns:a="http://schemas.openxmlformats.org/drawingml/2006/main" xmlns:r="http://schemas.openxmlformats.org/officeDocument/2006/relationships" xmlns:p="http://schemas.openxmlformats.org/presentationml/2006/main">
+  <p:cSld>
+    <p:spTree>
+      <p:nvGrpSpPr>
+        <p:cNvPr id="1" name=""/>
+        <p:cNvGrpSpPr/>
+        <p:nvPr/>
+      </p:nvGrpSpPr>
+      <p:grpSpPr>
+        <a:xfrm>
+          <a:off x="0" y="0"/>
+          <a:ext cx="0" cy="0"/>
+          <a:chOff x="0" y="0"/>
+          <a:chExt cx="0" cy="0"/>
+        </a:xfrm>
+      </p:grpSpPr>
+      <p:sp>
+        <p:nvSpPr>
+          <p:cNvPr id="2" name="Title 1">
+            <a:extLst>
+              <a:ext uri="{FF2B5EF4-FFF2-40B4-BE49-F238E27FC236}">
+                <a16:creationId xmlns:a16="http://schemas.microsoft.com/office/drawing/2014/main" id="{C815BD4E-5228-6D03-214F-AB1609A9F7E8}"/>
+              </a:ext>
+            </a:extLst>
+          </p:cNvPr>
+          <p:cNvSpPr>
+            <a:spLocks noGrp="1"/>
+          </p:cNvSpPr>
+          <p:nvPr>
+            <p:ph type="title"/>
+          </p:nvPr>
+        </p:nvSpPr>
+        <p:spPr/>
+        <p:txBody>
+          <a:bodyPr>
+            <a:normAutofit/>
+          </a:bodyPr>
+          <a:lstStyle/>
+          <a:p>
+            <a:r>
+              <a:rPr lang="en-US" sz="3200" dirty="0"/>
+              <a:t>Code Smells</a:t>
+            </a:r>
+          </a:p>
+        </p:txBody>
+      </p:sp>
+      <p:sp>
+        <p:nvSpPr>
+          <p:cNvPr id="3" name="Content Placeholder 2">
+            <a:extLst>
+              <a:ext uri="{FF2B5EF4-FFF2-40B4-BE49-F238E27FC236}">
+                <a16:creationId xmlns:a16="http://schemas.microsoft.com/office/drawing/2014/main" id="{DDBE7191-D832-91AC-9ECE-8A53DDAC493B}"/>
+              </a:ext>
+            </a:extLst>
+          </p:cNvPr>
+          <p:cNvSpPr>
+            <a:spLocks noGrp="1"/>
+          </p:cNvSpPr>
+          <p:nvPr>
+            <p:ph idx="1"/>
+          </p:nvPr>
+        </p:nvSpPr>
+        <p:spPr>
+          <a:xfrm>
+            <a:off x="838200" y="1435554"/>
+            <a:ext cx="10515600" cy="4351338"/>
+          </a:xfrm>
+        </p:spPr>
+        <p:txBody>
+          <a:bodyPr vert="horz" lIns="91440" tIns="45720" rIns="91440" bIns="45720" rtlCol="0" anchor="t">
+            <a:noAutofit/>
+          </a:bodyPr>
+          <a:lstStyle/>
+          <a:p>
+            <a:pPr>
+              <a:buNone/>
+            </a:pPr>
+            <a:r>
+              <a:rPr lang="en-US" sz="1400" dirty="0">
+                <a:ea typeface="+mn-lt"/>
+                <a:cs typeface="+mn-lt"/>
+              </a:rPr>
+              <a:t>1. </a:t>
+            </a:r>
+            <a:r>
+              <a:rPr lang="en-US" sz="1400" b="1" dirty="0">
+                <a:ea typeface="+mn-lt"/>
+                <a:cs typeface="+mn-lt"/>
+              </a:rPr>
+              <a:t>Duplicated Logic for UI Updates - Found 11/27/24</a:t>
+            </a:r>
+            <a:endParaRPr lang="en-US" sz="1400" b="1" dirty="0"/>
+          </a:p>
+          <a:p>
+            <a:pPr>
+              <a:buNone/>
+            </a:pPr>
+            <a:r>
+              <a:rPr lang="en-US" sz="1400" dirty="0">
+                <a:ea typeface="+mn-lt"/>
+                <a:cs typeface="+mn-lt"/>
+              </a:rPr>
+              <a:t>   - Smell: There was redundant code for updating the UI in multiple places.</a:t>
+            </a:r>
+            <a:endParaRPr lang="en-US" sz="1400" dirty="0"/>
+          </a:p>
+          <a:p>
+            <a:pPr>
+              <a:buNone/>
+            </a:pPr>
+            <a:r>
+              <a:rPr lang="en-US" sz="1400" dirty="0">
+                <a:ea typeface="+mn-lt"/>
+                <a:cs typeface="+mn-lt"/>
+              </a:rPr>
+              <a:t>   - Fix: Used more of a strategy pattern by encapsulating more code into certain blocks. Making flow easier to understand.</a:t>
+            </a:r>
+            <a:endParaRPr lang="en-US" sz="1400" dirty="0"/>
+          </a:p>
+          <a:p>
+            <a:pPr>
+              <a:buNone/>
+            </a:pPr>
+            <a:r>
+              <a:rPr lang="en-US" sz="1400" dirty="0">
+                <a:ea typeface="+mn-lt"/>
+                <a:cs typeface="+mn-lt"/>
+              </a:rPr>
+              <a:t>2. </a:t>
+            </a:r>
+            <a:r>
+              <a:rPr lang="en-US" sz="1400" b="1" dirty="0">
+                <a:ea typeface="+mn-lt"/>
+                <a:cs typeface="+mn-lt"/>
+              </a:rPr>
+              <a:t>Large Method: `</a:t>
+            </a:r>
+            <a:r>
+              <a:rPr lang="en-US" sz="1400" b="1" dirty="0" err="1">
+                <a:ea typeface="+mn-lt"/>
+                <a:cs typeface="+mn-lt"/>
+              </a:rPr>
+              <a:t>showAddExpenseDialog</a:t>
+            </a:r>
+            <a:r>
+              <a:rPr lang="en-US" sz="1400" b="1" dirty="0">
+                <a:ea typeface="+mn-lt"/>
+                <a:cs typeface="+mn-lt"/>
+              </a:rPr>
+              <a:t>` and `</a:t>
+            </a:r>
+            <a:r>
+              <a:rPr lang="en-US" sz="1400" b="1" dirty="0" err="1">
+                <a:ea typeface="+mn-lt"/>
+                <a:cs typeface="+mn-lt"/>
+              </a:rPr>
+              <a:t>showAddSavingsDialog</a:t>
+            </a:r>
+            <a:r>
+              <a:rPr lang="en-US" sz="1400" b="1" dirty="0">
+                <a:ea typeface="+mn-lt"/>
+                <a:cs typeface="+mn-lt"/>
+              </a:rPr>
+              <a:t>` - Found 11/28/24</a:t>
+            </a:r>
+            <a:endParaRPr lang="en-US" sz="1400" b="1" dirty="0"/>
+          </a:p>
+          <a:p>
+            <a:pPr>
+              <a:buNone/>
+            </a:pPr>
+            <a:r>
+              <a:rPr lang="en-US" sz="1400" dirty="0">
+                <a:ea typeface="+mn-lt"/>
+                <a:cs typeface="+mn-lt"/>
+              </a:rPr>
+              <a:t>   - Smell: Both the `</a:t>
+            </a:r>
+            <a:r>
+              <a:rPr lang="en-US" sz="1400" dirty="0" err="1">
+                <a:ea typeface="+mn-lt"/>
+                <a:cs typeface="+mn-lt"/>
+              </a:rPr>
+              <a:t>showAddExpenseDialog</a:t>
+            </a:r>
+            <a:r>
+              <a:rPr lang="en-US" sz="1400" dirty="0">
+                <a:ea typeface="+mn-lt"/>
+                <a:cs typeface="+mn-lt"/>
+              </a:rPr>
+              <a:t>` and `</a:t>
+            </a:r>
+            <a:r>
+              <a:rPr lang="en-US" sz="1400" dirty="0" err="1">
+                <a:ea typeface="+mn-lt"/>
+                <a:cs typeface="+mn-lt"/>
+              </a:rPr>
+              <a:t>showAddSavingsDialog</a:t>
+            </a:r>
+            <a:r>
+              <a:rPr lang="en-US" sz="1400" dirty="0">
+                <a:ea typeface="+mn-lt"/>
+                <a:cs typeface="+mn-lt"/>
+              </a:rPr>
+              <a:t>` methods are large, wanted to condense these to fit more in line.</a:t>
+            </a:r>
+            <a:endParaRPr lang="en-US" sz="1400" dirty="0"/>
+          </a:p>
+          <a:p>
+            <a:pPr>
+              <a:buNone/>
+            </a:pPr>
+            <a:r>
+              <a:rPr lang="en-US" sz="1400" dirty="0">
+                <a:ea typeface="+mn-lt"/>
+                <a:cs typeface="+mn-lt"/>
+              </a:rPr>
+              <a:t>   - Fix: used more of a template pattern to help with overall formatting </a:t>
+            </a:r>
+            <a:r>
+              <a:rPr lang="en-US" sz="1400" dirty="0" err="1">
+                <a:ea typeface="+mn-lt"/>
+                <a:cs typeface="+mn-lt"/>
+              </a:rPr>
+              <a:t>stucture</a:t>
+            </a:r>
+            <a:r>
+              <a:rPr lang="en-US" sz="1400" dirty="0">
+                <a:ea typeface="+mn-lt"/>
+                <a:cs typeface="+mn-lt"/>
+              </a:rPr>
+              <a:t>.</a:t>
+            </a:r>
+          </a:p>
+          <a:p>
+            <a:pPr>
+              <a:buNone/>
+            </a:pPr>
+            <a:r>
+              <a:rPr lang="en-US" sz="1400" dirty="0">
+                <a:ea typeface="+mn-lt"/>
+                <a:cs typeface="+mn-lt"/>
+              </a:rPr>
+              <a:t>3</a:t>
+            </a:r>
+            <a:r>
+              <a:rPr lang="en-US" sz="1400" b="1" dirty="0">
+                <a:ea typeface="+mn-lt"/>
+                <a:cs typeface="+mn-lt"/>
+              </a:rPr>
+              <a:t>. Hardcoded Colors in Dark Mode Logic - Found 11/30/24</a:t>
+            </a:r>
+            <a:endParaRPr lang="en-US" sz="1400" b="1" dirty="0"/>
+          </a:p>
+          <a:p>
+            <a:pPr>
+              <a:buNone/>
+            </a:pPr>
+            <a:r>
+              <a:rPr lang="en-US" sz="1400" dirty="0">
+                <a:ea typeface="+mn-lt"/>
+                <a:cs typeface="+mn-lt"/>
+              </a:rPr>
+              <a:t>   - Smell: The dark mode color scheme is hardcoded within the methods, which reduces flexibility and makes it harder to change the theme in the future.</a:t>
+            </a:r>
+            <a:endParaRPr lang="en-US" sz="1400" dirty="0"/>
+          </a:p>
+          <a:p>
+            <a:pPr>
+              <a:buNone/>
+            </a:pPr>
+            <a:r>
+              <a:rPr lang="en-US" sz="1400" dirty="0">
+                <a:ea typeface="+mn-lt"/>
+                <a:cs typeface="+mn-lt"/>
+              </a:rPr>
+              <a:t>   - Fix: Used Factory pattern to reduce the repetitiveness.</a:t>
+            </a:r>
+            <a:endParaRPr lang="en-US" sz="1400" dirty="0"/>
+          </a:p>
+          <a:p>
+            <a:pPr>
+              <a:buNone/>
+            </a:pPr>
+            <a:r>
+              <a:rPr lang="en-US" sz="1400" dirty="0">
+                <a:ea typeface="+mn-lt"/>
+                <a:cs typeface="+mn-lt"/>
+              </a:rPr>
+              <a:t>4. </a:t>
+            </a:r>
+            <a:r>
+              <a:rPr lang="en-US" sz="1400" b="1" dirty="0">
+                <a:ea typeface="+mn-lt"/>
+                <a:cs typeface="+mn-lt"/>
+              </a:rPr>
+              <a:t>Confusing Type Meanings and Constrained Code – Throughout Project </a:t>
+            </a:r>
+            <a:endParaRPr lang="en-US" sz="1400" b="1" dirty="0"/>
+          </a:p>
+          <a:p>
+            <a:pPr>
+              <a:buNone/>
+            </a:pPr>
+            <a:r>
+              <a:rPr lang="en-US" sz="1400" dirty="0">
+                <a:ea typeface="+mn-lt"/>
+                <a:cs typeface="+mn-lt"/>
+              </a:rPr>
+              <a:t>   - Smell: The application logic for expenses and savings is tightly coupled to the UI components like `</a:t>
+            </a:r>
+            <a:r>
+              <a:rPr lang="en-US" sz="1400" dirty="0" err="1">
+                <a:ea typeface="+mn-lt"/>
+                <a:cs typeface="+mn-lt"/>
+              </a:rPr>
+              <a:t>JLabel</a:t>
+            </a:r>
+            <a:r>
+              <a:rPr lang="en-US" sz="1400" dirty="0">
+                <a:ea typeface="+mn-lt"/>
+                <a:cs typeface="+mn-lt"/>
+              </a:rPr>
+              <a:t>` and `</a:t>
+            </a:r>
+            <a:r>
+              <a:rPr lang="en-US" sz="1400" dirty="0" err="1">
+                <a:ea typeface="+mn-lt"/>
+                <a:cs typeface="+mn-lt"/>
+              </a:rPr>
+              <a:t>JButton</a:t>
+            </a:r>
+            <a:r>
+              <a:rPr lang="en-US" sz="1400" dirty="0">
+                <a:ea typeface="+mn-lt"/>
+                <a:cs typeface="+mn-lt"/>
+              </a:rPr>
+              <a:t>`.</a:t>
+            </a:r>
+            <a:endParaRPr lang="en-US" sz="1400" dirty="0"/>
+          </a:p>
+          <a:p>
+            <a:pPr>
+              <a:buNone/>
+            </a:pPr>
+            <a:r>
+              <a:rPr lang="en-US" sz="1400" dirty="0">
+                <a:ea typeface="+mn-lt"/>
+                <a:cs typeface="+mn-lt"/>
+              </a:rPr>
+              <a:t>   - Fix: Moved Private methods in place to reduce tightness and constrains</a:t>
+            </a:r>
+            <a:r>
+              <a:rPr lang="en-US" sz="1400" dirty="0"/>
+              <a:t> </a:t>
+            </a:r>
+            <a:r>
+              <a:rPr lang="en-US" sz="1400" dirty="0">
+                <a:ea typeface="+mn-lt"/>
+                <a:cs typeface="+mn-lt"/>
+              </a:rPr>
+              <a:t>on code.</a:t>
+            </a:r>
+            <a:endParaRPr lang="en-US" sz="1400" dirty="0"/>
+          </a:p>
+          <a:p>
+            <a:pPr>
+              <a:buNone/>
+            </a:pPr>
+            <a:endParaRPr lang="en-US" sz="1200" dirty="0"/>
+          </a:p>
+          <a:p>
+            <a:pPr>
+              <a:buNone/>
+            </a:pPr>
+            <a:endParaRPr lang="en-US" sz="1200" dirty="0"/>
+          </a:p>
+        </p:txBody>
+      </p:sp>
+    </p:spTree>
+    <p:extLst>
+      <p:ext uri="{BB962C8B-B14F-4D97-AF65-F5344CB8AC3E}">
+        <p14:creationId xmlns:p14="http://schemas.microsoft.com/office/powerpoint/2010/main" val="539192657"/>
+      </p:ext>
+    </p:extLst>
+  </p:cSld>
+  <p:clrMapOvr>
+    <a:masterClrMapping/>
+  </p:clrMapOvr>
+</p:sld>
+</file>
+
+<file path=ppt/slides/slide13.xml><?xml version="1.0" encoding="utf-8"?>
+<p:sld xmlns:a="http://schemas.openxmlformats.org/drawingml/2006/main" xmlns:r="http://schemas.openxmlformats.org/officeDocument/2006/relationships" xmlns:p="http://schemas.openxmlformats.org/presentationml/2006/main">
+  <p:cSld>
+    <p:spTree>
+      <p:nvGrpSpPr>
+        <p:cNvPr id="1" name=""/>
+        <p:cNvGrpSpPr/>
+        <p:nvPr/>
+      </p:nvGrpSpPr>
+      <p:grpSpPr>
+        <a:xfrm>
+          <a:off x="0" y="0"/>
+          <a:ext cx="0" cy="0"/>
+          <a:chOff x="0" y="0"/>
+          <a:chExt cx="0" cy="0"/>
+        </a:xfrm>
+      </p:grpSpPr>
+      <p:sp>
+        <p:nvSpPr>
+          <p:cNvPr id="2" name="Title 1">
+            <a:extLst>
+              <a:ext uri="{FF2B5EF4-FFF2-40B4-BE49-F238E27FC236}">
+                <a16:creationId xmlns:a16="http://schemas.microsoft.com/office/drawing/2014/main" id="{88FD8736-75C0-E349-30D7-B7E4C5C67B3E}"/>
+              </a:ext>
+            </a:extLst>
+          </p:cNvPr>
+          <p:cNvSpPr>
+            <a:spLocks noGrp="1"/>
+          </p:cNvSpPr>
+          <p:nvPr>
+            <p:ph type="title"/>
+          </p:nvPr>
+        </p:nvSpPr>
+        <p:spPr>
+          <a:xfrm>
+            <a:off x="838200" y="365125"/>
+            <a:ext cx="10515600" cy="627064"/>
+          </a:xfrm>
+        </p:spPr>
+        <p:txBody>
+          <a:bodyPr>
+            <a:normAutofit/>
+          </a:bodyPr>
+          <a:lstStyle/>
+          <a:p>
+            <a:r>
+              <a:rPr lang="en-US" sz="3200" dirty="0"/>
+              <a:t>Refactoring (Version 2)</a:t>
+            </a:r>
+          </a:p>
+        </p:txBody>
+      </p:sp>
+      <p:sp>
+        <p:nvSpPr>
+          <p:cNvPr id="3" name="Content Placeholder 2">
+            <a:extLst>
+              <a:ext uri="{FF2B5EF4-FFF2-40B4-BE49-F238E27FC236}">
+                <a16:creationId xmlns:a16="http://schemas.microsoft.com/office/drawing/2014/main" id="{0C396130-DE9A-48A2-F2BF-2CEFE3822837}"/>
+              </a:ext>
+            </a:extLst>
+          </p:cNvPr>
+          <p:cNvSpPr>
+            <a:spLocks noGrp="1"/>
+          </p:cNvSpPr>
+          <p:nvPr>
+            <p:ph idx="1"/>
+          </p:nvPr>
+        </p:nvSpPr>
+        <p:spPr>
+          <a:xfrm>
+            <a:off x="838200" y="1081768"/>
+            <a:ext cx="10515600" cy="5236736"/>
+          </a:xfrm>
+        </p:spPr>
+        <p:txBody>
+          <a:bodyPr vert="horz" lIns="91440" tIns="45720" rIns="91440" bIns="45720" rtlCol="0" anchor="t">
+            <a:normAutofit fontScale="92500" lnSpcReduction="10000"/>
+          </a:bodyPr>
+          <a:lstStyle/>
+          <a:p>
+            <a:pPr>
+              <a:buNone/>
+            </a:pPr>
+            <a:r>
+              <a:rPr lang="en-US" sz="1800" dirty="0">
+                <a:ea typeface="+mn-lt"/>
+                <a:cs typeface="+mn-lt"/>
+              </a:rPr>
+              <a:t>Hypothetical User Story : This is a great start; I want my users to understand their money tracking and make the app easier on the eyes when viewing it.</a:t>
+            </a:r>
+          </a:p>
+          <a:p>
+            <a:pPr>
+              <a:buNone/>
+            </a:pPr>
+            <a:endParaRPr lang="en-US" sz="1800" dirty="0">
+              <a:ea typeface="+mn-lt"/>
+              <a:cs typeface="+mn-lt"/>
+            </a:endParaRPr>
+          </a:p>
+          <a:p>
+            <a:pPr>
+              <a:buNone/>
+            </a:pPr>
+            <a:r>
+              <a:rPr lang="en-US" sz="1800" b="1" dirty="0">
+                <a:ea typeface="+mn-lt"/>
+                <a:cs typeface="+mn-lt"/>
+              </a:rPr>
+              <a:t>1. Added a Search Panel to the Query Dialog</a:t>
+            </a:r>
+            <a:endParaRPr lang="en-US" sz="1800" b="1" dirty="0"/>
+          </a:p>
+          <a:p>
+            <a:pPr>
+              <a:buNone/>
+            </a:pPr>
+            <a:r>
+              <a:rPr lang="en-US" sz="1800" dirty="0">
+                <a:ea typeface="+mn-lt"/>
+                <a:cs typeface="+mn-lt"/>
+              </a:rPr>
+              <a:t>   - A new search panel was introduced in </a:t>
+            </a:r>
+            <a:r>
+              <a:rPr lang="en-US" sz="1800" dirty="0" err="1">
+                <a:ea typeface="+mn-lt"/>
+                <a:cs typeface="+mn-lt"/>
+              </a:rPr>
+              <a:t>showQueryDialog</a:t>
+            </a:r>
+            <a:r>
+              <a:rPr lang="en-US" sz="1800" dirty="0">
+                <a:ea typeface="+mn-lt"/>
+                <a:cs typeface="+mn-lt"/>
+              </a:rPr>
+              <a:t>(), consisting of:</a:t>
+            </a:r>
+            <a:endParaRPr lang="en-US" sz="1800" dirty="0"/>
+          </a:p>
+          <a:p>
+            <a:pPr>
+              <a:buNone/>
+            </a:pPr>
+            <a:r>
+              <a:rPr lang="en-US" sz="1800" dirty="0">
+                <a:ea typeface="+mn-lt"/>
+                <a:cs typeface="+mn-lt"/>
+              </a:rPr>
+              <a:t>      - A </a:t>
+            </a:r>
+            <a:r>
+              <a:rPr lang="en-US" sz="1800" dirty="0" err="1">
+                <a:ea typeface="+mn-lt"/>
+                <a:cs typeface="+mn-lt"/>
+              </a:rPr>
+              <a:t>JTextField</a:t>
+            </a:r>
+            <a:r>
+              <a:rPr lang="en-US" sz="1800" dirty="0">
+                <a:ea typeface="+mn-lt"/>
+                <a:cs typeface="+mn-lt"/>
+              </a:rPr>
+              <a:t> for entering search keywords.</a:t>
+            </a:r>
+            <a:endParaRPr lang="en-US" sz="1800" dirty="0"/>
+          </a:p>
+          <a:p>
+            <a:pPr>
+              <a:buNone/>
+            </a:pPr>
+            <a:r>
+              <a:rPr lang="en-US" sz="1800" dirty="0">
+                <a:ea typeface="+mn-lt"/>
+                <a:cs typeface="+mn-lt"/>
+              </a:rPr>
+              <a:t>      - A </a:t>
+            </a:r>
+            <a:r>
+              <a:rPr lang="en-US" sz="1800" dirty="0" err="1">
+                <a:ea typeface="+mn-lt"/>
+                <a:cs typeface="+mn-lt"/>
+              </a:rPr>
+              <a:t>JButton</a:t>
+            </a:r>
+            <a:r>
+              <a:rPr lang="en-US" sz="1800" dirty="0">
+                <a:ea typeface="+mn-lt"/>
+                <a:cs typeface="+mn-lt"/>
+              </a:rPr>
+              <a:t> labeled "Search" for triggering the search manually.</a:t>
+            </a:r>
+            <a:endParaRPr lang="en-US" sz="1800" dirty="0"/>
+          </a:p>
+          <a:p>
+            <a:pPr>
+              <a:buNone/>
+            </a:pPr>
+            <a:r>
+              <a:rPr lang="en-US" sz="1800" b="1" dirty="0">
+                <a:ea typeface="+mn-lt"/>
+                <a:cs typeface="+mn-lt"/>
+              </a:rPr>
+              <a:t>2. Added Dark Mode Theming</a:t>
+            </a:r>
+            <a:endParaRPr lang="en-US" sz="1800" b="1" dirty="0"/>
+          </a:p>
+          <a:p>
+            <a:pPr>
+              <a:buNone/>
+            </a:pPr>
+            <a:r>
+              <a:rPr lang="en-US" sz="1800" dirty="0">
+                <a:ea typeface="+mn-lt"/>
+                <a:cs typeface="+mn-lt"/>
+              </a:rPr>
+              <a:t>   - A dark mode theme was implemented to make the viewing experience better for the user.</a:t>
+            </a:r>
+          </a:p>
+          <a:p>
+            <a:pPr>
+              <a:buNone/>
+            </a:pPr>
+            <a:r>
+              <a:rPr lang="en-US" sz="1800" dirty="0">
+                <a:ea typeface="+mn-lt"/>
+                <a:cs typeface="+mn-lt"/>
+              </a:rPr>
+              <a:t>   	- Key Feature: Users can now toggle between a light and dark mode setting within the apps main menu.</a:t>
+            </a:r>
+          </a:p>
+          <a:p>
+            <a:pPr>
+              <a:buNone/>
+            </a:pPr>
+            <a:r>
+              <a:rPr lang="en-US" sz="1800" dirty="0">
+                <a:ea typeface="+mn-lt"/>
+                <a:cs typeface="+mn-lt"/>
+              </a:rPr>
+              <a:t>3. </a:t>
+            </a:r>
+            <a:r>
+              <a:rPr lang="en-US" sz="1800" b="1" dirty="0">
+                <a:ea typeface="+mn-lt"/>
+                <a:cs typeface="+mn-lt"/>
+              </a:rPr>
+              <a:t>Search Logic (Filtering and Highlighting) ( Green / Red Labels )</a:t>
+            </a:r>
+            <a:endParaRPr lang="en-US" sz="1800" b="1" dirty="0"/>
+          </a:p>
+          <a:p>
+            <a:pPr>
+              <a:buNone/>
+            </a:pPr>
+            <a:r>
+              <a:rPr lang="en-US" sz="1800" dirty="0">
+                <a:ea typeface="+mn-lt"/>
+                <a:cs typeface="+mn-lt"/>
+              </a:rPr>
+              <a:t>   - Implemented the </a:t>
+            </a:r>
+            <a:r>
+              <a:rPr lang="en-US" sz="1800" dirty="0" err="1">
+                <a:ea typeface="+mn-lt"/>
+                <a:cs typeface="+mn-lt"/>
+              </a:rPr>
+              <a:t>applySearchHighlight</a:t>
+            </a:r>
+            <a:r>
+              <a:rPr lang="en-US" sz="1800" dirty="0">
+                <a:ea typeface="+mn-lt"/>
+                <a:cs typeface="+mn-lt"/>
+              </a:rPr>
+              <a:t>() method:</a:t>
+            </a:r>
+            <a:endParaRPr lang="en-US" sz="1800" dirty="0"/>
+          </a:p>
+          <a:p>
+            <a:pPr>
+              <a:buNone/>
+            </a:pPr>
+            <a:r>
+              <a:rPr lang="en-US" sz="1800" dirty="0">
+                <a:ea typeface="+mn-lt"/>
+                <a:cs typeface="+mn-lt"/>
+              </a:rPr>
+              <a:t>      - Purpose: Filters the data displayed in the table based on the user's query.</a:t>
+            </a:r>
+            <a:endParaRPr lang="en-US" sz="1800" dirty="0"/>
+          </a:p>
+          <a:p>
+            <a:pPr>
+              <a:buNone/>
+            </a:pPr>
+            <a:r>
+              <a:rPr lang="en-US" sz="1800" dirty="0">
+                <a:ea typeface="+mn-lt"/>
+                <a:cs typeface="+mn-lt"/>
+              </a:rPr>
+              <a:t>      - Iterates through the data rows and checks if any cell matches the query.</a:t>
+            </a:r>
+            <a:endParaRPr lang="en-US" sz="1800" dirty="0"/>
+          </a:p>
+          <a:p>
+            <a:pPr>
+              <a:buNone/>
+            </a:pPr>
+            <a:r>
+              <a:rPr lang="en-US" sz="1800" dirty="0">
+                <a:ea typeface="+mn-lt"/>
+                <a:cs typeface="+mn-lt"/>
+              </a:rPr>
+              <a:t>      - Builds a filtered list of matching rows and updates the table model with the results.</a:t>
+            </a:r>
+            <a:endParaRPr lang="en-US" sz="1800" dirty="0"/>
+          </a:p>
+          <a:p>
+            <a:pPr>
+              <a:buNone/>
+            </a:pPr>
+            <a:r>
+              <a:rPr lang="en-US" sz="1800" dirty="0">
+                <a:ea typeface="+mn-lt"/>
+                <a:cs typeface="+mn-lt"/>
+              </a:rPr>
+              <a:t>      - Restores the full dataset if the search field is empty.</a:t>
+            </a:r>
+            <a:endParaRPr lang="en-US" sz="1800" dirty="0"/>
+          </a:p>
+          <a:p>
+            <a:pPr>
+              <a:buNone/>
+            </a:pPr>
+            <a:endParaRPr lang="en-US" sz="1200" dirty="0"/>
+          </a:p>
+        </p:txBody>
+      </p:sp>
+    </p:spTree>
+    <p:extLst>
+      <p:ext uri="{BB962C8B-B14F-4D97-AF65-F5344CB8AC3E}">
+        <p14:creationId xmlns:p14="http://schemas.microsoft.com/office/powerpoint/2010/main" val="3096058037"/>
+      </p:ext>
+    </p:extLst>
+  </p:cSld>
+  <p:clrMapOvr>
+    <a:masterClrMapping/>
+  </p:clrMapOvr>
+</p:sld>
+</file>
+
+<file path=ppt/slides/slide14.xml><?xml version="1.0" encoding="utf-8"?>
+<p:sld xmlns:a="http://schemas.openxmlformats.org/drawingml/2006/main" xmlns:r="http://schemas.openxmlformats.org/officeDocument/2006/relationships" xmlns:p="http://schemas.openxmlformats.org/presentationml/2006/main">
+  <p:cSld>
+    <p:spTree>
+      <p:nvGrpSpPr>
+        <p:cNvPr id="1" name=""/>
+        <p:cNvGrpSpPr/>
+        <p:nvPr/>
+      </p:nvGrpSpPr>
+      <p:grpSpPr>
+        <a:xfrm>
+          <a:off x="0" y="0"/>
+          <a:ext cx="0" cy="0"/>
+          <a:chOff x="0" y="0"/>
+          <a:chExt cx="0" cy="0"/>
+        </a:xfrm>
+      </p:grpSpPr>
+      <p:sp>
+        <p:nvSpPr>
+          <p:cNvPr id="2" name="Title 1">
+            <a:extLst>
+              <a:ext uri="{FF2B5EF4-FFF2-40B4-BE49-F238E27FC236}">
+                <a16:creationId xmlns:a16="http://schemas.microsoft.com/office/drawing/2014/main" id="{88FD8736-75C0-E349-30D7-B7E4C5C67B3E}"/>
+              </a:ext>
+            </a:extLst>
+          </p:cNvPr>
+          <p:cNvSpPr>
+            <a:spLocks noGrp="1"/>
+          </p:cNvSpPr>
+          <p:nvPr>
+            <p:ph type="title"/>
+          </p:nvPr>
+        </p:nvSpPr>
+        <p:spPr>
+          <a:xfrm>
+            <a:off x="838200" y="365125"/>
+            <a:ext cx="10515600" cy="627064"/>
+          </a:xfrm>
+        </p:spPr>
+        <p:txBody>
+          <a:bodyPr>
+            <a:normAutofit/>
+          </a:bodyPr>
+          <a:lstStyle/>
+          <a:p>
+            <a:r>
+              <a:rPr lang="en-US" sz="3200" dirty="0"/>
+              <a:t>Refactoring Continued</a:t>
+            </a:r>
+          </a:p>
+        </p:txBody>
+      </p:sp>
+      <p:sp>
+        <p:nvSpPr>
+          <p:cNvPr id="3" name="Content Placeholder 2">
+            <a:extLst>
+              <a:ext uri="{FF2B5EF4-FFF2-40B4-BE49-F238E27FC236}">
+                <a16:creationId xmlns:a16="http://schemas.microsoft.com/office/drawing/2014/main" id="{0C396130-DE9A-48A2-F2BF-2CEFE3822837}"/>
+              </a:ext>
+            </a:extLst>
+          </p:cNvPr>
+          <p:cNvSpPr>
+            <a:spLocks noGrp="1"/>
+          </p:cNvSpPr>
+          <p:nvPr>
+            <p:ph idx="1"/>
+          </p:nvPr>
+        </p:nvSpPr>
+        <p:spPr>
+          <a:xfrm>
+            <a:off x="838200" y="1081768"/>
+            <a:ext cx="10515600" cy="4351338"/>
+          </a:xfrm>
+        </p:spPr>
+        <p:txBody>
+          <a:bodyPr vert="horz" lIns="91440" tIns="45720" rIns="91440" bIns="45720" rtlCol="0" anchor="t">
+            <a:noAutofit/>
+          </a:bodyPr>
+          <a:lstStyle/>
+          <a:p>
+            <a:pPr>
+              <a:buNone/>
+            </a:pPr>
+            <a:r>
+              <a:rPr lang="en-US" sz="1600" b="1" dirty="0">
+                <a:ea typeface="+mn-lt"/>
+                <a:cs typeface="+mn-lt"/>
+              </a:rPr>
+              <a:t>4. Updated Table Generation</a:t>
+            </a:r>
+          </a:p>
+          <a:p>
+            <a:pPr>
+              <a:buNone/>
+            </a:pPr>
+            <a:r>
+              <a:rPr lang="en-US" sz="1600" dirty="0">
+                <a:ea typeface="+mn-lt"/>
+                <a:cs typeface="+mn-lt"/>
+              </a:rPr>
+              <a:t>   - Reapplies the custom renderer for the "Type" column to maintain the color coding (red for expenses, green for savings) after filtering.</a:t>
+            </a:r>
+            <a:endParaRPr lang="en-US" sz="1600" dirty="0"/>
+          </a:p>
+          <a:p>
+            <a:pPr>
+              <a:buNone/>
+            </a:pPr>
+            <a:r>
+              <a:rPr lang="en-US" sz="1600" b="1" dirty="0">
+                <a:ea typeface="+mn-lt"/>
+                <a:cs typeface="+mn-lt"/>
+              </a:rPr>
+              <a:t>5. Tightened Loose, Overextended Code</a:t>
+            </a:r>
+          </a:p>
+          <a:p>
+            <a:pPr>
+              <a:buNone/>
+            </a:pPr>
+            <a:r>
+              <a:rPr lang="en-US" sz="1600" dirty="0">
+                <a:ea typeface="+mn-lt"/>
+                <a:cs typeface="+mn-lt"/>
+              </a:rPr>
+              <a:t>   - The </a:t>
+            </a:r>
+            <a:r>
+              <a:rPr lang="en-US" sz="1600" dirty="0" err="1">
+                <a:ea typeface="+mn-lt"/>
+                <a:cs typeface="+mn-lt"/>
+              </a:rPr>
+              <a:t>applySearchHighlight</a:t>
+            </a:r>
+            <a:r>
+              <a:rPr lang="en-US" sz="1600" dirty="0">
+                <a:ea typeface="+mn-lt"/>
+                <a:cs typeface="+mn-lt"/>
+              </a:rPr>
+              <a:t>() function is isolated, keeping the search logic reusable and easy to update.</a:t>
+            </a:r>
+            <a:endParaRPr lang="en-US" sz="1600" dirty="0"/>
+          </a:p>
+          <a:p>
+            <a:pPr>
+              <a:buNone/>
+            </a:pPr>
+            <a:r>
+              <a:rPr lang="en-US" sz="1600" dirty="0">
+                <a:ea typeface="+mn-lt"/>
+                <a:cs typeface="+mn-lt"/>
+              </a:rPr>
+              <a:t>   - Ensures separation of concerns: the query dialog handles UI updates, while the search logic handles filtering.</a:t>
+            </a:r>
+            <a:endParaRPr lang="en-US" sz="1600" dirty="0"/>
+          </a:p>
+          <a:p>
+            <a:pPr>
+              <a:buNone/>
+            </a:pPr>
+            <a:r>
+              <a:rPr lang="en-US" sz="1600" b="1" dirty="0">
+                <a:ea typeface="+mn-lt"/>
+                <a:cs typeface="+mn-lt"/>
+              </a:rPr>
+              <a:t>6. Enhanced User Experience</a:t>
+            </a:r>
+            <a:endParaRPr lang="en-US" sz="1600" b="1" dirty="0"/>
+          </a:p>
+          <a:p>
+            <a:pPr>
+              <a:buNone/>
+            </a:pPr>
+            <a:r>
+              <a:rPr lang="en-US" sz="1600" dirty="0">
+                <a:ea typeface="+mn-lt"/>
+                <a:cs typeface="+mn-lt"/>
+              </a:rPr>
+              <a:t>   - Integrated real-time feedback into the query interface.</a:t>
+            </a:r>
+            <a:endParaRPr lang="en-US" sz="1600" dirty="0"/>
+          </a:p>
+          <a:p>
+            <a:pPr>
+              <a:buNone/>
+            </a:pPr>
+            <a:r>
+              <a:rPr lang="en-US" sz="1600" dirty="0">
+                <a:ea typeface="+mn-lt"/>
+                <a:cs typeface="+mn-lt"/>
+              </a:rPr>
+              <a:t>   - Ensures the design is intuitive and user-friendly.</a:t>
+            </a:r>
+          </a:p>
+          <a:p>
+            <a:pPr>
+              <a:buNone/>
+            </a:pPr>
+            <a:r>
+              <a:rPr lang="en-US" sz="1600" b="1" dirty="0">
+                <a:ea typeface="+mn-lt"/>
+                <a:cs typeface="+mn-lt"/>
+              </a:rPr>
+              <a:t>Key Benefits of the Refactoring</a:t>
+            </a:r>
+          </a:p>
+          <a:p>
+            <a:pPr>
+              <a:buNone/>
+            </a:pPr>
+            <a:r>
+              <a:rPr lang="en-US" sz="1600" dirty="0">
+                <a:ea typeface="+mn-lt"/>
+                <a:cs typeface="+mn-lt"/>
+              </a:rPr>
+              <a:t>Improved Functionality: Users can now search for specific entries by keyword (type, category, date, or amount).</a:t>
+            </a:r>
+          </a:p>
+          <a:p>
+            <a:pPr>
+              <a:buNone/>
+            </a:pPr>
+            <a:r>
+              <a:rPr lang="en-US" sz="1600" dirty="0">
+                <a:ea typeface="+mn-lt"/>
+                <a:cs typeface="+mn-lt"/>
+              </a:rPr>
+              <a:t>Enhanced Performance: The search dynamically filters data without modifying the original dataset.</a:t>
+            </a:r>
+            <a:endParaRPr lang="en-US" sz="1600" dirty="0"/>
+          </a:p>
+          <a:p>
+            <a:pPr>
+              <a:buNone/>
+            </a:pPr>
+            <a:r>
+              <a:rPr lang="en-US" sz="1600" dirty="0">
+                <a:ea typeface="+mn-lt"/>
+                <a:cs typeface="+mn-lt"/>
+              </a:rPr>
+              <a:t>Reusable Components: The </a:t>
+            </a:r>
+            <a:r>
+              <a:rPr lang="en-US" sz="1600" dirty="0" err="1">
+                <a:ea typeface="+mn-lt"/>
+                <a:cs typeface="+mn-lt"/>
+              </a:rPr>
+              <a:t>applySearchHighlight</a:t>
+            </a:r>
+            <a:r>
+              <a:rPr lang="en-US" sz="1600" dirty="0">
+                <a:ea typeface="+mn-lt"/>
+                <a:cs typeface="+mn-lt"/>
+              </a:rPr>
+              <a:t>() shows specific user data, making it easier for the user to understand the components of the app.</a:t>
+            </a:r>
+          </a:p>
+          <a:p>
+            <a:pPr>
+              <a:buNone/>
+            </a:pPr>
+            <a:r>
+              <a:rPr lang="en-US" sz="1600" dirty="0">
+                <a:ea typeface="+mn-lt"/>
+                <a:cs typeface="+mn-lt"/>
+              </a:rPr>
+              <a:t>User Experience: The addition of real-time search significantly improves interaction within the query dialog.</a:t>
+            </a:r>
+            <a:endParaRPr lang="en-US" sz="1600" dirty="0"/>
+          </a:p>
+          <a:p>
+            <a:pPr>
+              <a:buNone/>
+            </a:pPr>
+            <a:endParaRPr lang="en-US" sz="1200" dirty="0"/>
+          </a:p>
+        </p:txBody>
+      </p:sp>
+    </p:spTree>
+    <p:extLst>
+      <p:ext uri="{BB962C8B-B14F-4D97-AF65-F5344CB8AC3E}">
+        <p14:creationId xmlns:p14="http://schemas.microsoft.com/office/powerpoint/2010/main" val="71800057"/>
+      </p:ext>
+    </p:extLst>
+  </p:cSld>
+  <p:clrMapOvr>
+    <a:masterClrMapping/>
+  </p:clrMapOvr>
+</p:sld>
+</file>
+
+<file path=ppt/slides/slide15.xml><?xml version="1.0" encoding="utf-8"?>
+<p:sld xmlns:a="http://schemas.openxmlformats.org/drawingml/2006/main" xmlns:r="http://schemas.openxmlformats.org/officeDocument/2006/relationships" xmlns:p="http://schemas.openxmlformats.org/presentationml/2006/main">
+  <p:cSld>
+    <p:spTree>
+      <p:nvGrpSpPr>
+        <p:cNvPr id="1" name=""/>
+        <p:cNvGrpSpPr/>
+        <p:nvPr/>
+      </p:nvGrpSpPr>
+      <p:grpSpPr>
+        <a:xfrm>
+          <a:off x="0" y="0"/>
+          <a:ext cx="0" cy="0"/>
+          <a:chOff x="0" y="0"/>
+          <a:chExt cx="0" cy="0"/>
+        </a:xfrm>
+      </p:grpSpPr>
+      <p:sp>
+        <p:nvSpPr>
+          <p:cNvPr id="2" name="Title 1">
+            <a:extLst>
+              <a:ext uri="{FF2B5EF4-FFF2-40B4-BE49-F238E27FC236}">
+                <a16:creationId xmlns:a16="http://schemas.microsoft.com/office/drawing/2014/main" id="{6E0832DA-F268-07E8-E3E3-3E70EFD0BA75}"/>
+              </a:ext>
+            </a:extLst>
+          </p:cNvPr>
+          <p:cNvSpPr>
+            <a:spLocks noGrp="1"/>
+          </p:cNvSpPr>
+          <p:nvPr>
+            <p:ph type="title"/>
+          </p:nvPr>
+        </p:nvSpPr>
+        <p:spPr>
+          <a:xfrm>
+            <a:off x="838200" y="365125"/>
+            <a:ext cx="10515600" cy="799421"/>
+          </a:xfrm>
+        </p:spPr>
+        <p:txBody>
+          <a:bodyPr>
+            <a:normAutofit/>
+          </a:bodyPr>
+          <a:lstStyle/>
+          <a:p>
+            <a:r>
+              <a:rPr lang="en-US" sz="3200" dirty="0"/>
+              <a:t>Design Patterns</a:t>
+            </a:r>
+          </a:p>
+        </p:txBody>
+      </p:sp>
+      <p:sp>
+        <p:nvSpPr>
+          <p:cNvPr id="3" name="Content Placeholder 2">
+            <a:extLst>
+              <a:ext uri="{FF2B5EF4-FFF2-40B4-BE49-F238E27FC236}">
+                <a16:creationId xmlns:a16="http://schemas.microsoft.com/office/drawing/2014/main" id="{A71054ED-766F-6BB9-D1D3-99072EF408E1}"/>
+              </a:ext>
+            </a:extLst>
+          </p:cNvPr>
+          <p:cNvSpPr>
+            <a:spLocks noGrp="1"/>
+          </p:cNvSpPr>
+          <p:nvPr>
+            <p:ph idx="1"/>
+          </p:nvPr>
+        </p:nvSpPr>
+        <p:spPr>
+          <a:xfrm>
+            <a:off x="983343" y="1163411"/>
+            <a:ext cx="10515600" cy="4351338"/>
+          </a:xfrm>
+        </p:spPr>
+        <p:txBody>
+          <a:bodyPr vert="horz" lIns="91440" tIns="45720" rIns="91440" bIns="45720" rtlCol="0" anchor="t">
+            <a:noAutofit/>
+          </a:bodyPr>
+          <a:lstStyle/>
+          <a:p>
+            <a:pPr>
+              <a:buNone/>
+            </a:pPr>
+            <a:r>
+              <a:rPr lang="en-US" sz="1600" b="1" dirty="0">
+                <a:ea typeface="+mn-lt"/>
+                <a:cs typeface="+mn-lt"/>
+              </a:rPr>
+              <a:t>1. Singleton Pattern</a:t>
+            </a:r>
+            <a:endParaRPr lang="en-US" sz="1600" b="1" dirty="0"/>
+          </a:p>
+          <a:p>
+            <a:pPr>
+              <a:buNone/>
+            </a:pPr>
+            <a:r>
+              <a:rPr lang="en-US" sz="1600" dirty="0">
+                <a:ea typeface="+mn-lt"/>
+                <a:cs typeface="+mn-lt"/>
+              </a:rPr>
+              <a:t>   - Why: When formatting the second implementation, we've decided to use the singleton pattern to enforce capsulation.</a:t>
+            </a:r>
+            <a:r>
+              <a:rPr lang="en-US" sz="1600" dirty="0"/>
+              <a:t> </a:t>
+            </a:r>
+            <a:r>
+              <a:rPr lang="en-US" sz="1600" dirty="0">
+                <a:ea typeface="+mn-lt"/>
+                <a:cs typeface="+mn-lt"/>
+              </a:rPr>
+              <a:t>When doing this, encapsulating the </a:t>
+            </a:r>
+            <a:r>
+              <a:rPr lang="en-US" sz="1600" dirty="0" err="1">
+                <a:ea typeface="+mn-lt"/>
+                <a:cs typeface="+mn-lt"/>
+              </a:rPr>
+              <a:t>ExpenseTracker</a:t>
+            </a:r>
+            <a:r>
+              <a:rPr lang="en-US" sz="1600" dirty="0">
+                <a:ea typeface="+mn-lt"/>
+                <a:cs typeface="+mn-lt"/>
+              </a:rPr>
+              <a:t> class with the Singleton Pattern would ensure only one instance exists.</a:t>
+            </a:r>
+            <a:endParaRPr lang="en-US" sz="1600" dirty="0"/>
+          </a:p>
+          <a:p>
+            <a:pPr>
+              <a:buNone/>
+            </a:pPr>
+            <a:r>
+              <a:rPr lang="en-US" sz="1600" b="1" dirty="0">
+                <a:ea typeface="+mn-lt"/>
+                <a:cs typeface="+mn-lt"/>
+              </a:rPr>
+              <a:t>2. Observer Pattern</a:t>
+            </a:r>
+            <a:endParaRPr lang="en-US" sz="1600" b="1" dirty="0"/>
+          </a:p>
+          <a:p>
+            <a:pPr>
+              <a:buNone/>
+            </a:pPr>
+            <a:r>
+              <a:rPr lang="en-US" sz="1600" dirty="0">
+                <a:ea typeface="+mn-lt"/>
+                <a:cs typeface="+mn-lt"/>
+              </a:rPr>
+              <a:t>   - Why: When we developed the second iteration, the Observer Pattern was applied to decouple the state from the display logic, making the code more modular.</a:t>
+            </a:r>
+            <a:endParaRPr lang="en-US" sz="1600" dirty="0"/>
+          </a:p>
+          <a:p>
+            <a:pPr>
+              <a:buNone/>
+            </a:pPr>
+            <a:r>
+              <a:rPr lang="en-US" sz="1600" b="1" dirty="0">
+                <a:ea typeface="+mn-lt"/>
+                <a:cs typeface="+mn-lt"/>
+              </a:rPr>
+              <a:t>3. Strategy Pattern</a:t>
+            </a:r>
+            <a:endParaRPr lang="en-US" sz="1600" b="1" dirty="0"/>
+          </a:p>
+          <a:p>
+            <a:pPr>
+              <a:buNone/>
+            </a:pPr>
+            <a:r>
+              <a:rPr lang="en-US" sz="1600" dirty="0">
+                <a:ea typeface="+mn-lt"/>
+                <a:cs typeface="+mn-lt"/>
+              </a:rPr>
+              <a:t>   - Why: The application processes input differently for expenses and savings. We decided to use encapsulation to form</a:t>
+            </a:r>
+            <a:r>
+              <a:rPr lang="en-US" sz="1600" dirty="0"/>
+              <a:t> </a:t>
+            </a:r>
+            <a:r>
+              <a:rPr lang="en-US" sz="1600" dirty="0">
+                <a:ea typeface="+mn-lt"/>
+                <a:cs typeface="+mn-lt"/>
+              </a:rPr>
+              <a:t>these operations into separate classes to simplify extensibility.</a:t>
+            </a:r>
+            <a:endParaRPr lang="en-US" sz="1600" dirty="0"/>
+          </a:p>
+          <a:p>
+            <a:pPr>
+              <a:buNone/>
+            </a:pPr>
+            <a:endParaRPr lang="en-US" sz="1400" dirty="0"/>
+          </a:p>
+          <a:p>
+            <a:pPr>
+              <a:buNone/>
+            </a:pPr>
+            <a:endParaRPr lang="en-US" sz="1200" dirty="0"/>
+          </a:p>
+        </p:txBody>
+      </p:sp>
+    </p:spTree>
+    <p:extLst>
+      <p:ext uri="{BB962C8B-B14F-4D97-AF65-F5344CB8AC3E}">
+        <p14:creationId xmlns:p14="http://schemas.microsoft.com/office/powerpoint/2010/main" val="294646254"/>
+      </p:ext>
+    </p:extLst>
+  </p:cSld>
+  <p:clrMapOvr>
+    <a:masterClrMapping/>
+  </p:clrMapOvr>
+</p:sld>
+</file>
+
+<file path=ppt/slides/slide16.xml><?xml version="1.0" encoding="utf-8"?>
+<p:sld xmlns:a="http://schemas.openxmlformats.org/drawingml/2006/main" xmlns:r="http://schemas.openxmlformats.org/officeDocument/2006/relationships" xmlns:p="http://schemas.openxmlformats.org/presentationml/2006/main">
+  <p:cSld>
+    <p:bg>
+      <p:bgPr>
+        <a:solidFill>
+          <a:schemeClr val="bg1"/>
+        </a:solidFill>
+        <a:effectLst/>
+      </p:bgPr>
+    </p:bg>
+    <p:spTree>
+      <p:nvGrpSpPr>
+        <p:cNvPr id="1" name=""/>
+        <p:cNvGrpSpPr/>
+        <p:nvPr/>
+      </p:nvGrpSpPr>
+      <p:grpSpPr>
+        <a:xfrm>
+          <a:off x="0" y="0"/>
+          <a:ext cx="0" cy="0"/>
+          <a:chOff x="0" y="0"/>
+          <a:chExt cx="0" cy="0"/>
+        </a:xfrm>
+      </p:grpSpPr>
+      <p:sp>
+        <p:nvSpPr>
+          <p:cNvPr id="17" name="Rectangle 16">
+            <a:extLst>
+              <a:ext uri="{FF2B5EF4-FFF2-40B4-BE49-F238E27FC236}">
+                <a16:creationId xmlns:a16="http://schemas.microsoft.com/office/drawing/2014/main" id="{E8A8EAB8-D2FF-444D-B34B-7D32F106AD0E}"/>
+              </a:ext>
+              <a:ext uri="{C183D7F6-B498-43B3-948B-1728B52AA6E4}">
+                <adec:decorative xmlns:adec="http://schemas.microsoft.com/office/drawing/2017/decorative" val="1"/>
+              </a:ext>
+            </a:extLst>
+          </p:cNvPr>
+          <p:cNvSpPr>
+            <a:spLocks noGrp="1" noRot="1" noChangeAspect="1" noMove="1" noResize="1" noEditPoints="1" noAdjustHandles="1" noChangeArrowheads="1" noChangeShapeType="1" noTextEdit="1"/>
+          </p:cNvSpPr>
+          <p:nvPr>
+            <p:extLst>
+              <p:ext uri="{386F3935-93C4-4BCD-93E2-E3B085C9AB24}">
+                <p16:designElem xmlns:p16="http://schemas.microsoft.com/office/powerpoint/2015/main" val="1"/>
+              </p:ext>
+            </p:extLst>
+          </p:nvPr>
+        </p:nvSpPr>
+        <p:spPr>
+          <a:xfrm>
+            <a:off x="0" y="0"/>
+            <a:ext cx="12192000" cy="6858000"/>
+          </a:xfrm>
+          <a:prstGeom prst="rect">
+            <a:avLst/>
+          </a:prstGeom>
+          <a:solidFill>
+            <a:schemeClr val="tx1">
+              <a:lumMod val="95000"/>
+              <a:lumOff val="5000"/>
+            </a:schemeClr>
+          </a:solidFill>
+          <a:ln>
+            <a:noFill/>
+          </a:ln>
+        </p:spPr>
+        <p:style>
+          <a:lnRef idx="2">
+            <a:schemeClr val="accent1">
+              <a:shade val="50000"/>
+            </a:schemeClr>
+          </a:lnRef>
+          <a:fillRef idx="1">
+            <a:schemeClr val="accent1"/>
+          </a:fillRef>
+          <a:effectRef idx="0">
+            <a:schemeClr val="accent1"/>
+          </a:effectRef>
+          <a:fontRef idx="minor">
+            <a:schemeClr val="lt1"/>
+          </a:fontRef>
+        </p:style>
+        <p:txBody>
+          <a:bodyPr rtlCol="0" anchor="ctr"/>
+          <a:lstStyle/>
+          <a:p>
+            <a:pPr algn="ctr"/>
+            <a:endParaRPr lang="en-US" dirty="0">
+              <a:solidFill>
+                <a:schemeClr val="bg1"/>
+              </a:solidFill>
+            </a:endParaRPr>
+          </a:p>
+        </p:txBody>
+      </p:sp>
+      <p:sp>
+        <p:nvSpPr>
+          <p:cNvPr id="2" name="Title 1">
+            <a:extLst>
+              <a:ext uri="{FF2B5EF4-FFF2-40B4-BE49-F238E27FC236}">
+                <a16:creationId xmlns:a16="http://schemas.microsoft.com/office/drawing/2014/main" id="{8870F612-2A50-AC04-8B99-DE64831CD9E0}"/>
+              </a:ext>
+            </a:extLst>
+          </p:cNvPr>
+          <p:cNvSpPr>
+            <a:spLocks noGrp="1"/>
+          </p:cNvSpPr>
+          <p:nvPr>
+            <p:ph type="title"/>
+          </p:nvPr>
+        </p:nvSpPr>
+        <p:spPr>
+          <a:xfrm>
+            <a:off x="838200" y="448721"/>
+            <a:ext cx="4707671" cy="1225650"/>
+          </a:xfrm>
+        </p:spPr>
+        <p:txBody>
+          <a:bodyPr anchor="b">
+            <a:normAutofit/>
+          </a:bodyPr>
+          <a:lstStyle/>
+          <a:p>
+            <a:r>
+              <a:rPr lang="en-US" sz="3800">
+                <a:solidFill>
+                  <a:schemeClr val="bg1"/>
+                </a:solidFill>
+              </a:rPr>
+              <a:t>New Features</a:t>
+            </a:r>
+          </a:p>
+        </p:txBody>
+      </p:sp>
+      <p:cxnSp>
+        <p:nvCxnSpPr>
+          <p:cNvPr id="19" name="Straight Connector 18">
+            <a:extLst>
+              <a:ext uri="{FF2B5EF4-FFF2-40B4-BE49-F238E27FC236}">
+                <a16:creationId xmlns:a16="http://schemas.microsoft.com/office/drawing/2014/main" id="{EEA38897-7BA3-4408-8083-3235339C4A60}"/>
+              </a:ext>
+              <a:ext uri="{C183D7F6-B498-43B3-948B-1728B52AA6E4}">
+                <adec:decorative xmlns:adec="http://schemas.microsoft.com/office/drawing/2017/decorative" val="1"/>
+              </a:ext>
+            </a:extLst>
+          </p:cNvPr>
+          <p:cNvCxnSpPr>
+            <a:cxnSpLocks noGrp="1" noRot="1" noChangeAspect="1" noMove="1" noResize="1" noEditPoints="1" noAdjustHandles="1" noChangeArrowheads="1" noChangeShapeType="1"/>
+          </p:cNvCxnSpPr>
+          <p:nvPr>
+            <p:extLst>
+              <p:ext uri="{386F3935-93C4-4BCD-93E2-E3B085C9AB24}">
+                <p16:designElem xmlns:p16="http://schemas.microsoft.com/office/powerpoint/2015/main" val="1"/>
+              </p:ext>
+            </p:extLst>
+          </p:nvPr>
+        </p:nvCxnSpPr>
+        <p:spPr>
+          <a:xfrm flipH="1">
+            <a:off x="831873" y="1749756"/>
+            <a:ext cx="4718304" cy="0"/>
+          </a:xfrm>
+          <a:prstGeom prst="line">
+            <a:avLst/>
+          </a:prstGeom>
+          <a:ln w="12700">
+            <a:solidFill>
+              <a:schemeClr val="accent2"/>
+            </a:solidFill>
+          </a:ln>
+        </p:spPr>
+        <p:style>
+          <a:lnRef idx="1">
+            <a:schemeClr val="accent1"/>
+          </a:lnRef>
+          <a:fillRef idx="0">
+            <a:schemeClr val="accent1"/>
+          </a:fillRef>
+          <a:effectRef idx="0">
+            <a:schemeClr val="accent1"/>
+          </a:effectRef>
+          <a:fontRef idx="minor">
+            <a:schemeClr val="tx1"/>
+          </a:fontRef>
+        </p:style>
+      </p:cxnSp>
+      <p:sp>
+        <p:nvSpPr>
+          <p:cNvPr id="3" name="Content Placeholder 2">
+            <a:extLst>
+              <a:ext uri="{FF2B5EF4-FFF2-40B4-BE49-F238E27FC236}">
+                <a16:creationId xmlns:a16="http://schemas.microsoft.com/office/drawing/2014/main" id="{8504411F-07A5-93C3-216D-DD94A0389255}"/>
+              </a:ext>
+            </a:extLst>
+          </p:cNvPr>
+          <p:cNvSpPr>
+            <a:spLocks noGrp="1"/>
+          </p:cNvSpPr>
+          <p:nvPr>
+            <p:ph idx="1"/>
+          </p:nvPr>
+        </p:nvSpPr>
+        <p:spPr>
+          <a:xfrm>
+            <a:off x="897769" y="1909192"/>
+            <a:ext cx="4586513" cy="3647710"/>
+          </a:xfrm>
+        </p:spPr>
+        <p:txBody>
+          <a:bodyPr>
+            <a:normAutofit/>
+          </a:bodyPr>
+          <a:lstStyle/>
+          <a:p>
+            <a:pPr marL="0" indent="0">
+              <a:buNone/>
+            </a:pPr>
+            <a:r>
+              <a:rPr lang="en-US" sz="2000">
+                <a:solidFill>
+                  <a:schemeClr val="bg1"/>
+                </a:solidFill>
+              </a:rPr>
+              <a:t>Dark Mode</a:t>
+            </a:r>
+          </a:p>
+          <a:p>
+            <a:pPr marL="0" indent="0">
+              <a:buNone/>
+            </a:pPr>
+            <a:r>
+              <a:rPr lang="en-US" sz="2000">
+                <a:solidFill>
+                  <a:schemeClr val="bg1"/>
+                </a:solidFill>
+                <a:ea typeface="+mn-lt"/>
+                <a:cs typeface="+mn-lt"/>
+              </a:rPr>
+              <a:t>"As a user, I want to change color of the program between light and dark."</a:t>
+            </a:r>
+            <a:endParaRPr lang="en-US" sz="2000">
+              <a:solidFill>
+                <a:schemeClr val="bg1"/>
+              </a:solidFill>
+            </a:endParaRPr>
+          </a:p>
+          <a:p>
+            <a:r>
+              <a:rPr lang="en-US" sz="2000">
+                <a:solidFill>
+                  <a:schemeClr val="bg1"/>
+                </a:solidFill>
+              </a:rPr>
+              <a:t>Adds functionality to change the color palate of the program</a:t>
+            </a:r>
+          </a:p>
+          <a:p>
+            <a:endParaRPr lang="en-US" sz="2000">
+              <a:solidFill>
+                <a:schemeClr val="bg1"/>
+              </a:solidFill>
+            </a:endParaRPr>
+          </a:p>
+        </p:txBody>
+      </p:sp>
+      <p:cxnSp>
+        <p:nvCxnSpPr>
+          <p:cNvPr id="21" name="Straight Connector 20">
+            <a:extLst>
+              <a:ext uri="{FF2B5EF4-FFF2-40B4-BE49-F238E27FC236}">
+                <a16:creationId xmlns:a16="http://schemas.microsoft.com/office/drawing/2014/main" id="{F11AD06B-AB20-4097-8606-5DA00DBACE88}"/>
+              </a:ext>
+              <a:ext uri="{C183D7F6-B498-43B3-948B-1728B52AA6E4}">
+                <adec:decorative xmlns:adec="http://schemas.microsoft.com/office/drawing/2017/decorative" val="1"/>
+              </a:ext>
+            </a:extLst>
+          </p:cNvPr>
+          <p:cNvCxnSpPr>
+            <a:cxnSpLocks noGrp="1" noRot="1" noChangeAspect="1" noMove="1" noResize="1" noEditPoints="1" noAdjustHandles="1" noChangeArrowheads="1" noChangeShapeType="1"/>
+          </p:cNvCxnSpPr>
+          <p:nvPr>
+            <p:extLst>
+              <p:ext uri="{386F3935-93C4-4BCD-93E2-E3B085C9AB24}">
+                <p16:designElem xmlns:p16="http://schemas.microsoft.com/office/powerpoint/2015/main" val="1"/>
+              </p:ext>
+            </p:extLst>
+          </p:nvPr>
+        </p:nvCxnSpPr>
+        <p:spPr>
+          <a:xfrm flipH="1">
+            <a:off x="834027" y="5707672"/>
+            <a:ext cx="4713997" cy="0"/>
+          </a:xfrm>
+          <a:prstGeom prst="line">
+            <a:avLst/>
+          </a:prstGeom>
+          <a:ln w="12700">
+            <a:solidFill>
+              <a:schemeClr val="accent2"/>
+            </a:solidFill>
+          </a:ln>
+        </p:spPr>
+        <p:style>
+          <a:lnRef idx="1">
+            <a:schemeClr val="accent1"/>
+          </a:lnRef>
+          <a:fillRef idx="0">
+            <a:schemeClr val="accent1"/>
+          </a:fillRef>
+          <a:effectRef idx="0">
+            <a:schemeClr val="accent1"/>
+          </a:effectRef>
+          <a:fontRef idx="minor">
+            <a:schemeClr val="tx1"/>
+          </a:fontRef>
+        </p:style>
+      </p:cxnSp>
+      <p:pic>
+        <p:nvPicPr>
+          <p:cNvPr id="5" name="Picture 4">
+            <a:extLst>
+              <a:ext uri="{FF2B5EF4-FFF2-40B4-BE49-F238E27FC236}">
+                <a16:creationId xmlns:a16="http://schemas.microsoft.com/office/drawing/2014/main" id="{7E14FB3B-39BE-FA10-C8FF-0C96FE871BEB}"/>
+              </a:ext>
+            </a:extLst>
+          </p:cNvPr>
+          <p:cNvPicPr>
+            <a:picLocks noChangeAspect="1"/>
+          </p:cNvPicPr>
+          <p:nvPr/>
+        </p:nvPicPr>
+        <p:blipFill>
+          <a:blip r:embed="rId2"/>
+          <a:stretch>
+            <a:fillRect/>
+          </a:stretch>
+        </p:blipFill>
+        <p:spPr>
+          <a:xfrm>
+            <a:off x="6077397" y="1148215"/>
+            <a:ext cx="5666547" cy="4561569"/>
+          </a:xfrm>
+          <a:prstGeom prst="rect">
+            <a:avLst/>
+          </a:prstGeom>
+        </p:spPr>
+      </p:pic>
+    </p:spTree>
+    <p:extLst>
+      <p:ext uri="{BB962C8B-B14F-4D97-AF65-F5344CB8AC3E}">
+        <p14:creationId xmlns:p14="http://schemas.microsoft.com/office/powerpoint/2010/main" val="584312899"/>
+      </p:ext>
+    </p:extLst>
+  </p:cSld>
+  <p:clrMapOvr>
+    <a:masterClrMapping/>
+  </p:clrMapOvr>
+</p:sld>
+</file>
+
+<file path=ppt/slides/slide17.xml><?xml version="1.0" encoding="utf-8"?>
+<p:sld xmlns:a="http://schemas.openxmlformats.org/drawingml/2006/main" xmlns:r="http://schemas.openxmlformats.org/officeDocument/2006/relationships" xmlns:p="http://schemas.openxmlformats.org/presentationml/2006/main">
+  <p:cSld>
+    <p:bg>
+      <p:bgPr>
+        <a:solidFill>
+          <a:schemeClr val="bg1"/>
+        </a:solidFill>
+        <a:effectLst/>
+      </p:bgPr>
+    </p:bg>
+    <p:spTree>
+      <p:nvGrpSpPr>
+        <p:cNvPr id="1" name=""/>
+        <p:cNvGrpSpPr/>
+        <p:nvPr/>
+      </p:nvGrpSpPr>
+      <p:grpSpPr>
+        <a:xfrm>
+          <a:off x="0" y="0"/>
+          <a:ext cx="0" cy="0"/>
+          <a:chOff x="0" y="0"/>
+          <a:chExt cx="0" cy="0"/>
+        </a:xfrm>
+      </p:grpSpPr>
+      <p:sp>
+        <p:nvSpPr>
+          <p:cNvPr id="15" name="Rectangle 14">
+            <a:extLst>
+              <a:ext uri="{FF2B5EF4-FFF2-40B4-BE49-F238E27FC236}">
+                <a16:creationId xmlns:a16="http://schemas.microsoft.com/office/drawing/2014/main" id="{A7AE9375-4664-4DB2-922D-2782A6E439AC}"/>
+              </a:ext>
+              <a:ext uri="{C183D7F6-B498-43B3-948B-1728B52AA6E4}">
+                <adec:decorative xmlns:adec="http://schemas.microsoft.com/office/drawing/2017/decorative" val="1"/>
+              </a:ext>
+            </a:extLst>
+          </p:cNvPr>
+          <p:cNvSpPr>
+            <a:spLocks noGrp="1" noRot="1" noChangeAspect="1" noMove="1" noResize="1" noEditPoints="1" noAdjustHandles="1" noChangeArrowheads="1" noChangeShapeType="1" noTextEdit="1"/>
+          </p:cNvSpPr>
+          <p:nvPr>
+            <p:extLst>
+              <p:ext uri="{386F3935-93C4-4BCD-93E2-E3B085C9AB24}">
+                <p16:designElem xmlns:p16="http://schemas.microsoft.com/office/powerpoint/2015/main" val="1"/>
+              </p:ext>
+            </p:extLst>
+          </p:nvPr>
+        </p:nvSpPr>
+        <p:spPr>
+          <a:xfrm>
+            <a:off x="-1" y="0"/>
+            <a:ext cx="12192000" cy="6858000"/>
+          </a:xfrm>
+          <a:prstGeom prst="rect">
+            <a:avLst/>
+          </a:prstGeom>
+          <a:solidFill>
+            <a:schemeClr val="tx1">
+              <a:lumMod val="95000"/>
+              <a:lumOff val="5000"/>
+            </a:schemeClr>
+          </a:solidFill>
+          <a:ln>
+            <a:noFill/>
+          </a:ln>
+        </p:spPr>
+        <p:style>
+          <a:lnRef idx="2">
+            <a:schemeClr val="accent1">
+              <a:shade val="50000"/>
+            </a:schemeClr>
+          </a:lnRef>
+          <a:fillRef idx="1">
+            <a:schemeClr val="accent1"/>
+          </a:fillRef>
+          <a:effectRef idx="0">
+            <a:schemeClr val="accent1"/>
+          </a:effectRef>
+          <a:fontRef idx="minor">
+            <a:schemeClr val="lt1"/>
+          </a:fontRef>
+        </p:style>
+        <p:txBody>
+          <a:bodyPr rtlCol="0" anchor="ctr"/>
+          <a:lstStyle/>
+          <a:p>
+            <a:pPr algn="ctr"/>
+            <a:endParaRPr lang="en-US" dirty="0">
+              <a:solidFill>
+                <a:schemeClr val="tx1"/>
+              </a:solidFill>
+            </a:endParaRPr>
+          </a:p>
+        </p:txBody>
+      </p:sp>
+      <p:sp>
+        <p:nvSpPr>
+          <p:cNvPr id="2" name="Title 1">
+            <a:extLst>
+              <a:ext uri="{FF2B5EF4-FFF2-40B4-BE49-F238E27FC236}">
+                <a16:creationId xmlns:a16="http://schemas.microsoft.com/office/drawing/2014/main" id="{D0FC87CC-608E-AF26-482F-72F51B8DC037}"/>
+              </a:ext>
+            </a:extLst>
+          </p:cNvPr>
+          <p:cNvSpPr>
+            <a:spLocks noGrp="1"/>
+          </p:cNvSpPr>
+          <p:nvPr>
+            <p:ph type="title"/>
+          </p:nvPr>
+        </p:nvSpPr>
+        <p:spPr>
+          <a:xfrm>
+            <a:off x="1295400" y="669925"/>
+            <a:ext cx="4800600" cy="1325563"/>
+          </a:xfrm>
+        </p:spPr>
+        <p:txBody>
+          <a:bodyPr anchor="b">
+            <a:normAutofit/>
+          </a:bodyPr>
+          <a:lstStyle/>
+          <a:p>
+            <a:r>
+              <a:rPr lang="en-US">
+                <a:solidFill>
+                  <a:schemeClr val="bg1"/>
+                </a:solidFill>
+              </a:rPr>
+              <a:t>New Features</a:t>
+            </a:r>
+          </a:p>
+        </p:txBody>
+      </p:sp>
+      <p:cxnSp>
+        <p:nvCxnSpPr>
+          <p:cNvPr id="17" name="Straight Connector 16">
+            <a:extLst>
+              <a:ext uri="{FF2B5EF4-FFF2-40B4-BE49-F238E27FC236}">
+                <a16:creationId xmlns:a16="http://schemas.microsoft.com/office/drawing/2014/main" id="{EE504C98-6397-41C1-A8D8-2D9C4ED307E0}"/>
+              </a:ext>
+              <a:ext uri="{C183D7F6-B498-43B3-948B-1728B52AA6E4}">
+                <adec:decorative xmlns:adec="http://schemas.microsoft.com/office/drawing/2017/decorative" val="1"/>
+              </a:ext>
+            </a:extLst>
+          </p:cNvPr>
+          <p:cNvCxnSpPr>
+            <a:cxnSpLocks noGrp="1" noRot="1" noChangeAspect="1" noMove="1" noResize="1" noEditPoints="1" noAdjustHandles="1" noChangeArrowheads="1" noChangeShapeType="1"/>
+          </p:cNvCxnSpPr>
+          <p:nvPr>
+            <p:extLst>
+              <p:ext uri="{386F3935-93C4-4BCD-93E2-E3B085C9AB24}">
+                <p16:designElem xmlns:p16="http://schemas.microsoft.com/office/powerpoint/2015/main" val="1"/>
+              </p:ext>
+            </p:extLst>
+          </p:nvPr>
+        </p:nvCxnSpPr>
+        <p:spPr>
+          <a:xfrm flipH="1">
+            <a:off x="1" y="2026340"/>
+            <a:ext cx="6095999" cy="0"/>
+          </a:xfrm>
+          <a:prstGeom prst="line">
+            <a:avLst/>
+          </a:prstGeom>
+          <a:ln w="12700">
+            <a:solidFill>
+              <a:schemeClr val="accent2"/>
+            </a:solidFill>
+          </a:ln>
+        </p:spPr>
+        <p:style>
+          <a:lnRef idx="1">
+            <a:schemeClr val="accent1"/>
+          </a:lnRef>
+          <a:fillRef idx="0">
+            <a:schemeClr val="accent1"/>
+          </a:fillRef>
+          <a:effectRef idx="0">
+            <a:schemeClr val="accent1"/>
+          </a:effectRef>
+          <a:fontRef idx="minor">
+            <a:schemeClr val="tx1"/>
+          </a:fontRef>
+        </p:style>
+      </p:cxnSp>
+      <p:sp>
+        <p:nvSpPr>
+          <p:cNvPr id="3" name="Content Placeholder 2">
+            <a:extLst>
+              <a:ext uri="{FF2B5EF4-FFF2-40B4-BE49-F238E27FC236}">
+                <a16:creationId xmlns:a16="http://schemas.microsoft.com/office/drawing/2014/main" id="{4FA64360-FA35-C3F9-9A0E-02D5121AF440}"/>
+              </a:ext>
+            </a:extLst>
+          </p:cNvPr>
+          <p:cNvSpPr>
+            <a:spLocks noGrp="1"/>
+          </p:cNvSpPr>
+          <p:nvPr>
+            <p:ph idx="1"/>
+          </p:nvPr>
+        </p:nvSpPr>
+        <p:spPr>
+          <a:xfrm>
+            <a:off x="1295400" y="2288833"/>
+            <a:ext cx="4800600" cy="3711571"/>
+          </a:xfrm>
+        </p:spPr>
+        <p:txBody>
+          <a:bodyPr>
+            <a:normAutofit/>
+          </a:bodyPr>
+          <a:lstStyle/>
+          <a:p>
+            <a:pPr marL="0" indent="0">
+              <a:buNone/>
+            </a:pPr>
+            <a:r>
+              <a:rPr lang="en-US" sz="2000">
+                <a:solidFill>
+                  <a:schemeClr val="bg1"/>
+                </a:solidFill>
+              </a:rPr>
+              <a:t>Search in Query</a:t>
+            </a:r>
+          </a:p>
+          <a:p>
+            <a:pPr marL="0" indent="0">
+              <a:buNone/>
+            </a:pPr>
+            <a:r>
+              <a:rPr lang="en-US" sz="2000">
+                <a:solidFill>
+                  <a:schemeClr val="bg1"/>
+                </a:solidFill>
+                <a:ea typeface="+mn-lt"/>
+                <a:cs typeface="+mn-lt"/>
+              </a:rPr>
+              <a:t>"As a user, I want to query my expenses by date, category, or tag so that I can analyze my spending in specific areas."</a:t>
+            </a:r>
+            <a:endParaRPr lang="en-US" sz="2000">
+              <a:solidFill>
+                <a:schemeClr val="bg1"/>
+              </a:solidFill>
+            </a:endParaRPr>
+          </a:p>
+          <a:p>
+            <a:r>
+              <a:rPr lang="en-US" sz="2000">
+                <a:solidFill>
+                  <a:schemeClr val="bg1"/>
+                </a:solidFill>
+              </a:rPr>
+              <a:t>Adds the ability to search for certain categories</a:t>
+            </a:r>
+          </a:p>
+        </p:txBody>
+      </p:sp>
+      <p:pic>
+        <p:nvPicPr>
+          <p:cNvPr id="7" name="Picture 6">
+            <a:extLst>
+              <a:ext uri="{FF2B5EF4-FFF2-40B4-BE49-F238E27FC236}">
+                <a16:creationId xmlns:a16="http://schemas.microsoft.com/office/drawing/2014/main" id="{6625B6E6-84C5-C71B-E14F-BEFC417D7F80}"/>
+              </a:ext>
+            </a:extLst>
+          </p:cNvPr>
+          <p:cNvPicPr>
+            <a:picLocks noChangeAspect="1"/>
+          </p:cNvPicPr>
+          <p:nvPr/>
+        </p:nvPicPr>
+        <p:blipFill>
+          <a:blip r:embed="rId2"/>
+          <a:stretch>
+            <a:fillRect/>
+          </a:stretch>
+        </p:blipFill>
+        <p:spPr>
+          <a:xfrm>
+            <a:off x="6510528" y="209346"/>
+            <a:ext cx="3795108" cy="3055062"/>
+          </a:xfrm>
+          <a:prstGeom prst="rect">
+            <a:avLst/>
+          </a:prstGeom>
+        </p:spPr>
+      </p:pic>
+      <p:sp>
+        <p:nvSpPr>
+          <p:cNvPr id="19" name="Rectangle 18">
+            <a:extLst>
+              <a:ext uri="{FF2B5EF4-FFF2-40B4-BE49-F238E27FC236}">
+                <a16:creationId xmlns:a16="http://schemas.microsoft.com/office/drawing/2014/main" id="{C87417AF-190E-4D6E-AFA6-7D3E84B0B430}"/>
+              </a:ext>
+              <a:ext uri="{C183D7F6-B498-43B3-948B-1728B52AA6E4}">
+                <adec:decorative xmlns:adec="http://schemas.microsoft.com/office/drawing/2017/decorative" val="1"/>
+              </a:ext>
+            </a:extLst>
+          </p:cNvPr>
+          <p:cNvSpPr>
+            <a:spLocks noGrp="1" noRot="1" noChangeAspect="1" noMove="1" noResize="1" noEditPoints="1" noAdjustHandles="1" noChangeArrowheads="1" noChangeShapeType="1" noTextEdit="1"/>
+          </p:cNvSpPr>
+          <p:nvPr>
+            <p:extLst>
+              <p:ext uri="{386F3935-93C4-4BCD-93E2-E3B085C9AB24}">
+                <p16:designElem xmlns:p16="http://schemas.microsoft.com/office/powerpoint/2015/main" val="1"/>
+              </p:ext>
+            </p:extLst>
+          </p:nvPr>
+        </p:nvSpPr>
+        <p:spPr>
+          <a:xfrm>
+            <a:off x="6431603" y="182859"/>
+            <a:ext cx="3996261" cy="3177496"/>
+          </a:xfrm>
+          <a:prstGeom prst="rect">
+            <a:avLst/>
+          </a:prstGeom>
+          <a:noFill/>
+          <a:ln w="12700">
+            <a:solidFill>
+              <a:schemeClr val="accent2"/>
+            </a:solidFill>
+          </a:ln>
+        </p:spPr>
+        <p:style>
+          <a:lnRef idx="2">
+            <a:schemeClr val="accent1">
+              <a:shade val="50000"/>
+            </a:schemeClr>
+          </a:lnRef>
+          <a:fillRef idx="1">
+            <a:schemeClr val="accent1"/>
+          </a:fillRef>
+          <a:effectRef idx="0">
+            <a:schemeClr val="accent1"/>
+          </a:effectRef>
+          <a:fontRef idx="minor">
+            <a:schemeClr val="lt1"/>
+          </a:fontRef>
+        </p:style>
+        <p:txBody>
+          <a:bodyPr rtlCol="0" anchor="ctr"/>
+          <a:lstStyle/>
+          <a:p>
+            <a:pPr algn="ctr"/>
+            <a:endParaRPr lang="en-US"/>
+          </a:p>
+        </p:txBody>
+      </p:sp>
+      <p:pic>
+        <p:nvPicPr>
+          <p:cNvPr id="5" name="Picture 4">
+            <a:extLst>
+              <a:ext uri="{FF2B5EF4-FFF2-40B4-BE49-F238E27FC236}">
+                <a16:creationId xmlns:a16="http://schemas.microsoft.com/office/drawing/2014/main" id="{1F0C6374-1677-5AFC-4ECE-56342B4C24C6}"/>
+              </a:ext>
+            </a:extLst>
+          </p:cNvPr>
+          <p:cNvPicPr>
+            <a:picLocks noChangeAspect="1"/>
+          </p:cNvPicPr>
+          <p:nvPr/>
+        </p:nvPicPr>
+        <p:blipFill>
+          <a:blip r:embed="rId3"/>
+          <a:stretch>
+            <a:fillRect/>
+          </a:stretch>
+        </p:blipFill>
+        <p:spPr>
+          <a:xfrm>
+            <a:off x="7914692" y="3611880"/>
+            <a:ext cx="3826204" cy="3013136"/>
+          </a:xfrm>
+          <a:prstGeom prst="rect">
+            <a:avLst/>
+          </a:prstGeom>
+        </p:spPr>
+      </p:pic>
+      <p:sp>
+        <p:nvSpPr>
+          <p:cNvPr id="21" name="Rectangle 20">
+            <a:extLst>
+              <a:ext uri="{FF2B5EF4-FFF2-40B4-BE49-F238E27FC236}">
+                <a16:creationId xmlns:a16="http://schemas.microsoft.com/office/drawing/2014/main" id="{80B30ED8-273E-4C07-8568-2FE5CC5C483D}"/>
+              </a:ext>
+              <a:ext uri="{C183D7F6-B498-43B3-948B-1728B52AA6E4}">
+                <adec:decorative xmlns:adec="http://schemas.microsoft.com/office/drawing/2017/decorative" val="1"/>
+              </a:ext>
+            </a:extLst>
+          </p:cNvPr>
+          <p:cNvSpPr>
+            <a:spLocks noGrp="1" noRot="1" noChangeAspect="1" noMove="1" noResize="1" noEditPoints="1" noAdjustHandles="1" noChangeArrowheads="1" noChangeShapeType="1" noTextEdit="1"/>
+          </p:cNvSpPr>
+          <p:nvPr>
+            <p:extLst>
+              <p:ext uri="{386F3935-93C4-4BCD-93E2-E3B085C9AB24}">
+                <p16:designElem xmlns:p16="http://schemas.microsoft.com/office/powerpoint/2015/main" val="1"/>
+              </p:ext>
+            </p:extLst>
+          </p:nvPr>
+        </p:nvSpPr>
+        <p:spPr>
+          <a:xfrm>
+            <a:off x="7825071" y="3543213"/>
+            <a:ext cx="3996261" cy="3177496"/>
+          </a:xfrm>
+          <a:prstGeom prst="rect">
+            <a:avLst/>
+          </a:prstGeom>
+          <a:noFill/>
+          <a:ln w="12700">
+            <a:solidFill>
+              <a:schemeClr val="accent2"/>
+            </a:solidFill>
+          </a:ln>
+        </p:spPr>
+        <p:style>
+          <a:lnRef idx="2">
+            <a:schemeClr val="accent1">
+              <a:shade val="50000"/>
+            </a:schemeClr>
+          </a:lnRef>
+          <a:fillRef idx="1">
+            <a:schemeClr val="accent1"/>
+          </a:fillRef>
+          <a:effectRef idx="0">
+            <a:schemeClr val="accent1"/>
+          </a:effectRef>
+          <a:fontRef idx="minor">
+            <a:schemeClr val="lt1"/>
+          </a:fontRef>
+        </p:style>
+        <p:txBody>
+          <a:bodyPr rtlCol="0" anchor="ctr"/>
+          <a:lstStyle/>
+          <a:p>
+            <a:pPr algn="ctr"/>
+            <a:endParaRPr lang="en-US"/>
+          </a:p>
+        </p:txBody>
+      </p:sp>
+    </p:spTree>
+    <p:extLst>
+      <p:ext uri="{BB962C8B-B14F-4D97-AF65-F5344CB8AC3E}">
+        <p14:creationId xmlns:p14="http://schemas.microsoft.com/office/powerpoint/2010/main" val="1815362434"/>
+      </p:ext>
+    </p:extLst>
+  </p:cSld>
+  <p:clrMapOvr>
+    <a:masterClrMapping/>
+  </p:clrMapOvr>
+</p:sld>
+</file>
+
+<file path=ppt/slides/slide18.xml><?xml version="1.0" encoding="utf-8"?>
 <p:sld xmlns:a="http://schemas.openxmlformats.org/drawingml/2006/main" xmlns:r="http://schemas.openxmlformats.org/officeDocument/2006/relationships" xmlns:p="http://schemas.openxmlformats.org/presentationml/2006/main">
   <p:cSld>
     <p:bg>
@@ -3514,10 +5714,10 @@
       </p:grpSpPr>
       <p:sp useBgFill="1">
         <p:nvSpPr>
-          <p:cNvPr id="10" name="Rectangle 9">
-            <a:extLst>
-              <a:ext uri="{FF2B5EF4-FFF2-40B4-BE49-F238E27FC236}">
-                <a16:creationId xmlns:a16="http://schemas.microsoft.com/office/drawing/2014/main" id="{2B97F24A-32CE-4C1C-A50D-3016B394DCFB}"/>
+          <p:cNvPr id="9" name="Rectangle 8">
+            <a:extLst>
+              <a:ext uri="{FF2B5EF4-FFF2-40B4-BE49-F238E27FC236}">
+                <a16:creationId xmlns:a16="http://schemas.microsoft.com/office/drawing/2014/main" id="{0671A8AE-40A1-4631-A6B8-581AFF065482}"/>
               </a:ext>
               <a:ext uri="{C183D7F6-B498-43B3-948B-1728B52AA6E4}">
                 <adec:decorative xmlns:adec="http://schemas.microsoft.com/office/drawing/2017/decorative" val="1"/>
@@ -3572,392 +5772,12 @@
           </a:p>
         </p:txBody>
       </p:sp>
-      <p:sp>
-        <p:nvSpPr>
-          <p:cNvPr id="2" name="Title 1">
-            <a:extLst>
-              <a:ext uri="{FF2B5EF4-FFF2-40B4-BE49-F238E27FC236}">
-                <a16:creationId xmlns:a16="http://schemas.microsoft.com/office/drawing/2014/main" id="{5EEEA156-003B-415D-2D79-4C462D2BB443}"/>
-              </a:ext>
-            </a:extLst>
-          </p:cNvPr>
-          <p:cNvSpPr>
-            <a:spLocks noGrp="1"/>
-          </p:cNvSpPr>
-          <p:nvPr>
-            <p:ph type="title"/>
-          </p:nvPr>
-        </p:nvSpPr>
-        <p:spPr>
-          <a:xfrm>
-            <a:off x="630936" y="639520"/>
-            <a:ext cx="3429000" cy="1719072"/>
-          </a:xfrm>
-        </p:spPr>
-        <p:txBody>
-          <a:bodyPr anchor="b">
-            <a:normAutofit/>
-          </a:bodyPr>
-          <a:lstStyle/>
-          <a:p>
-            <a:r>
-              <a:rPr lang="en-US" sz="5400"/>
-              <a:t>Initial Features</a:t>
-            </a:r>
-          </a:p>
-        </p:txBody>
-      </p:sp>
-      <p:sp>
-        <p:nvSpPr>
-          <p:cNvPr id="12" name="sketch line">
-            <a:extLst>
-              <a:ext uri="{FF2B5EF4-FFF2-40B4-BE49-F238E27FC236}">
-                <a16:creationId xmlns:a16="http://schemas.microsoft.com/office/drawing/2014/main" id="{CD8B4F24-440B-49E9-B85D-733523DC064B}"/>
-              </a:ext>
-              <a:ext uri="{C183D7F6-B498-43B3-948B-1728B52AA6E4}">
-                <adec:decorative xmlns:adec="http://schemas.microsoft.com/office/drawing/2017/decorative" val="1"/>
-              </a:ext>
-            </a:extLst>
-          </p:cNvPr>
-          <p:cNvSpPr>
-            <a:spLocks noGrp="1" noRot="1" noChangeAspect="1" noMove="1" noResize="1" noEditPoints="1" noAdjustHandles="1" noChangeArrowheads="1" noChangeShapeType="1" noTextEdit="1"/>
-          </p:cNvSpPr>
-          <p:nvPr>
-            <p:extLst>
-              <p:ext uri="{386F3935-93C4-4BCD-93E2-E3B085C9AB24}">
-                <p16:designElem xmlns:p16="http://schemas.microsoft.com/office/powerpoint/2015/main" val="1"/>
-              </p:ext>
-            </p:extLst>
-          </p:nvPr>
-        </p:nvSpPr>
-        <p:spPr>
-          <a:xfrm>
-            <a:off x="643278" y="2573756"/>
-            <a:ext cx="3255095" cy="18288"/>
-          </a:xfrm>
-          <a:custGeom>
-            <a:avLst/>
-            <a:gdLst>
-              <a:gd name="connsiteX0" fmla="*/ 0 w 3255095"/>
-              <a:gd name="connsiteY0" fmla="*/ 0 h 18288"/>
-              <a:gd name="connsiteX1" fmla="*/ 618468 w 3255095"/>
-              <a:gd name="connsiteY1" fmla="*/ 0 h 18288"/>
-              <a:gd name="connsiteX2" fmla="*/ 1269487 w 3255095"/>
-              <a:gd name="connsiteY2" fmla="*/ 0 h 18288"/>
-              <a:gd name="connsiteX3" fmla="*/ 1953057 w 3255095"/>
-              <a:gd name="connsiteY3" fmla="*/ 0 h 18288"/>
-              <a:gd name="connsiteX4" fmla="*/ 2636627 w 3255095"/>
-              <a:gd name="connsiteY4" fmla="*/ 0 h 18288"/>
-              <a:gd name="connsiteX5" fmla="*/ 3255095 w 3255095"/>
-              <a:gd name="connsiteY5" fmla="*/ 0 h 18288"/>
-              <a:gd name="connsiteX6" fmla="*/ 3255095 w 3255095"/>
-              <a:gd name="connsiteY6" fmla="*/ 18288 h 18288"/>
-              <a:gd name="connsiteX7" fmla="*/ 2538974 w 3255095"/>
-              <a:gd name="connsiteY7" fmla="*/ 18288 h 18288"/>
-              <a:gd name="connsiteX8" fmla="*/ 1822853 w 3255095"/>
-              <a:gd name="connsiteY8" fmla="*/ 18288 h 18288"/>
-              <a:gd name="connsiteX9" fmla="*/ 1171834 w 3255095"/>
-              <a:gd name="connsiteY9" fmla="*/ 18288 h 18288"/>
-              <a:gd name="connsiteX10" fmla="*/ 0 w 3255095"/>
-              <a:gd name="connsiteY10" fmla="*/ 18288 h 18288"/>
-              <a:gd name="connsiteX11" fmla="*/ 0 w 3255095"/>
-              <a:gd name="connsiteY11" fmla="*/ 0 h 18288"/>
-            </a:gdLst>
-            <a:ahLst/>
-            <a:cxnLst>
-              <a:cxn ang="0">
-                <a:pos x="connsiteX0" y="connsiteY0"/>
-              </a:cxn>
-              <a:cxn ang="0">
-                <a:pos x="connsiteX1" y="connsiteY1"/>
-              </a:cxn>
-              <a:cxn ang="0">
-                <a:pos x="connsiteX2" y="connsiteY2"/>
-              </a:cxn>
-              <a:cxn ang="0">
-                <a:pos x="connsiteX3" y="connsiteY3"/>
-              </a:cxn>
-              <a:cxn ang="0">
-                <a:pos x="connsiteX4" y="connsiteY4"/>
-              </a:cxn>
-              <a:cxn ang="0">
-                <a:pos x="connsiteX5" y="connsiteY5"/>
-              </a:cxn>
-              <a:cxn ang="0">
-                <a:pos x="connsiteX6" y="connsiteY6"/>
-              </a:cxn>
-              <a:cxn ang="0">
-                <a:pos x="connsiteX7" y="connsiteY7"/>
-              </a:cxn>
-              <a:cxn ang="0">
-                <a:pos x="connsiteX8" y="connsiteY8"/>
-              </a:cxn>
-              <a:cxn ang="0">
-                <a:pos x="connsiteX9" y="connsiteY9"/>
-              </a:cxn>
-              <a:cxn ang="0">
-                <a:pos x="connsiteX10" y="connsiteY10"/>
-              </a:cxn>
-              <a:cxn ang="0">
-                <a:pos x="connsiteX11" y="connsiteY11"/>
-              </a:cxn>
-            </a:cxnLst>
-            <a:rect l="l" t="t" r="r" b="b"/>
-            <a:pathLst>
-              <a:path w="3255095" h="18288" fill="none" extrusionOk="0">
-                <a:moveTo>
-                  <a:pt x="0" y="0"/>
-                </a:moveTo>
-                <a:cubicBezTo>
-                  <a:pt x="240201" y="-22123"/>
-                  <a:pt x="462021" y="-19623"/>
-                  <a:pt x="618468" y="0"/>
-                </a:cubicBezTo>
-                <a:cubicBezTo>
-                  <a:pt x="774915" y="19623"/>
-                  <a:pt x="974734" y="2035"/>
-                  <a:pt x="1269487" y="0"/>
-                </a:cubicBezTo>
-                <a:cubicBezTo>
-                  <a:pt x="1564240" y="-2035"/>
-                  <a:pt x="1733579" y="10639"/>
-                  <a:pt x="1953057" y="0"/>
-                </a:cubicBezTo>
-                <a:cubicBezTo>
-                  <a:pt x="2172535" y="-10639"/>
-                  <a:pt x="2453962" y="14018"/>
-                  <a:pt x="2636627" y="0"/>
-                </a:cubicBezTo>
-                <a:cubicBezTo>
-                  <a:pt x="2819292" y="-14018"/>
-                  <a:pt x="3121375" y="5399"/>
-                  <a:pt x="3255095" y="0"/>
-                </a:cubicBezTo>
-                <a:cubicBezTo>
-                  <a:pt x="3254386" y="8157"/>
-                  <a:pt x="3254682" y="12125"/>
-                  <a:pt x="3255095" y="18288"/>
-                </a:cubicBezTo>
-                <a:cubicBezTo>
-                  <a:pt x="3088545" y="23203"/>
-                  <a:pt x="2687475" y="7419"/>
-                  <a:pt x="2538974" y="18288"/>
-                </a:cubicBezTo>
-                <a:cubicBezTo>
-                  <a:pt x="2390473" y="29157"/>
-                  <a:pt x="2137381" y="-8959"/>
-                  <a:pt x="1822853" y="18288"/>
-                </a:cubicBezTo>
-                <a:cubicBezTo>
-                  <a:pt x="1508325" y="45535"/>
-                  <a:pt x="1466437" y="20385"/>
-                  <a:pt x="1171834" y="18288"/>
-                </a:cubicBezTo>
-                <a:cubicBezTo>
-                  <a:pt x="877231" y="16191"/>
-                  <a:pt x="561097" y="37643"/>
-                  <a:pt x="0" y="18288"/>
-                </a:cubicBezTo>
-                <a:cubicBezTo>
-                  <a:pt x="-46" y="12483"/>
-                  <a:pt x="-203" y="6491"/>
-                  <a:pt x="0" y="0"/>
-                </a:cubicBezTo>
-                <a:close/>
-              </a:path>
-              <a:path w="3255095" h="18288" stroke="0" extrusionOk="0">
-                <a:moveTo>
-                  <a:pt x="0" y="0"/>
-                </a:moveTo>
-                <a:cubicBezTo>
-                  <a:pt x="291965" y="19429"/>
-                  <a:pt x="363155" y="8568"/>
-                  <a:pt x="618468" y="0"/>
-                </a:cubicBezTo>
-                <a:cubicBezTo>
-                  <a:pt x="873781" y="-8568"/>
-                  <a:pt x="904459" y="-19505"/>
-                  <a:pt x="1171834" y="0"/>
-                </a:cubicBezTo>
-                <a:cubicBezTo>
-                  <a:pt x="1439209" y="19505"/>
-                  <a:pt x="1744369" y="9790"/>
-                  <a:pt x="1887955" y="0"/>
-                </a:cubicBezTo>
-                <a:cubicBezTo>
-                  <a:pt x="2031541" y="-9790"/>
-                  <a:pt x="2346378" y="21240"/>
-                  <a:pt x="2506423" y="0"/>
-                </a:cubicBezTo>
-                <a:cubicBezTo>
-                  <a:pt x="2666468" y="-21240"/>
-                  <a:pt x="2990257" y="30414"/>
-                  <a:pt x="3255095" y="0"/>
-                </a:cubicBezTo>
-                <a:cubicBezTo>
-                  <a:pt x="3254831" y="4493"/>
-                  <a:pt x="3255479" y="9472"/>
-                  <a:pt x="3255095" y="18288"/>
-                </a:cubicBezTo>
-                <a:cubicBezTo>
-                  <a:pt x="3120743" y="16690"/>
-                  <a:pt x="2759628" y="42462"/>
-                  <a:pt x="2604076" y="18288"/>
-                </a:cubicBezTo>
-                <a:cubicBezTo>
-                  <a:pt x="2448524" y="-5886"/>
-                  <a:pt x="2184336" y="19599"/>
-                  <a:pt x="1887955" y="18288"/>
-                </a:cubicBezTo>
-                <a:cubicBezTo>
-                  <a:pt x="1591574" y="16977"/>
-                  <a:pt x="1548845" y="6870"/>
-                  <a:pt x="1334589" y="18288"/>
-                </a:cubicBezTo>
-                <a:cubicBezTo>
-                  <a:pt x="1120333" y="29706"/>
-                  <a:pt x="996014" y="9662"/>
-                  <a:pt x="683570" y="18288"/>
-                </a:cubicBezTo>
-                <a:cubicBezTo>
-                  <a:pt x="371126" y="26914"/>
-                  <a:pt x="198687" y="16167"/>
-                  <a:pt x="0" y="18288"/>
-                </a:cubicBezTo>
-                <a:cubicBezTo>
-                  <a:pt x="843" y="9577"/>
-                  <a:pt x="371" y="6900"/>
-                  <a:pt x="0" y="0"/>
-                </a:cubicBezTo>
-                <a:close/>
-              </a:path>
-            </a:pathLst>
-          </a:custGeom>
-          <a:solidFill>
-            <a:schemeClr val="accent2"/>
-          </a:solidFill>
-          <a:ln w="38100" cap="rnd">
-            <a:solidFill>
-              <a:schemeClr val="accent2"/>
-            </a:solidFill>
-            <a:round/>
-            <a:extLst>
-              <a:ext uri="{C807C97D-BFC1-408E-A445-0C87EB9F89A2}">
-                <ask:lineSketchStyleProps xmlns:ask="http://schemas.microsoft.com/office/drawing/2018/sketchyshapes" sd="1219033472">
-                  <a:prstGeom prst="rect">
-                    <a:avLst/>
-                  </a:prstGeom>
-                  <ask:type>
-                    <ask:lineSketchFreehand/>
-                  </ask:type>
-                </ask:lineSketchStyleProps>
-              </a:ext>
-            </a:extLst>
-          </a:ln>
-        </p:spPr>
-        <p:style>
-          <a:lnRef idx="2">
-            <a:schemeClr val="accent1">
-              <a:shade val="50000"/>
-            </a:schemeClr>
-          </a:lnRef>
-          <a:fillRef idx="1">
-            <a:schemeClr val="accent1"/>
-          </a:fillRef>
-          <a:effectRef idx="0">
-            <a:schemeClr val="accent1"/>
-          </a:effectRef>
-          <a:fontRef idx="minor">
-            <a:schemeClr val="lt1"/>
-          </a:fontRef>
-        </p:style>
-        <p:txBody>
-          <a:bodyPr rtlCol="0" anchor="ctr"/>
-          <a:lstStyle/>
-          <a:p>
-            <a:pPr algn="ctr"/>
-            <a:endParaRPr lang="en-US"/>
-          </a:p>
-        </p:txBody>
-      </p:sp>
-      <p:sp>
-        <p:nvSpPr>
-          <p:cNvPr id="3" name="Content Placeholder 2">
-            <a:extLst>
-              <a:ext uri="{FF2B5EF4-FFF2-40B4-BE49-F238E27FC236}">
-                <a16:creationId xmlns:a16="http://schemas.microsoft.com/office/drawing/2014/main" id="{1F27E5F0-B728-B255-3D56-EEF04EACEF13}"/>
-              </a:ext>
-            </a:extLst>
-          </p:cNvPr>
-          <p:cNvSpPr>
-            <a:spLocks noGrp="1"/>
-          </p:cNvSpPr>
-          <p:nvPr>
-            <p:ph idx="1"/>
-          </p:nvPr>
-        </p:nvSpPr>
-        <p:spPr>
-          <a:xfrm>
-            <a:off x="630936" y="2807208"/>
-            <a:ext cx="3429000" cy="3410712"/>
-          </a:xfrm>
-        </p:spPr>
-        <p:txBody>
-          <a:bodyPr anchor="t">
-            <a:normAutofit/>
-          </a:bodyPr>
-          <a:lstStyle/>
-          <a:p>
-            <a:pPr marL="0" indent="0">
-              <a:buNone/>
-            </a:pPr>
-            <a:r>
-              <a:rPr lang="en-US" sz="2200" b="0" i="0" dirty="0">
-                <a:effectLst/>
-                <a:latin typeface="Arial" panose="020B0604020202020204" pitchFamily="34" charset="0"/>
-              </a:rPr>
-              <a:t>1. Set Starting Balance</a:t>
-            </a:r>
-            <a:br>
-              <a:rPr lang="en-US" sz="2200" dirty="0"/>
-            </a:br>
-            <a:r>
-              <a:rPr lang="en-US" sz="2200" b="0" i="0" dirty="0">
-                <a:effectLst/>
-                <a:latin typeface="Arial" panose="020B0604020202020204" pitchFamily="34" charset="0"/>
-              </a:rPr>
-              <a:t>2. Add Expenses</a:t>
-            </a:r>
-            <a:br>
-              <a:rPr lang="en-US" sz="2200" dirty="0"/>
-            </a:br>
-            <a:r>
-              <a:rPr lang="en-US" sz="2200" b="0" i="0" dirty="0">
-                <a:effectLst/>
-                <a:latin typeface="Arial" panose="020B0604020202020204" pitchFamily="34" charset="0"/>
-              </a:rPr>
-              <a:t>3. Add Savings</a:t>
-            </a:r>
-            <a:br>
-              <a:rPr lang="en-US" sz="2200" dirty="0"/>
-            </a:br>
-            <a:r>
-              <a:rPr lang="en-US" sz="2200" b="0" i="0" dirty="0">
-                <a:effectLst/>
-                <a:latin typeface="Arial" panose="020B0604020202020204" pitchFamily="34" charset="0"/>
-              </a:rPr>
-              <a:t>4. Query Entries</a:t>
-            </a:r>
-            <a:endParaRPr lang="en-US" sz="2200" dirty="0"/>
-          </a:p>
-        </p:txBody>
-      </p:sp>
       <p:pic>
         <p:nvPicPr>
-          <p:cNvPr id="5" name="Picture 4" descr="A screenshot of a computer&#10;&#10;Description automatically generated">
-            <a:extLst>
-              <a:ext uri="{FF2B5EF4-FFF2-40B4-BE49-F238E27FC236}">
-                <a16:creationId xmlns:a16="http://schemas.microsoft.com/office/drawing/2014/main" id="{3769C757-4162-24C1-CF3E-2233C81AA38E}"/>
+          <p:cNvPr id="5" name="Picture 4" descr="Data concept">
+            <a:extLst>
+              <a:ext uri="{FF2B5EF4-FFF2-40B4-BE49-F238E27FC236}">
+                <a16:creationId xmlns:a16="http://schemas.microsoft.com/office/drawing/2014/main" id="{C1A49C8A-B6CB-A221-B18F-7A4DECC51937}"/>
               </a:ext>
             </a:extLst>
           </p:cNvPr>
@@ -3968,64 +5788,25 @@
         </p:nvPicPr>
         <p:blipFill>
           <a:blip r:embed="rId2"/>
-          <a:stretch>
-            <a:fillRect/>
-          </a:stretch>
+          <a:srcRect r="13812" b="9085"/>
+          <a:stretch/>
         </p:blipFill>
         <p:spPr>
           <a:xfrm>
-            <a:off x="4654296" y="658882"/>
-            <a:ext cx="6903720" cy="5540235"/>
+            <a:off x="3523488" y="10"/>
+            <a:ext cx="8668512" cy="6857990"/>
           </a:xfrm>
           <a:prstGeom prst="rect">
             <a:avLst/>
           </a:prstGeom>
         </p:spPr>
       </p:pic>
-    </p:spTree>
-    <p:extLst>
-      <p:ext uri="{BB962C8B-B14F-4D97-AF65-F5344CB8AC3E}">
-        <p14:creationId xmlns:p14="http://schemas.microsoft.com/office/powerpoint/2010/main" val="650191438"/>
-      </p:ext>
-    </p:extLst>
-  </p:cSld>
-  <p:clrMapOvr>
-    <a:masterClrMapping/>
-  </p:clrMapOvr>
-</p:sld>
-</file>
-
-<file path=ppt/slides/slide4.xml><?xml version="1.0" encoding="utf-8"?>
-<p:sld xmlns:a="http://schemas.openxmlformats.org/drawingml/2006/main" xmlns:r="http://schemas.openxmlformats.org/officeDocument/2006/relationships" xmlns:p="http://schemas.openxmlformats.org/presentationml/2006/main">
-  <p:cSld>
-    <p:bg>
-      <p:bgPr>
-        <a:solidFill>
-          <a:schemeClr val="bg1"/>
-        </a:solidFill>
-        <a:effectLst/>
-      </p:bgPr>
-    </p:bg>
-    <p:spTree>
-      <p:nvGrpSpPr>
-        <p:cNvPr id="1" name=""/>
-        <p:cNvGrpSpPr/>
-        <p:nvPr/>
-      </p:nvGrpSpPr>
-      <p:grpSpPr>
-        <a:xfrm>
-          <a:off x="0" y="0"/>
-          <a:ext cx="0" cy="0"/>
-          <a:chOff x="0" y="0"/>
-          <a:chExt cx="0" cy="0"/>
-        </a:xfrm>
-      </p:grpSpPr>
-      <p:sp useBgFill="1">
-        <p:nvSpPr>
-          <p:cNvPr id="10" name="Rectangle 9">
-            <a:extLst>
-              <a:ext uri="{FF2B5EF4-FFF2-40B4-BE49-F238E27FC236}">
-                <a16:creationId xmlns:a16="http://schemas.microsoft.com/office/drawing/2014/main" id="{2B97F24A-32CE-4C1C-A50D-3016B394DCFB}"/>
+      <p:sp>
+        <p:nvSpPr>
+          <p:cNvPr id="11" name="Rectangle 10">
+            <a:extLst>
+              <a:ext uri="{FF2B5EF4-FFF2-40B4-BE49-F238E27FC236}">
+                <a16:creationId xmlns:a16="http://schemas.microsoft.com/office/drawing/2014/main" id="{AB58EF07-17C2-48CF-ABB0-EEF1F17CB8F0}"/>
               </a:ext>
               <a:ext uri="{C183D7F6-B498-43B3-948B-1728B52AA6E4}">
                 <adec:decorative xmlns:adec="http://schemas.microsoft.com/office/drawing/2017/decorative" val="1"/>
@@ -4045,12 +5826,33 @@
         </p:nvSpPr>
         <p:spPr>
           <a:xfrm>
-            <a:off x="0" y="0"/>
-            <a:ext cx="12192000" cy="6858000"/>
+            <a:off x="3" y="0"/>
+            <a:ext cx="9339206" cy="6858000"/>
           </a:xfrm>
           <a:prstGeom prst="rect">
             <a:avLst/>
           </a:prstGeom>
+          <a:gradFill>
+            <a:gsLst>
+              <a:gs pos="58000">
+                <a:schemeClr val="tx1"/>
+              </a:gs>
+              <a:gs pos="33000">
+                <a:schemeClr val="tx1">
+                  <a:alpha val="64000"/>
+                </a:schemeClr>
+              </a:gs>
+              <a:gs pos="0">
+                <a:schemeClr val="tx1">
+                  <a:alpha val="0"/>
+                </a:schemeClr>
+              </a:gs>
+              <a:gs pos="100000">
+                <a:schemeClr val="tx1"/>
+              </a:gs>
+            </a:gsLst>
+            <a:lin ang="10800000" scaled="0"/>
+          </a:gradFill>
           <a:ln>
             <a:noFill/>
           </a:ln>
@@ -4076,7 +5878,7 @@
           <a:lstStyle/>
           <a:p>
             <a:pPr algn="ctr"/>
-            <a:endParaRPr lang="en-US"/>
+            <a:endParaRPr lang="en-US" dirty="0"/>
           </a:p>
         </p:txBody>
       </p:sp>
@@ -4085,7 +5887,7 @@
           <p:cNvPr id="2" name="Title 1">
             <a:extLst>
               <a:ext uri="{FF2B5EF4-FFF2-40B4-BE49-F238E27FC236}">
-                <a16:creationId xmlns:a16="http://schemas.microsoft.com/office/drawing/2014/main" id="{8870F612-2A50-AC04-8B99-DE64831CD9E0}"/>
+                <a16:creationId xmlns:a16="http://schemas.microsoft.com/office/drawing/2014/main" id="{88169A5B-2F8C-03E5-3BA6-4FF8D5AE1E6E}"/>
               </a:ext>
             </a:extLst>
           </p:cNvPr>
@@ -4098,29 +5900,33 @@
         </p:nvSpPr>
         <p:spPr>
           <a:xfrm>
-            <a:off x="630936" y="639520"/>
-            <a:ext cx="3429000" cy="1719072"/>
+            <a:off x="477981" y="1122363"/>
+            <a:ext cx="4023360" cy="3204134"/>
           </a:xfrm>
         </p:spPr>
         <p:txBody>
-          <a:bodyPr anchor="b">
+          <a:bodyPr vert="horz" lIns="91440" tIns="45720" rIns="91440" bIns="45720" rtlCol="0" anchor="b">
             <a:normAutofit/>
           </a:bodyPr>
           <a:lstStyle/>
           <a:p>
             <a:r>
-              <a:rPr lang="en-US" sz="5400"/>
-              <a:t>New Features</a:t>
-            </a:r>
-          </a:p>
-        </p:txBody>
-      </p:sp>
-      <p:sp>
-        <p:nvSpPr>
-          <p:cNvPr id="12" name="sketch line">
-            <a:extLst>
-              <a:ext uri="{FF2B5EF4-FFF2-40B4-BE49-F238E27FC236}">
-                <a16:creationId xmlns:a16="http://schemas.microsoft.com/office/drawing/2014/main" id="{CD8B4F24-440B-49E9-B85D-733523DC064B}"/>
+              <a:rPr lang="en-US" sz="4800">
+                <a:solidFill>
+                  <a:schemeClr val="bg1"/>
+                </a:solidFill>
+              </a:rPr>
+              <a:t>Code Demo</a:t>
+            </a:r>
+          </a:p>
+        </p:txBody>
+      </p:sp>
+      <p:sp>
+        <p:nvSpPr>
+          <p:cNvPr id="13" name="Rectangle 12">
+            <a:extLst>
+              <a:ext uri="{FF2B5EF4-FFF2-40B4-BE49-F238E27FC236}">
+                <a16:creationId xmlns:a16="http://schemas.microsoft.com/office/drawing/2014/main" id="{AF2F604E-43BE-4DC3-B983-E071523364F8}"/>
               </a:ext>
               <a:ext uri="{C183D7F6-B498-43B3-948B-1728B52AA6E4}">
                 <adec:decorative xmlns:adec="http://schemas.microsoft.com/office/drawing/2017/decorative" val="1"/>
@@ -4139,398 +5945,16 @@
           </p:nvPr>
         </p:nvSpPr>
         <p:spPr>
-          <a:xfrm>
-            <a:off x="643278" y="2573756"/>
-            <a:ext cx="3255095" cy="18288"/>
-          </a:xfrm>
-          <a:custGeom>
-            <a:avLst/>
-            <a:gdLst>
-              <a:gd name="connsiteX0" fmla="*/ 0 w 3255095"/>
-              <a:gd name="connsiteY0" fmla="*/ 0 h 18288"/>
-              <a:gd name="connsiteX1" fmla="*/ 618468 w 3255095"/>
-              <a:gd name="connsiteY1" fmla="*/ 0 h 18288"/>
-              <a:gd name="connsiteX2" fmla="*/ 1269487 w 3255095"/>
-              <a:gd name="connsiteY2" fmla="*/ 0 h 18288"/>
-              <a:gd name="connsiteX3" fmla="*/ 1953057 w 3255095"/>
-              <a:gd name="connsiteY3" fmla="*/ 0 h 18288"/>
-              <a:gd name="connsiteX4" fmla="*/ 2636627 w 3255095"/>
-              <a:gd name="connsiteY4" fmla="*/ 0 h 18288"/>
-              <a:gd name="connsiteX5" fmla="*/ 3255095 w 3255095"/>
-              <a:gd name="connsiteY5" fmla="*/ 0 h 18288"/>
-              <a:gd name="connsiteX6" fmla="*/ 3255095 w 3255095"/>
-              <a:gd name="connsiteY6" fmla="*/ 18288 h 18288"/>
-              <a:gd name="connsiteX7" fmla="*/ 2538974 w 3255095"/>
-              <a:gd name="connsiteY7" fmla="*/ 18288 h 18288"/>
-              <a:gd name="connsiteX8" fmla="*/ 1822853 w 3255095"/>
-              <a:gd name="connsiteY8" fmla="*/ 18288 h 18288"/>
-              <a:gd name="connsiteX9" fmla="*/ 1171834 w 3255095"/>
-              <a:gd name="connsiteY9" fmla="*/ 18288 h 18288"/>
-              <a:gd name="connsiteX10" fmla="*/ 0 w 3255095"/>
-              <a:gd name="connsiteY10" fmla="*/ 18288 h 18288"/>
-              <a:gd name="connsiteX11" fmla="*/ 0 w 3255095"/>
-              <a:gd name="connsiteY11" fmla="*/ 0 h 18288"/>
-            </a:gdLst>
-            <a:ahLst/>
-            <a:cxnLst>
-              <a:cxn ang="0">
-                <a:pos x="connsiteX0" y="connsiteY0"/>
-              </a:cxn>
-              <a:cxn ang="0">
-                <a:pos x="connsiteX1" y="connsiteY1"/>
-              </a:cxn>
-              <a:cxn ang="0">
-                <a:pos x="connsiteX2" y="connsiteY2"/>
-              </a:cxn>
-              <a:cxn ang="0">
-                <a:pos x="connsiteX3" y="connsiteY3"/>
-              </a:cxn>
-              <a:cxn ang="0">
-                <a:pos x="connsiteX4" y="connsiteY4"/>
-              </a:cxn>
-              <a:cxn ang="0">
-                <a:pos x="connsiteX5" y="connsiteY5"/>
-              </a:cxn>
-              <a:cxn ang="0">
-                <a:pos x="connsiteX6" y="connsiteY6"/>
-              </a:cxn>
-              <a:cxn ang="0">
-                <a:pos x="connsiteX7" y="connsiteY7"/>
-              </a:cxn>
-              <a:cxn ang="0">
-                <a:pos x="connsiteX8" y="connsiteY8"/>
-              </a:cxn>
-              <a:cxn ang="0">
-                <a:pos x="connsiteX9" y="connsiteY9"/>
-              </a:cxn>
-              <a:cxn ang="0">
-                <a:pos x="connsiteX10" y="connsiteY10"/>
-              </a:cxn>
-              <a:cxn ang="0">
-                <a:pos x="connsiteX11" y="connsiteY11"/>
-              </a:cxn>
-            </a:cxnLst>
-            <a:rect l="l" t="t" r="r" b="b"/>
-            <a:pathLst>
-              <a:path w="3255095" h="18288" fill="none" extrusionOk="0">
-                <a:moveTo>
-                  <a:pt x="0" y="0"/>
-                </a:moveTo>
-                <a:cubicBezTo>
-                  <a:pt x="240201" y="-22123"/>
-                  <a:pt x="462021" y="-19623"/>
-                  <a:pt x="618468" y="0"/>
-                </a:cubicBezTo>
-                <a:cubicBezTo>
-                  <a:pt x="774915" y="19623"/>
-                  <a:pt x="974734" y="2035"/>
-                  <a:pt x="1269487" y="0"/>
-                </a:cubicBezTo>
-                <a:cubicBezTo>
-                  <a:pt x="1564240" y="-2035"/>
-                  <a:pt x="1733579" y="10639"/>
-                  <a:pt x="1953057" y="0"/>
-                </a:cubicBezTo>
-                <a:cubicBezTo>
-                  <a:pt x="2172535" y="-10639"/>
-                  <a:pt x="2453962" y="14018"/>
-                  <a:pt x="2636627" y="0"/>
-                </a:cubicBezTo>
-                <a:cubicBezTo>
-                  <a:pt x="2819292" y="-14018"/>
-                  <a:pt x="3121375" y="5399"/>
-                  <a:pt x="3255095" y="0"/>
-                </a:cubicBezTo>
-                <a:cubicBezTo>
-                  <a:pt x="3254386" y="8157"/>
-                  <a:pt x="3254682" y="12125"/>
-                  <a:pt x="3255095" y="18288"/>
-                </a:cubicBezTo>
-                <a:cubicBezTo>
-                  <a:pt x="3088545" y="23203"/>
-                  <a:pt x="2687475" y="7419"/>
-                  <a:pt x="2538974" y="18288"/>
-                </a:cubicBezTo>
-                <a:cubicBezTo>
-                  <a:pt x="2390473" y="29157"/>
-                  <a:pt x="2137381" y="-8959"/>
-                  <a:pt x="1822853" y="18288"/>
-                </a:cubicBezTo>
-                <a:cubicBezTo>
-                  <a:pt x="1508325" y="45535"/>
-                  <a:pt x="1466437" y="20385"/>
-                  <a:pt x="1171834" y="18288"/>
-                </a:cubicBezTo>
-                <a:cubicBezTo>
-                  <a:pt x="877231" y="16191"/>
-                  <a:pt x="561097" y="37643"/>
-                  <a:pt x="0" y="18288"/>
-                </a:cubicBezTo>
-                <a:cubicBezTo>
-                  <a:pt x="-46" y="12483"/>
-                  <a:pt x="-203" y="6491"/>
-                  <a:pt x="0" y="0"/>
-                </a:cubicBezTo>
-                <a:close/>
-              </a:path>
-              <a:path w="3255095" h="18288" stroke="0" extrusionOk="0">
-                <a:moveTo>
-                  <a:pt x="0" y="0"/>
-                </a:moveTo>
-                <a:cubicBezTo>
-                  <a:pt x="291965" y="19429"/>
-                  <a:pt x="363155" y="8568"/>
-                  <a:pt x="618468" y="0"/>
-                </a:cubicBezTo>
-                <a:cubicBezTo>
-                  <a:pt x="873781" y="-8568"/>
-                  <a:pt x="904459" y="-19505"/>
-                  <a:pt x="1171834" y="0"/>
-                </a:cubicBezTo>
-                <a:cubicBezTo>
-                  <a:pt x="1439209" y="19505"/>
-                  <a:pt x="1744369" y="9790"/>
-                  <a:pt x="1887955" y="0"/>
-                </a:cubicBezTo>
-                <a:cubicBezTo>
-                  <a:pt x="2031541" y="-9790"/>
-                  <a:pt x="2346378" y="21240"/>
-                  <a:pt x="2506423" y="0"/>
-                </a:cubicBezTo>
-                <a:cubicBezTo>
-                  <a:pt x="2666468" y="-21240"/>
-                  <a:pt x="2990257" y="30414"/>
-                  <a:pt x="3255095" y="0"/>
-                </a:cubicBezTo>
-                <a:cubicBezTo>
-                  <a:pt x="3254831" y="4493"/>
-                  <a:pt x="3255479" y="9472"/>
-                  <a:pt x="3255095" y="18288"/>
-                </a:cubicBezTo>
-                <a:cubicBezTo>
-                  <a:pt x="3120743" y="16690"/>
-                  <a:pt x="2759628" y="42462"/>
-                  <a:pt x="2604076" y="18288"/>
-                </a:cubicBezTo>
-                <a:cubicBezTo>
-                  <a:pt x="2448524" y="-5886"/>
-                  <a:pt x="2184336" y="19599"/>
-                  <a:pt x="1887955" y="18288"/>
-                </a:cubicBezTo>
-                <a:cubicBezTo>
-                  <a:pt x="1591574" y="16977"/>
-                  <a:pt x="1548845" y="6870"/>
-                  <a:pt x="1334589" y="18288"/>
-                </a:cubicBezTo>
-                <a:cubicBezTo>
-                  <a:pt x="1120333" y="29706"/>
-                  <a:pt x="996014" y="9662"/>
-                  <a:pt x="683570" y="18288"/>
-                </a:cubicBezTo>
-                <a:cubicBezTo>
-                  <a:pt x="371126" y="26914"/>
-                  <a:pt x="198687" y="16167"/>
-                  <a:pt x="0" y="18288"/>
-                </a:cubicBezTo>
-                <a:cubicBezTo>
-                  <a:pt x="843" y="9577"/>
-                  <a:pt x="371" y="6900"/>
-                  <a:pt x="0" y="0"/>
-                </a:cubicBezTo>
-                <a:close/>
-              </a:path>
-            </a:pathLst>
-          </a:custGeom>
-          <a:solidFill>
-            <a:schemeClr val="accent2"/>
-          </a:solidFill>
-          <a:ln w="38100" cap="rnd">
-            <a:solidFill>
-              <a:schemeClr val="accent2"/>
-            </a:solidFill>
-            <a:round/>
-            <a:extLst>
-              <a:ext uri="{C807C97D-BFC1-408E-A445-0C87EB9F89A2}">
-                <ask:lineSketchStyleProps xmlns:ask="http://schemas.microsoft.com/office/drawing/2018/sketchyshapes" sd="1219033472">
-                  <a:prstGeom prst="rect">
-                    <a:avLst/>
-                  </a:prstGeom>
-                  <ask:type>
-                    <ask:lineSketchFreehand/>
-                  </ask:type>
-                </ask:lineSketchStyleProps>
-              </a:ext>
-            </a:extLst>
-          </a:ln>
-        </p:spPr>
-        <p:style>
-          <a:lnRef idx="2">
-            <a:schemeClr val="accent1">
-              <a:shade val="50000"/>
-            </a:schemeClr>
-          </a:lnRef>
-          <a:fillRef idx="1">
-            <a:schemeClr val="accent1"/>
-          </a:fillRef>
-          <a:effectRef idx="0">
-            <a:schemeClr val="accent1"/>
-          </a:effectRef>
-          <a:fontRef idx="minor">
-            <a:schemeClr val="lt1"/>
-          </a:fontRef>
-        </p:style>
-        <p:txBody>
-          <a:bodyPr rtlCol="0" anchor="ctr"/>
-          <a:lstStyle/>
-          <a:p>
-            <a:pPr algn="ctr"/>
-            <a:endParaRPr lang="en-US"/>
-          </a:p>
-        </p:txBody>
-      </p:sp>
-      <p:sp>
-        <p:nvSpPr>
-          <p:cNvPr id="3" name="Content Placeholder 2">
-            <a:extLst>
-              <a:ext uri="{FF2B5EF4-FFF2-40B4-BE49-F238E27FC236}">
-                <a16:creationId xmlns:a16="http://schemas.microsoft.com/office/drawing/2014/main" id="{8504411F-07A5-93C3-216D-DD94A0389255}"/>
-              </a:ext>
-            </a:extLst>
-          </p:cNvPr>
-          <p:cNvSpPr>
-            <a:spLocks noGrp="1"/>
-          </p:cNvSpPr>
-          <p:nvPr>
-            <p:ph idx="1"/>
-          </p:nvPr>
-        </p:nvSpPr>
-        <p:spPr>
-          <a:xfrm>
-            <a:off x="630936" y="2807208"/>
-            <a:ext cx="3429000" cy="3410712"/>
-          </a:xfrm>
-        </p:spPr>
-        <p:txBody>
-          <a:bodyPr anchor="t">
-            <a:normAutofit/>
-          </a:bodyPr>
-          <a:lstStyle/>
-          <a:p>
-            <a:pPr marL="0" indent="0">
-              <a:buNone/>
-            </a:pPr>
-            <a:r>
-              <a:rPr lang="en-US" sz="2200" dirty="0"/>
-              <a:t>Dark Mode</a:t>
-            </a:r>
-          </a:p>
-          <a:p>
-            <a:r>
-              <a:rPr lang="en-US" sz="2200" dirty="0"/>
-              <a:t>Adds functionality to change the color palate of the program</a:t>
-            </a:r>
-          </a:p>
-        </p:txBody>
-      </p:sp>
-      <p:pic>
-        <p:nvPicPr>
-          <p:cNvPr id="5" name="Picture 4">
-            <a:extLst>
-              <a:ext uri="{FF2B5EF4-FFF2-40B4-BE49-F238E27FC236}">
-                <a16:creationId xmlns:a16="http://schemas.microsoft.com/office/drawing/2014/main" id="{7E14FB3B-39BE-FA10-C8FF-0C96FE871BEB}"/>
-              </a:ext>
-            </a:extLst>
-          </p:cNvPr>
-          <p:cNvPicPr>
-            <a:picLocks noChangeAspect="1"/>
-          </p:cNvPicPr>
-          <p:nvPr/>
-        </p:nvPicPr>
-        <p:blipFill>
-          <a:blip r:embed="rId2"/>
-          <a:stretch>
-            <a:fillRect/>
-          </a:stretch>
-        </p:blipFill>
-        <p:spPr>
-          <a:xfrm>
-            <a:off x="4654296" y="650253"/>
-            <a:ext cx="6903720" cy="5557494"/>
+          <a:xfrm rot="5400000">
+            <a:off x="759921" y="346791"/>
+            <a:ext cx="146304" cy="704088"/>
           </a:xfrm>
           <a:prstGeom prst="rect">
             <a:avLst/>
           </a:prstGeom>
-        </p:spPr>
-      </p:pic>
-    </p:spTree>
-    <p:extLst>
-      <p:ext uri="{BB962C8B-B14F-4D97-AF65-F5344CB8AC3E}">
-        <p14:creationId xmlns:p14="http://schemas.microsoft.com/office/powerpoint/2010/main" val="584312899"/>
-      </p:ext>
-    </p:extLst>
-  </p:cSld>
-  <p:clrMapOvr>
-    <a:masterClrMapping/>
-  </p:clrMapOvr>
-</p:sld>
-</file>
-
-<file path=ppt/slides/slide5.xml><?xml version="1.0" encoding="utf-8"?>
-<p:sld xmlns:a="http://schemas.openxmlformats.org/drawingml/2006/main" xmlns:r="http://schemas.openxmlformats.org/officeDocument/2006/relationships" xmlns:p="http://schemas.openxmlformats.org/presentationml/2006/main">
-  <p:cSld>
-    <p:bg>
-      <p:bgPr>
-        <a:solidFill>
-          <a:schemeClr val="bg1"/>
-        </a:solidFill>
-        <a:effectLst/>
-      </p:bgPr>
-    </p:bg>
-    <p:spTree>
-      <p:nvGrpSpPr>
-        <p:cNvPr id="1" name=""/>
-        <p:cNvGrpSpPr/>
-        <p:nvPr/>
-      </p:nvGrpSpPr>
-      <p:grpSpPr>
-        <a:xfrm>
-          <a:off x="0" y="0"/>
-          <a:ext cx="0" cy="0"/>
-          <a:chOff x="0" y="0"/>
-          <a:chExt cx="0" cy="0"/>
-        </a:xfrm>
-      </p:grpSpPr>
-      <p:sp useBgFill="1">
-        <p:nvSpPr>
-          <p:cNvPr id="9" name="Rectangle 8">
-            <a:extLst>
-              <a:ext uri="{FF2B5EF4-FFF2-40B4-BE49-F238E27FC236}">
-                <a16:creationId xmlns:a16="http://schemas.microsoft.com/office/drawing/2014/main" id="{69D47016-023F-44BD-981C-50E7A10A6609}"/>
-              </a:ext>
-              <a:ext uri="{C183D7F6-B498-43B3-948B-1728B52AA6E4}">
-                <adec:decorative xmlns:adec="http://schemas.microsoft.com/office/drawing/2017/decorative" val="1"/>
-              </a:ext>
-            </a:extLst>
-          </p:cNvPr>
-          <p:cNvSpPr>
-            <a:spLocks noGrp="1" noRot="1" noChangeAspect="1" noMove="1" noResize="1" noEditPoints="1" noAdjustHandles="1" noChangeArrowheads="1" noChangeShapeType="1" noTextEdit="1"/>
-          </p:cNvSpPr>
-          <p:nvPr>
-            <p:extLst>
-              <p:ext uri="{386F3935-93C4-4BCD-93E2-E3B085C9AB24}">
-                <p16:designElem xmlns:p16="http://schemas.microsoft.com/office/powerpoint/2015/main" val="1"/>
-              </p:ext>
-            </p:extLst>
-          </p:nvPr>
-        </p:nvSpPr>
-        <p:spPr>
-          <a:xfrm>
-            <a:off x="0" y="0"/>
-            <a:ext cx="12188952" cy="6858000"/>
-          </a:xfrm>
-          <a:prstGeom prst="rect">
-            <a:avLst/>
-          </a:prstGeom>
+          <a:solidFill>
+            <a:schemeClr val="accent2"/>
+          </a:solidFill>
           <a:ln>
             <a:noFill/>
           </a:ln>
@@ -4556,51 +5980,21 @@
           <a:lstStyle/>
           <a:p>
             <a:pPr algn="ctr"/>
-            <a:endParaRPr lang="en-US" dirty="0"/>
-          </a:p>
-        </p:txBody>
-      </p:sp>
-      <p:sp>
-        <p:nvSpPr>
-          <p:cNvPr id="2" name="Title 1">
-            <a:extLst>
-              <a:ext uri="{FF2B5EF4-FFF2-40B4-BE49-F238E27FC236}">
-                <a16:creationId xmlns:a16="http://schemas.microsoft.com/office/drawing/2014/main" id="{D0FC87CC-608E-AF26-482F-72F51B8DC037}"/>
-              </a:ext>
-            </a:extLst>
-          </p:cNvPr>
-          <p:cNvSpPr>
-            <a:spLocks noGrp="1"/>
-          </p:cNvSpPr>
-          <p:nvPr>
-            <p:ph type="title"/>
-          </p:nvPr>
-        </p:nvSpPr>
-        <p:spPr>
-          <a:xfrm>
-            <a:off x="630936" y="457200"/>
-            <a:ext cx="4343400" cy="1929384"/>
-          </a:xfrm>
-        </p:spPr>
-        <p:txBody>
-          <a:bodyPr anchor="ctr">
-            <a:normAutofit/>
-          </a:bodyPr>
-          <a:lstStyle/>
-          <a:p>
-            <a:r>
-              <a:rPr lang="en-US" sz="4800"/>
-              <a:t>New Features</a:t>
-            </a:r>
-          </a:p>
-        </p:txBody>
-      </p:sp>
-      <p:sp>
-        <p:nvSpPr>
-          <p:cNvPr id="10" name="sketchy line">
-            <a:extLst>
-              <a:ext uri="{FF2B5EF4-FFF2-40B4-BE49-F238E27FC236}">
-                <a16:creationId xmlns:a16="http://schemas.microsoft.com/office/drawing/2014/main" id="{6D8B37B0-0682-433E-BC8D-498C04ABD9A7}"/>
+            <a:endParaRPr lang="en-US">
+              <a:solidFill>
+                <a:prstClr val="white"/>
+              </a:solidFill>
+              <a:latin typeface="Calibri" panose="020F0502020204030204"/>
+            </a:endParaRPr>
+          </a:p>
+        </p:txBody>
+      </p:sp>
+      <p:sp>
+        <p:nvSpPr>
+          <p:cNvPr id="15" name="Rectangle 14">
+            <a:extLst>
+              <a:ext uri="{FF2B5EF4-FFF2-40B4-BE49-F238E27FC236}">
+                <a16:creationId xmlns:a16="http://schemas.microsoft.com/office/drawing/2014/main" id="{08C9B587-E65E-4B52-B37C-ABEBB6E87928}"/>
               </a:ext>
               <a:ext uri="{C183D7F6-B498-43B3-948B-1728B52AA6E4}">
                 <adec:decorative xmlns:adec="http://schemas.microsoft.com/office/drawing/2017/decorative" val="1"/>
@@ -4619,179 +6013,20 @@
           </p:nvPr>
         </p:nvSpPr>
         <p:spPr>
-          <a:xfrm rot="5400000">
-            <a:off x="4471415" y="1412748"/>
-            <a:ext cx="1554480" cy="18288"/>
+          <a:xfrm>
+            <a:off x="481029" y="4546920"/>
+            <a:ext cx="3977640" cy="18288"/>
           </a:xfrm>
-          <a:custGeom>
+          <a:prstGeom prst="rect">
             <a:avLst/>
-            <a:gdLst>
-              <a:gd name="connsiteX0" fmla="*/ 0 w 1554480"/>
-              <a:gd name="connsiteY0" fmla="*/ 0 h 18288"/>
-              <a:gd name="connsiteX1" fmla="*/ 549250 w 1554480"/>
-              <a:gd name="connsiteY1" fmla="*/ 0 h 18288"/>
-              <a:gd name="connsiteX2" fmla="*/ 1082954 w 1554480"/>
-              <a:gd name="connsiteY2" fmla="*/ 0 h 18288"/>
-              <a:gd name="connsiteX3" fmla="*/ 1554480 w 1554480"/>
-              <a:gd name="connsiteY3" fmla="*/ 0 h 18288"/>
-              <a:gd name="connsiteX4" fmla="*/ 1554480 w 1554480"/>
-              <a:gd name="connsiteY4" fmla="*/ 18288 h 18288"/>
-              <a:gd name="connsiteX5" fmla="*/ 1067410 w 1554480"/>
-              <a:gd name="connsiteY5" fmla="*/ 18288 h 18288"/>
-              <a:gd name="connsiteX6" fmla="*/ 549250 w 1554480"/>
-              <a:gd name="connsiteY6" fmla="*/ 18288 h 18288"/>
-              <a:gd name="connsiteX7" fmla="*/ 0 w 1554480"/>
-              <a:gd name="connsiteY7" fmla="*/ 18288 h 18288"/>
-              <a:gd name="connsiteX8" fmla="*/ 0 w 1554480"/>
-              <a:gd name="connsiteY8" fmla="*/ 0 h 18288"/>
-            </a:gdLst>
-            <a:ahLst/>
-            <a:cxnLst>
-              <a:cxn ang="0">
-                <a:pos x="connsiteX0" y="connsiteY0"/>
-              </a:cxn>
-              <a:cxn ang="0">
-                <a:pos x="connsiteX1" y="connsiteY1"/>
-              </a:cxn>
-              <a:cxn ang="0">
-                <a:pos x="connsiteX2" y="connsiteY2"/>
-              </a:cxn>
-              <a:cxn ang="0">
-                <a:pos x="connsiteX3" y="connsiteY3"/>
-              </a:cxn>
-              <a:cxn ang="0">
-                <a:pos x="connsiteX4" y="connsiteY4"/>
-              </a:cxn>
-              <a:cxn ang="0">
-                <a:pos x="connsiteX5" y="connsiteY5"/>
-              </a:cxn>
-              <a:cxn ang="0">
-                <a:pos x="connsiteX6" y="connsiteY6"/>
-              </a:cxn>
-              <a:cxn ang="0">
-                <a:pos x="connsiteX7" y="connsiteY7"/>
-              </a:cxn>
-              <a:cxn ang="0">
-                <a:pos x="connsiteX8" y="connsiteY8"/>
-              </a:cxn>
-            </a:cxnLst>
-            <a:rect l="l" t="t" r="r" b="b"/>
-            <a:pathLst>
-              <a:path w="1554480" h="18288" fill="none" extrusionOk="0">
-                <a:moveTo>
-                  <a:pt x="0" y="0"/>
-                </a:moveTo>
-                <a:cubicBezTo>
-                  <a:pt x="114141" y="-19864"/>
-                  <a:pt x="345055" y="-1657"/>
-                  <a:pt x="549250" y="0"/>
-                </a:cubicBezTo>
-                <a:cubicBezTo>
-                  <a:pt x="753445" y="1657"/>
-                  <a:pt x="862292" y="-5674"/>
-                  <a:pt x="1082954" y="0"/>
-                </a:cubicBezTo>
-                <a:cubicBezTo>
-                  <a:pt x="1303616" y="5674"/>
-                  <a:pt x="1363530" y="4537"/>
-                  <a:pt x="1554480" y="0"/>
-                </a:cubicBezTo>
-                <a:cubicBezTo>
-                  <a:pt x="1554963" y="7176"/>
-                  <a:pt x="1553909" y="13682"/>
-                  <a:pt x="1554480" y="18288"/>
-                </a:cubicBezTo>
-                <a:cubicBezTo>
-                  <a:pt x="1338847" y="6127"/>
-                  <a:pt x="1215066" y="37851"/>
-                  <a:pt x="1067410" y="18288"/>
-                </a:cubicBezTo>
-                <a:cubicBezTo>
-                  <a:pt x="919754" y="-1275"/>
-                  <a:pt x="800465" y="3080"/>
-                  <a:pt x="549250" y="18288"/>
-                </a:cubicBezTo>
-                <a:cubicBezTo>
-                  <a:pt x="298035" y="33496"/>
-                  <a:pt x="158868" y="22769"/>
-                  <a:pt x="0" y="18288"/>
-                </a:cubicBezTo>
-                <a:cubicBezTo>
-                  <a:pt x="-655" y="13237"/>
-                  <a:pt x="709" y="4645"/>
-                  <a:pt x="0" y="0"/>
-                </a:cubicBezTo>
-                <a:close/>
-              </a:path>
-              <a:path w="1554480" h="18288" stroke="0" extrusionOk="0">
-                <a:moveTo>
-                  <a:pt x="0" y="0"/>
-                </a:moveTo>
-                <a:cubicBezTo>
-                  <a:pt x="249941" y="-58"/>
-                  <a:pt x="367334" y="23448"/>
-                  <a:pt x="502615" y="0"/>
-                </a:cubicBezTo>
-                <a:cubicBezTo>
-                  <a:pt x="637897" y="-23448"/>
-                  <a:pt x="813653" y="-20418"/>
-                  <a:pt x="974141" y="0"/>
-                </a:cubicBezTo>
-                <a:cubicBezTo>
-                  <a:pt x="1134629" y="20418"/>
-                  <a:pt x="1268772" y="6288"/>
-                  <a:pt x="1554480" y="0"/>
-                </a:cubicBezTo>
-                <a:cubicBezTo>
-                  <a:pt x="1554917" y="7222"/>
-                  <a:pt x="1555359" y="13299"/>
-                  <a:pt x="1554480" y="18288"/>
-                </a:cubicBezTo>
-                <a:cubicBezTo>
-                  <a:pt x="1336087" y="12172"/>
-                  <a:pt x="1310024" y="19759"/>
-                  <a:pt x="1067410" y="18288"/>
-                </a:cubicBezTo>
-                <a:cubicBezTo>
-                  <a:pt x="824796" y="16818"/>
-                  <a:pt x="787902" y="34647"/>
-                  <a:pt x="518160" y="18288"/>
-                </a:cubicBezTo>
-                <a:cubicBezTo>
-                  <a:pt x="248418" y="1930"/>
-                  <a:pt x="133160" y="9205"/>
-                  <a:pt x="0" y="18288"/>
-                </a:cubicBezTo>
-                <a:cubicBezTo>
-                  <a:pt x="-643" y="9451"/>
-                  <a:pt x="-340" y="7114"/>
-                  <a:pt x="0" y="0"/>
-                </a:cubicBezTo>
-                <a:close/>
-              </a:path>
-            </a:pathLst>
-          </a:custGeom>
+          </a:prstGeom>
           <a:solidFill>
-            <a:schemeClr val="accent2"/>
+            <a:schemeClr val="tx1"/>
           </a:solidFill>
-          <a:ln w="41275" cap="rnd">
-            <a:solidFill>
-              <a:schemeClr val="accent2"/>
-            </a:solidFill>
-            <a:round/>
-            <a:extLst>
-              <a:ext uri="{C807C97D-BFC1-408E-A445-0C87EB9F89A2}">
-                <ask:lineSketchStyleProps xmlns:ask="http://schemas.microsoft.com/office/drawing/2018/sketchyshapes" sd="1219033472">
-                  <a:prstGeom prst="rect">
-                    <a:avLst/>
-                  </a:prstGeom>
-                  <ask:type>
-                    <ask:lineSketchFreehand/>
-                  </ask:type>
-                </ask:lineSketchStyleProps>
-              </a:ext>
-            </a:extLst>
+          <a:ln w="3175">
+            <a:noFill/>
           </a:ln>
+          <a:effectLst/>
         </p:spPr>
         <p:style>
           <a:lnRef idx="2">
@@ -4813,8 +6048,95 @@
           <a:bodyPr rtlCol="0" anchor="ctr"/>
           <a:lstStyle/>
           <a:p>
-            <a:pPr algn="ctr"/>
-            <a:endParaRPr lang="en-US"/>
+            <a:pPr marL="0" marR="0" lvl="0" indent="0" algn="ctr" defTabSz="914400" rtl="0" eaLnBrk="1" fontAlgn="auto" latinLnBrk="0" hangingPunct="1">
+              <a:lnSpc>
+                <a:spcPct val="100000"/>
+              </a:lnSpc>
+              <a:spcBef>
+                <a:spcPts val="0"/>
+              </a:spcBef>
+              <a:spcAft>
+                <a:spcPts val="0"/>
+              </a:spcAft>
+              <a:buClrTx/>
+              <a:buSzTx/>
+              <a:buFontTx/>
+              <a:buNone/>
+              <a:tabLst/>
+              <a:defRPr/>
+            </a:pPr>
+            <a:endParaRPr kumimoji="0" lang="en-US" sz="1800" b="0" i="0" u="none" strike="noStrike" kern="1200" cap="none" spc="0" normalizeH="0" baseline="0" noProof="0">
+              <a:ln>
+                <a:noFill/>
+              </a:ln>
+              <a:solidFill>
+                <a:prstClr val="white"/>
+              </a:solidFill>
+              <a:effectLst/>
+              <a:uLnTx/>
+              <a:uFillTx/>
+              <a:latin typeface="Calibri" panose="020F0502020204030204"/>
+              <a:ea typeface="+mn-ea"/>
+              <a:cs typeface="+mn-cs"/>
+            </a:endParaRPr>
+          </a:p>
+        </p:txBody>
+      </p:sp>
+    </p:spTree>
+    <p:extLst>
+      <p:ext uri="{BB962C8B-B14F-4D97-AF65-F5344CB8AC3E}">
+        <p14:creationId xmlns:p14="http://schemas.microsoft.com/office/powerpoint/2010/main" val="466541698"/>
+      </p:ext>
+    </p:extLst>
+  </p:cSld>
+  <p:clrMapOvr>
+    <a:masterClrMapping/>
+  </p:clrMapOvr>
+</p:sld>
+</file>
+
+<file path=ppt/slides/slide2.xml><?xml version="1.0" encoding="utf-8"?>
+<p:sld xmlns:a="http://schemas.openxmlformats.org/drawingml/2006/main" xmlns:r="http://schemas.openxmlformats.org/officeDocument/2006/relationships" xmlns:p="http://schemas.openxmlformats.org/presentationml/2006/main">
+  <p:cSld>
+    <p:spTree>
+      <p:nvGrpSpPr>
+        <p:cNvPr id="1" name=""/>
+        <p:cNvGrpSpPr/>
+        <p:nvPr/>
+      </p:nvGrpSpPr>
+      <p:grpSpPr>
+        <a:xfrm>
+          <a:off x="0" y="0"/>
+          <a:ext cx="0" cy="0"/>
+          <a:chOff x="0" y="0"/>
+          <a:chExt cx="0" cy="0"/>
+        </a:xfrm>
+      </p:grpSpPr>
+      <p:sp>
+        <p:nvSpPr>
+          <p:cNvPr id="2" name="Title 1">
+            <a:extLst>
+              <a:ext uri="{FF2B5EF4-FFF2-40B4-BE49-F238E27FC236}">
+                <a16:creationId xmlns:a16="http://schemas.microsoft.com/office/drawing/2014/main" id="{B194EC0F-F300-BDFB-4FBB-D5A9E613D596}"/>
+              </a:ext>
+            </a:extLst>
+          </p:cNvPr>
+          <p:cNvSpPr>
+            <a:spLocks noGrp="1"/>
+          </p:cNvSpPr>
+          <p:nvPr>
+            <p:ph type="title"/>
+          </p:nvPr>
+        </p:nvSpPr>
+        <p:spPr/>
+        <p:txBody>
+          <a:bodyPr/>
+          <a:lstStyle/>
+          <a:p>
+            <a:r>
+              <a:rPr lang="en-US" dirty="0"/>
+              <a:t>Project overview</a:t>
+            </a:r>
           </a:p>
         </p:txBody>
       </p:sp>
@@ -4823,7 +6145,7 @@
           <p:cNvPr id="3" name="Content Placeholder 2">
             <a:extLst>
               <a:ext uri="{FF2B5EF4-FFF2-40B4-BE49-F238E27FC236}">
-                <a16:creationId xmlns:a16="http://schemas.microsoft.com/office/drawing/2014/main" id="{4FA64360-FA35-C3F9-9A0E-02D5121AF440}"/>
+                <a16:creationId xmlns:a16="http://schemas.microsoft.com/office/drawing/2014/main" id="{2FA590CA-D6A3-57EA-96F3-701D293078BF}"/>
               </a:ext>
             </a:extLst>
           </p:cNvPr>
@@ -4834,40 +6156,439 @@
             <p:ph idx="1"/>
           </p:nvPr>
         </p:nvSpPr>
-        <p:spPr>
-          <a:xfrm>
-            <a:off x="5541263" y="457200"/>
-            <a:ext cx="6007608" cy="1929384"/>
-          </a:xfrm>
-        </p:spPr>
-        <p:txBody>
-          <a:bodyPr anchor="ctr">
+        <p:spPr/>
+        <p:txBody>
+          <a:bodyPr>
             <a:normAutofit/>
           </a:bodyPr>
           <a:lstStyle/>
           <a:p>
+            <a:r>
+              <a:rPr lang="en-US" sz="2400" b="0" i="0" dirty="0">
+                <a:effectLst/>
+                <a:latin typeface="Arial" panose="020B0604020202020204" pitchFamily="34" charset="0"/>
+              </a:rPr>
+              <a:t>The Expense Tracker program is a desktop application designed to help you manage your personal finances by tracking expenses and savings. It provides an intuitive interface to add entries, view financial summaries, and analyze your data.</a:t>
+            </a:r>
+          </a:p>
+          <a:p>
+            <a:r>
+              <a:rPr lang="en-US" sz="2400" dirty="0">
+                <a:latin typeface="Arial" panose="020B0604020202020204" pitchFamily="34" charset="0"/>
+              </a:rPr>
+              <a:t>The application uses SQLite internally to store data within a query/search page.</a:t>
+            </a:r>
+          </a:p>
+          <a:p>
+            <a:r>
+              <a:rPr lang="en-US" sz="2400" dirty="0">
+                <a:latin typeface="Arial" panose="020B0604020202020204" pitchFamily="34" charset="0"/>
+              </a:rPr>
+              <a:t>This rough prototype works similar to other finance tracking applications such as Rocket Money.</a:t>
+            </a:r>
+          </a:p>
+        </p:txBody>
+      </p:sp>
+    </p:spTree>
+    <p:extLst>
+      <p:ext uri="{BB962C8B-B14F-4D97-AF65-F5344CB8AC3E}">
+        <p14:creationId xmlns:p14="http://schemas.microsoft.com/office/powerpoint/2010/main" val="1491381442"/>
+      </p:ext>
+    </p:extLst>
+  </p:cSld>
+  <p:clrMapOvr>
+    <a:masterClrMapping/>
+  </p:clrMapOvr>
+</p:sld>
+</file>
+
+<file path=ppt/slides/slide3.xml><?xml version="1.0" encoding="utf-8"?>
+<p:sld xmlns:a="http://schemas.openxmlformats.org/drawingml/2006/main" xmlns:r="http://schemas.openxmlformats.org/officeDocument/2006/relationships" xmlns:p="http://schemas.openxmlformats.org/presentationml/2006/main">
+  <p:cSld>
+    <p:spTree>
+      <p:nvGrpSpPr>
+        <p:cNvPr id="1" name=""/>
+        <p:cNvGrpSpPr/>
+        <p:nvPr/>
+      </p:nvGrpSpPr>
+      <p:grpSpPr>
+        <a:xfrm>
+          <a:off x="0" y="0"/>
+          <a:ext cx="0" cy="0"/>
+          <a:chOff x="0" y="0"/>
+          <a:chExt cx="0" cy="0"/>
+        </a:xfrm>
+      </p:grpSpPr>
+      <p:sp>
+        <p:nvSpPr>
+          <p:cNvPr id="2" name="Title 1">
+            <a:extLst>
+              <a:ext uri="{FF2B5EF4-FFF2-40B4-BE49-F238E27FC236}">
+                <a16:creationId xmlns:a16="http://schemas.microsoft.com/office/drawing/2014/main" id="{D08E7159-2493-E79A-1020-8EE9684D212A}"/>
+              </a:ext>
+            </a:extLst>
+          </p:cNvPr>
+          <p:cNvSpPr>
+            <a:spLocks noGrp="1"/>
+          </p:cNvSpPr>
+          <p:nvPr>
+            <p:ph type="title"/>
+          </p:nvPr>
+        </p:nvSpPr>
+        <p:spPr/>
+        <p:txBody>
+          <a:bodyPr/>
+          <a:lstStyle/>
+          <a:p>
+            <a:r>
+              <a:rPr lang="en-US" dirty="0"/>
+              <a:t>User Stories (Version 1)</a:t>
+            </a:r>
+          </a:p>
+        </p:txBody>
+      </p:sp>
+      <p:sp>
+        <p:nvSpPr>
+          <p:cNvPr id="3" name="Content Placeholder 2">
+            <a:extLst>
+              <a:ext uri="{FF2B5EF4-FFF2-40B4-BE49-F238E27FC236}">
+                <a16:creationId xmlns:a16="http://schemas.microsoft.com/office/drawing/2014/main" id="{7FF75D85-319D-98CE-0A05-2BF0FEB7B931}"/>
+              </a:ext>
+            </a:extLst>
+          </p:cNvPr>
+          <p:cNvSpPr>
+            <a:spLocks noGrp="1"/>
+          </p:cNvSpPr>
+          <p:nvPr>
+            <p:ph idx="1"/>
+          </p:nvPr>
+        </p:nvSpPr>
+        <p:spPr/>
+        <p:txBody>
+          <a:bodyPr vert="horz" lIns="91440" tIns="45720" rIns="91440" bIns="45720" rtlCol="0" anchor="t">
+            <a:normAutofit/>
+          </a:bodyPr>
+          <a:lstStyle/>
+          <a:p>
+            <a:r>
+              <a:rPr lang="en-US" sz="2000" dirty="0">
+                <a:latin typeface="Aptos"/>
+                <a:cs typeface="Arial"/>
+              </a:rPr>
+              <a:t>Set Starting Balance</a:t>
+            </a:r>
+            <a:endParaRPr lang="en-US" sz="2000" dirty="0">
+              <a:latin typeface="Aptos"/>
+            </a:endParaRPr>
+          </a:p>
+          <a:p>
+            <a:pPr lvl="1">
+              <a:buFont typeface="Courier New" panose="020B0604020202020204" pitchFamily="34" charset="0"/>
+              <a:buChar char="o"/>
+            </a:pPr>
+            <a:r>
+              <a:rPr lang="en-US" sz="1600" dirty="0">
+                <a:ea typeface="+mn-lt"/>
+                <a:cs typeface="+mn-lt"/>
+              </a:rPr>
+              <a:t>As a user, I want to track and analyze my spending so I can manage my budget effectively.</a:t>
+            </a:r>
+            <a:endParaRPr lang="en-US" sz="1600" dirty="0">
+              <a:cs typeface="Arial"/>
+            </a:endParaRPr>
+          </a:p>
+          <a:p>
+            <a:r>
+              <a:rPr lang="en-US" sz="2000" dirty="0"/>
+              <a:t>Add Expenses</a:t>
+            </a:r>
+          </a:p>
+          <a:p>
+            <a:pPr lvl="1">
+              <a:buFont typeface="Courier New" panose="020B0604020202020204" pitchFamily="34" charset="0"/>
+              <a:buChar char="o"/>
+            </a:pPr>
+            <a:r>
+              <a:rPr lang="en-US" sz="1600" dirty="0">
+                <a:ea typeface="+mn-lt"/>
+                <a:cs typeface="+mn-lt"/>
+              </a:rPr>
+              <a:t>As a user, I want to add expenses with details like date, amount, category, and tags (e.g., “groceries”) to track my spending.</a:t>
+            </a:r>
+            <a:endParaRPr lang="en-US" sz="1600" dirty="0"/>
+          </a:p>
+          <a:p>
+            <a:r>
+              <a:rPr lang="en-US" sz="2000" dirty="0"/>
+              <a:t>Add Savings</a:t>
+            </a:r>
+          </a:p>
+          <a:p>
+            <a:pPr lvl="1">
+              <a:buFont typeface="Courier New" panose="020B0604020202020204" pitchFamily="34" charset="0"/>
+              <a:buChar char="o"/>
+            </a:pPr>
+            <a:r>
+              <a:rPr lang="en-US" sz="1600" dirty="0"/>
+              <a:t>As a user, I want to add savings to update my balance to further track my budget.</a:t>
+            </a:r>
+          </a:p>
+          <a:p>
+            <a:r>
+              <a:rPr lang="en-US" sz="2000" dirty="0"/>
+              <a:t>Query Entries</a:t>
+            </a:r>
+          </a:p>
+          <a:p>
+            <a:pPr lvl="1">
+              <a:buFont typeface="Courier New" panose="020B0604020202020204" pitchFamily="34" charset="0"/>
+              <a:buChar char="o"/>
+            </a:pPr>
+            <a:r>
+              <a:rPr lang="en-US" sz="1600" dirty="0">
+                <a:ea typeface="+mn-lt"/>
+                <a:cs typeface="+mn-lt"/>
+              </a:rPr>
+              <a:t>As a user, I want to query my expenses by date, category, or tag so that I can analyze my spending in specific areas.</a:t>
+            </a:r>
+            <a:endParaRPr lang="en-US" sz="1600" dirty="0"/>
+          </a:p>
+        </p:txBody>
+      </p:sp>
+    </p:spTree>
+    <p:extLst>
+      <p:ext uri="{BB962C8B-B14F-4D97-AF65-F5344CB8AC3E}">
+        <p14:creationId xmlns:p14="http://schemas.microsoft.com/office/powerpoint/2010/main" val="3771681556"/>
+      </p:ext>
+    </p:extLst>
+  </p:cSld>
+  <p:clrMapOvr>
+    <a:masterClrMapping/>
+  </p:clrMapOvr>
+</p:sld>
+</file>
+
+<file path=ppt/slides/slide4.xml><?xml version="1.0" encoding="utf-8"?>
+<p:sld xmlns:a="http://schemas.openxmlformats.org/drawingml/2006/main" xmlns:r="http://schemas.openxmlformats.org/officeDocument/2006/relationships" xmlns:p="http://schemas.openxmlformats.org/presentationml/2006/main">
+  <p:cSld>
+    <p:spTree>
+      <p:nvGrpSpPr>
+        <p:cNvPr id="1" name=""/>
+        <p:cNvGrpSpPr/>
+        <p:nvPr/>
+      </p:nvGrpSpPr>
+      <p:grpSpPr>
+        <a:xfrm>
+          <a:off x="0" y="0"/>
+          <a:ext cx="0" cy="0"/>
+          <a:chOff x="0" y="0"/>
+          <a:chExt cx="0" cy="0"/>
+        </a:xfrm>
+      </p:grpSpPr>
+      <p:sp>
+        <p:nvSpPr>
+          <p:cNvPr id="2" name="Title 1">
+            <a:extLst>
+              <a:ext uri="{FF2B5EF4-FFF2-40B4-BE49-F238E27FC236}">
+                <a16:creationId xmlns:a16="http://schemas.microsoft.com/office/drawing/2014/main" id="{7AD784A3-B906-782D-08E0-8AFA19E35222}"/>
+              </a:ext>
+            </a:extLst>
+          </p:cNvPr>
+          <p:cNvSpPr>
+            <a:spLocks noGrp="1"/>
+          </p:cNvSpPr>
+          <p:nvPr>
+            <p:ph type="title"/>
+          </p:nvPr>
+        </p:nvSpPr>
+        <p:spPr/>
+        <p:txBody>
+          <a:bodyPr/>
+          <a:lstStyle/>
+          <a:p>
+            <a:r>
+              <a:rPr lang="en-US" dirty="0"/>
+              <a:t>Modules</a:t>
+            </a:r>
+          </a:p>
+        </p:txBody>
+      </p:sp>
+      <p:sp>
+        <p:nvSpPr>
+          <p:cNvPr id="3" name="Content Placeholder 2">
+            <a:extLst>
+              <a:ext uri="{FF2B5EF4-FFF2-40B4-BE49-F238E27FC236}">
+                <a16:creationId xmlns:a16="http://schemas.microsoft.com/office/drawing/2014/main" id="{91264826-4388-AAB2-F8F0-69EAB39226D5}"/>
+              </a:ext>
+            </a:extLst>
+          </p:cNvPr>
+          <p:cNvSpPr>
+            <a:spLocks noGrp="1"/>
+          </p:cNvSpPr>
+          <p:nvPr>
+            <p:ph idx="1"/>
+          </p:nvPr>
+        </p:nvSpPr>
+        <p:spPr/>
+        <p:txBody>
+          <a:bodyPr/>
+          <a:lstStyle/>
+          <a:p>
             <a:pPr marL="0" indent="0">
               <a:buNone/>
             </a:pPr>
             <a:r>
-              <a:rPr lang="en-US" sz="2200"/>
-              <a:t>Search in Query</a:t>
-            </a:r>
-          </a:p>
-          <a:p>
-            <a:r>
-              <a:rPr lang="en-US" sz="2200"/>
-              <a:t>Adds the ability to search for certain categories</a:t>
+              <a:rPr lang="en-US" sz="1800" b="1" dirty="0"/>
+              <a:t>Database Module (Persistence Layer)</a:t>
+            </a:r>
+          </a:p>
+          <a:p>
+            <a:pPr>
+              <a:buFont typeface="Arial" panose="020B0604020202020204" pitchFamily="34" charset="0"/>
+              <a:buChar char="•"/>
+            </a:pPr>
+            <a:r>
+              <a:rPr lang="en-US" sz="1800" b="1" dirty="0"/>
+              <a:t>Purpose</a:t>
+            </a:r>
+            <a:r>
+              <a:rPr lang="en-US" sz="1800" dirty="0"/>
+              <a:t>: To handle all interactions with the database (e.g., SQLite) to store and retrieve expense data.</a:t>
+            </a:r>
+          </a:p>
+          <a:p>
+            <a:pPr marL="0" indent="0">
+              <a:buNone/>
+            </a:pPr>
+            <a:r>
+              <a:rPr lang="en-US" sz="1800" b="1" dirty="0"/>
+              <a:t>User Interface (UI) Module</a:t>
+            </a:r>
+          </a:p>
+          <a:p>
+            <a:r>
+              <a:rPr lang="en-US" sz="1800" b="1" dirty="0"/>
+              <a:t>Purpose: </a:t>
+            </a:r>
+            <a:r>
+              <a:rPr lang="en-US" sz="1800" dirty="0"/>
+              <a:t>To provide a graphical user interface (GUI) for the user to interact with the application.</a:t>
+            </a:r>
+          </a:p>
+          <a:p>
+            <a:pPr marL="0" indent="0">
+              <a:buNone/>
+            </a:pPr>
+            <a:r>
+              <a:rPr lang="en-US" sz="1800" b="1" dirty="0"/>
+              <a:t>Business Logic Module (Core Logic)</a:t>
+            </a:r>
+          </a:p>
+          <a:p>
+            <a:r>
+              <a:rPr lang="en-US" sz="1800" b="1" dirty="0"/>
+              <a:t>Purpose: </a:t>
+            </a:r>
+            <a:r>
+              <a:rPr lang="en-US" sz="1800" dirty="0"/>
+              <a:t>To manage the core logic of the application, such as calculating total balance, adding/removing expenses, and handling business rules.</a:t>
+            </a:r>
+          </a:p>
+          <a:p>
+            <a:pPr marL="0" indent="0">
+              <a:buNone/>
+            </a:pPr>
+            <a:r>
+              <a:rPr lang="en-US" sz="1800" b="1" dirty="0"/>
+              <a:t>Utility Module (Helper Functions)</a:t>
+            </a:r>
+          </a:p>
+          <a:p>
+            <a:r>
+              <a:rPr lang="en-US" sz="1800" b="1" dirty="0"/>
+              <a:t>Purpose: </a:t>
+            </a:r>
+            <a:r>
+              <a:rPr lang="en-US" sz="1800" dirty="0"/>
+              <a:t>To provide utility functions that support the other modules in the app.</a:t>
+            </a:r>
+          </a:p>
+          <a:p>
+            <a:pPr marL="0" indent="0">
+              <a:buNone/>
+            </a:pPr>
+            <a:endParaRPr lang="en-US" sz="1800" dirty="0"/>
+          </a:p>
+          <a:p>
+            <a:endParaRPr lang="en-US" dirty="0"/>
+          </a:p>
+        </p:txBody>
+      </p:sp>
+    </p:spTree>
+    <p:extLst>
+      <p:ext uri="{BB962C8B-B14F-4D97-AF65-F5344CB8AC3E}">
+        <p14:creationId xmlns:p14="http://schemas.microsoft.com/office/powerpoint/2010/main" val="446649843"/>
+      </p:ext>
+    </p:extLst>
+  </p:cSld>
+  <p:clrMapOvr>
+    <a:masterClrMapping/>
+  </p:clrMapOvr>
+</p:sld>
+</file>
+
+<file path=ppt/slides/slide5.xml><?xml version="1.0" encoding="utf-8"?>
+<p:sld xmlns:a="http://schemas.openxmlformats.org/drawingml/2006/main" xmlns:r="http://schemas.openxmlformats.org/officeDocument/2006/relationships" xmlns:p="http://schemas.openxmlformats.org/presentationml/2006/main">
+  <p:cSld>
+    <p:spTree>
+      <p:nvGrpSpPr>
+        <p:cNvPr id="1" name=""/>
+        <p:cNvGrpSpPr/>
+        <p:nvPr/>
+      </p:nvGrpSpPr>
+      <p:grpSpPr>
+        <a:xfrm>
+          <a:off x="0" y="0"/>
+          <a:ext cx="0" cy="0"/>
+          <a:chOff x="0" y="0"/>
+          <a:chExt cx="0" cy="0"/>
+        </a:xfrm>
+      </p:grpSpPr>
+      <p:sp>
+        <p:nvSpPr>
+          <p:cNvPr id="2" name="Title 1">
+            <a:extLst>
+              <a:ext uri="{FF2B5EF4-FFF2-40B4-BE49-F238E27FC236}">
+                <a16:creationId xmlns:a16="http://schemas.microsoft.com/office/drawing/2014/main" id="{96E0AF54-01D0-B224-6FD3-FC4AF0234E7D}"/>
+              </a:ext>
+            </a:extLst>
+          </p:cNvPr>
+          <p:cNvSpPr>
+            <a:spLocks noGrp="1"/>
+          </p:cNvSpPr>
+          <p:nvPr>
+            <p:ph type="title"/>
+          </p:nvPr>
+        </p:nvSpPr>
+        <p:spPr/>
+        <p:txBody>
+          <a:bodyPr/>
+          <a:lstStyle/>
+          <a:p>
+            <a:pPr algn="ctr"/>
+            <a:r>
+              <a:rPr lang="en-US" dirty="0"/>
+              <a:t>Module Relation Diagram</a:t>
             </a:r>
           </a:p>
         </p:txBody>
       </p:sp>
       <p:pic>
         <p:nvPicPr>
-          <p:cNvPr id="7" name="Picture 6">
-            <a:extLst>
-              <a:ext uri="{FF2B5EF4-FFF2-40B4-BE49-F238E27FC236}">
-                <a16:creationId xmlns:a16="http://schemas.microsoft.com/office/drawing/2014/main" id="{6625B6E6-84C5-C71B-E14F-BEFC417D7F80}"/>
+          <p:cNvPr id="5" name="Picture 4" descr="A screenshot of a computer&#10;&#10;Description automatically generated">
+            <a:extLst>
+              <a:ext uri="{FF2B5EF4-FFF2-40B4-BE49-F238E27FC236}">
+                <a16:creationId xmlns:a16="http://schemas.microsoft.com/office/drawing/2014/main" id="{8785102C-6622-FA50-EE05-2A4FECBBEAAE}"/>
               </a:ext>
             </a:extLst>
           </p:cNvPr>
@@ -4875,6 +6596,102 @@
             <a:picLocks noChangeAspect="1"/>
           </p:cNvPicPr>
           <p:nvPr/>
+        </p:nvPicPr>
+        <p:blipFill>
+          <a:blip r:embed="rId2">
+            <a:extLst>
+              <a:ext uri="{28A0092B-C50C-407E-A947-70E740481C1C}">
+                <a14:useLocalDpi xmlns:a14="http://schemas.microsoft.com/office/drawing/2010/main" val="0"/>
+              </a:ext>
+            </a:extLst>
+          </a:blip>
+          <a:stretch>
+            <a:fillRect/>
+          </a:stretch>
+        </p:blipFill>
+        <p:spPr>
+          <a:xfrm>
+            <a:off x="2076356" y="1690688"/>
+            <a:ext cx="8363138" cy="4319587"/>
+          </a:xfrm>
+          <a:prstGeom prst="rect">
+            <a:avLst/>
+          </a:prstGeom>
+        </p:spPr>
+      </p:pic>
+    </p:spTree>
+    <p:extLst>
+      <p:ext uri="{BB962C8B-B14F-4D97-AF65-F5344CB8AC3E}">
+        <p14:creationId xmlns:p14="http://schemas.microsoft.com/office/powerpoint/2010/main" val="2278260194"/>
+      </p:ext>
+    </p:extLst>
+  </p:cSld>
+  <p:clrMapOvr>
+    <a:masterClrMapping/>
+  </p:clrMapOvr>
+</p:sld>
+</file>
+
+<file path=ppt/slides/slide6.xml><?xml version="1.0" encoding="utf-8"?>
+<p:sld xmlns:a="http://schemas.openxmlformats.org/drawingml/2006/main" xmlns:r="http://schemas.openxmlformats.org/officeDocument/2006/relationships" xmlns:p="http://schemas.openxmlformats.org/presentationml/2006/main">
+  <p:cSld>
+    <p:spTree>
+      <p:nvGrpSpPr>
+        <p:cNvPr id="1" name=""/>
+        <p:cNvGrpSpPr/>
+        <p:nvPr/>
+      </p:nvGrpSpPr>
+      <p:grpSpPr>
+        <a:xfrm>
+          <a:off x="0" y="0"/>
+          <a:ext cx="0" cy="0"/>
+          <a:chOff x="0" y="0"/>
+          <a:chExt cx="0" cy="0"/>
+        </a:xfrm>
+      </p:grpSpPr>
+      <p:sp>
+        <p:nvSpPr>
+          <p:cNvPr id="2" name="Title 1">
+            <a:extLst>
+              <a:ext uri="{FF2B5EF4-FFF2-40B4-BE49-F238E27FC236}">
+                <a16:creationId xmlns:a16="http://schemas.microsoft.com/office/drawing/2014/main" id="{0A5101E6-FFEB-8514-DF25-DEE2A2A6B71E}"/>
+              </a:ext>
+            </a:extLst>
+          </p:cNvPr>
+          <p:cNvSpPr>
+            <a:spLocks noGrp="1"/>
+          </p:cNvSpPr>
+          <p:nvPr>
+            <p:ph type="title"/>
+          </p:nvPr>
+        </p:nvSpPr>
+        <p:spPr/>
+        <p:txBody>
+          <a:bodyPr/>
+          <a:lstStyle/>
+          <a:p>
+            <a:r>
+              <a:rPr lang="en-US" dirty="0"/>
+              <a:t>Use Case</a:t>
+            </a:r>
+          </a:p>
+        </p:txBody>
+      </p:sp>
+      <p:pic>
+        <p:nvPicPr>
+          <p:cNvPr id="4" name="Content Placeholder 3" descr="UseCase.png">
+            <a:extLst>
+              <a:ext uri="{FF2B5EF4-FFF2-40B4-BE49-F238E27FC236}">
+                <a16:creationId xmlns:a16="http://schemas.microsoft.com/office/drawing/2014/main" id="{CF1DC45B-D317-B8BB-FB22-7FF8E63CB3A9}"/>
+              </a:ext>
+            </a:extLst>
+          </p:cNvPr>
+          <p:cNvPicPr>
+            <a:picLocks noGrp="1" noChangeAspect="1"/>
+          </p:cNvPicPr>
+          <p:nvPr>
+            <p:ph idx="1"/>
+          </p:nvPr>
         </p:nvPicPr>
         <p:blipFill>
           <a:blip r:embed="rId2"/>
@@ -4884,108 +6701,276 @@
         </p:blipFill>
         <p:spPr>
           <a:xfrm>
-            <a:off x="6650739" y="2386584"/>
-            <a:ext cx="4570107" cy="3678936"/>
+            <a:off x="-3528" y="1596212"/>
+            <a:ext cx="11550324" cy="4079058"/>
           </a:xfrm>
-          <a:prstGeom prst="rect">
-            <a:avLst/>
-          </a:prstGeom>
         </p:spPr>
       </p:pic>
+    </p:spTree>
+    <p:extLst>
+      <p:ext uri="{BB962C8B-B14F-4D97-AF65-F5344CB8AC3E}">
+        <p14:creationId xmlns:p14="http://schemas.microsoft.com/office/powerpoint/2010/main" val="831701147"/>
+      </p:ext>
+    </p:extLst>
+  </p:cSld>
+  <p:clrMapOvr>
+    <a:masterClrMapping/>
+  </p:clrMapOvr>
+</p:sld>
+</file>
+
+<file path=ppt/slides/slide7.xml><?xml version="1.0" encoding="utf-8"?>
+<p:sld xmlns:a="http://schemas.openxmlformats.org/drawingml/2006/main" xmlns:r="http://schemas.openxmlformats.org/officeDocument/2006/relationships" xmlns:p="http://schemas.openxmlformats.org/presentationml/2006/main">
+  <p:cSld>
+    <p:spTree>
+      <p:nvGrpSpPr>
+        <p:cNvPr id="1" name=""/>
+        <p:cNvGrpSpPr/>
+        <p:nvPr/>
+      </p:nvGrpSpPr>
+      <p:grpSpPr>
+        <a:xfrm>
+          <a:off x="0" y="0"/>
+          <a:ext cx="0" cy="0"/>
+          <a:chOff x="0" y="0"/>
+          <a:chExt cx="0" cy="0"/>
+        </a:xfrm>
+      </p:grpSpPr>
+      <p:sp>
+        <p:nvSpPr>
+          <p:cNvPr id="2" name="Title 1">
+            <a:extLst>
+              <a:ext uri="{FF2B5EF4-FFF2-40B4-BE49-F238E27FC236}">
+                <a16:creationId xmlns:a16="http://schemas.microsoft.com/office/drawing/2014/main" id="{BFA5F37C-8023-A0A7-5A40-B39BC8C1A655}"/>
+              </a:ext>
+            </a:extLst>
+          </p:cNvPr>
+          <p:cNvSpPr>
+            <a:spLocks noGrp="1"/>
+          </p:cNvSpPr>
+          <p:nvPr>
+            <p:ph type="title"/>
+          </p:nvPr>
+        </p:nvSpPr>
+        <p:spPr/>
+        <p:txBody>
+          <a:bodyPr/>
+          <a:lstStyle/>
+          <a:p>
+            <a:r>
+              <a:rPr lang="en-US" dirty="0"/>
+              <a:t>Relational UML</a:t>
+            </a:r>
+          </a:p>
+        </p:txBody>
+      </p:sp>
       <p:pic>
         <p:nvPicPr>
-          <p:cNvPr id="5" name="Picture 4">
-            <a:extLst>
-              <a:ext uri="{FF2B5EF4-FFF2-40B4-BE49-F238E27FC236}">
-                <a16:creationId xmlns:a16="http://schemas.microsoft.com/office/drawing/2014/main" id="{1F0C6374-1677-5AFC-4ECE-56342B4C24C6}"/>
+          <p:cNvPr id="4" name="Content Placeholder 3" descr="ExpenseTrackerUML.png">
+            <a:extLst>
+              <a:ext uri="{FF2B5EF4-FFF2-40B4-BE49-F238E27FC236}">
+                <a16:creationId xmlns:a16="http://schemas.microsoft.com/office/drawing/2014/main" id="{76A51C2D-95D8-186A-BD7A-B8F4716575E4}"/>
               </a:ext>
             </a:extLst>
           </p:cNvPr>
           <p:cNvPicPr>
-            <a:picLocks noChangeAspect="1"/>
+            <a:picLocks noGrp="1" noChangeAspect="1"/>
           </p:cNvPicPr>
-          <p:nvPr/>
+          <p:nvPr>
+            <p:ph idx="1"/>
+          </p:nvPr>
         </p:nvPicPr>
         <p:blipFill>
-          <a:blip r:embed="rId3"/>
+          <a:blip r:embed="rId2"/>
           <a:stretch>
             <a:fillRect/>
           </a:stretch>
         </p:blipFill>
         <p:spPr>
           <a:xfrm>
-            <a:off x="869599" y="2386584"/>
-            <a:ext cx="4671664" cy="3678936"/>
+            <a:off x="381000" y="2237117"/>
+            <a:ext cx="11430000" cy="2766836"/>
           </a:xfrm>
-          <a:prstGeom prst="rect">
-            <a:avLst/>
-          </a:prstGeom>
         </p:spPr>
       </p:pic>
+    </p:spTree>
+    <p:extLst>
+      <p:ext uri="{BB962C8B-B14F-4D97-AF65-F5344CB8AC3E}">
+        <p14:creationId xmlns:p14="http://schemas.microsoft.com/office/powerpoint/2010/main" val="2609712744"/>
+      </p:ext>
+    </p:extLst>
+  </p:cSld>
+  <p:clrMapOvr>
+    <a:masterClrMapping/>
+  </p:clrMapOvr>
+</p:sld>
+</file>
+
+<file path=ppt/slides/slide8.xml><?xml version="1.0" encoding="utf-8"?>
+<p:sld xmlns:a="http://schemas.openxmlformats.org/drawingml/2006/main" xmlns:r="http://schemas.openxmlformats.org/officeDocument/2006/relationships" xmlns:p="http://schemas.openxmlformats.org/presentationml/2006/main">
+  <p:cSld>
+    <p:spTree>
+      <p:nvGrpSpPr>
+        <p:cNvPr id="1" name=""/>
+        <p:cNvGrpSpPr/>
+        <p:nvPr/>
+      </p:nvGrpSpPr>
+      <p:grpSpPr>
+        <a:xfrm>
+          <a:off x="0" y="0"/>
+          <a:ext cx="0" cy="0"/>
+          <a:chOff x="0" y="0"/>
+          <a:chExt cx="0" cy="0"/>
+        </a:xfrm>
+      </p:grpSpPr>
+      <p:sp>
+        <p:nvSpPr>
+          <p:cNvPr id="2" name="Title 1">
+            <a:extLst>
+              <a:ext uri="{FF2B5EF4-FFF2-40B4-BE49-F238E27FC236}">
+                <a16:creationId xmlns:a16="http://schemas.microsoft.com/office/drawing/2014/main" id="{1351351A-F90A-20A8-1FE5-8D44D2E4939B}"/>
+              </a:ext>
+            </a:extLst>
+          </p:cNvPr>
+          <p:cNvSpPr>
+            <a:spLocks noGrp="1"/>
+          </p:cNvSpPr>
+          <p:nvPr>
+            <p:ph type="title"/>
+          </p:nvPr>
+        </p:nvSpPr>
+        <p:spPr/>
+        <p:txBody>
+          <a:bodyPr/>
+          <a:lstStyle/>
+          <a:p>
+            <a:r>
+              <a:rPr lang="en-US" dirty="0"/>
+              <a:t>Query Sequence Diagram</a:t>
+            </a:r>
+          </a:p>
+        </p:txBody>
+      </p:sp>
       <p:pic>
         <p:nvPicPr>
-          <p:cNvPr id="11" name="Picture 10">
-            <a:extLst>
-              <a:ext uri="{FF2B5EF4-FFF2-40B4-BE49-F238E27FC236}">
-                <a16:creationId xmlns:a16="http://schemas.microsoft.com/office/drawing/2014/main" id="{5879C014-2A57-2CCB-1774-10823FE6DF76}"/>
+          <p:cNvPr id="4" name="Content Placeholder 3" descr="ExpenseTrackerSequenceDiagram.png">
+            <a:extLst>
+              <a:ext uri="{FF2B5EF4-FFF2-40B4-BE49-F238E27FC236}">
+                <a16:creationId xmlns:a16="http://schemas.microsoft.com/office/drawing/2014/main" id="{4AF94D50-0429-79E9-FEAD-CB2639F413BF}"/>
               </a:ext>
             </a:extLst>
           </p:cNvPr>
           <p:cNvPicPr>
-            <a:picLocks noChangeAspect="1"/>
+            <a:picLocks noGrp="1" noChangeAspect="1"/>
           </p:cNvPicPr>
-          <p:nvPr/>
+          <p:nvPr>
+            <p:ph idx="1"/>
+          </p:nvPr>
         </p:nvPicPr>
         <p:blipFill>
-          <a:blip r:embed="rId4"/>
+          <a:blip r:embed="rId2"/>
           <a:stretch>
             <a:fillRect/>
           </a:stretch>
         </p:blipFill>
         <p:spPr>
           <a:xfrm>
-            <a:off x="869599" y="2386584"/>
-            <a:ext cx="4717838" cy="3678936"/>
+            <a:off x="1879774" y="1719495"/>
+            <a:ext cx="8442748" cy="4481219"/>
           </a:xfrm>
-          <a:prstGeom prst="rect">
-            <a:avLst/>
-          </a:prstGeom>
         </p:spPr>
       </p:pic>
+    </p:spTree>
+    <p:extLst>
+      <p:ext uri="{BB962C8B-B14F-4D97-AF65-F5344CB8AC3E}">
+        <p14:creationId xmlns:p14="http://schemas.microsoft.com/office/powerpoint/2010/main" val="3608975388"/>
+      </p:ext>
+    </p:extLst>
+  </p:cSld>
+  <p:clrMapOvr>
+    <a:masterClrMapping/>
+  </p:clrMapOvr>
+</p:sld>
+</file>
+
+<file path=ppt/slides/slide9.xml><?xml version="1.0" encoding="utf-8"?>
+<p:sld xmlns:a="http://schemas.openxmlformats.org/drawingml/2006/main" xmlns:r="http://schemas.openxmlformats.org/officeDocument/2006/relationships" xmlns:p="http://schemas.openxmlformats.org/presentationml/2006/main">
+  <p:cSld>
+    <p:spTree>
+      <p:nvGrpSpPr>
+        <p:cNvPr id="1" name=""/>
+        <p:cNvGrpSpPr/>
+        <p:nvPr/>
+      </p:nvGrpSpPr>
+      <p:grpSpPr>
+        <a:xfrm>
+          <a:off x="0" y="0"/>
+          <a:ext cx="0" cy="0"/>
+          <a:chOff x="0" y="0"/>
+          <a:chExt cx="0" cy="0"/>
+        </a:xfrm>
+      </p:grpSpPr>
+      <p:sp>
+        <p:nvSpPr>
+          <p:cNvPr id="2" name="Title 1">
+            <a:extLst>
+              <a:ext uri="{FF2B5EF4-FFF2-40B4-BE49-F238E27FC236}">
+                <a16:creationId xmlns:a16="http://schemas.microsoft.com/office/drawing/2014/main" id="{CA6246AF-D614-21A6-AA65-0E80E8416C00}"/>
+              </a:ext>
+            </a:extLst>
+          </p:cNvPr>
+          <p:cNvSpPr>
+            <a:spLocks noGrp="1"/>
+          </p:cNvSpPr>
+          <p:nvPr>
+            <p:ph type="title"/>
+          </p:nvPr>
+        </p:nvSpPr>
+        <p:spPr/>
+        <p:txBody>
+          <a:bodyPr/>
+          <a:lstStyle/>
+          <a:p>
+            <a:r>
+              <a:rPr lang="en-US" dirty="0"/>
+              <a:t>Expense Sequence Diagram</a:t>
+            </a:r>
+          </a:p>
+        </p:txBody>
+      </p:sp>
       <p:pic>
         <p:nvPicPr>
-          <p:cNvPr id="15" name="Picture 14">
-            <a:extLst>
-              <a:ext uri="{FF2B5EF4-FFF2-40B4-BE49-F238E27FC236}">
-                <a16:creationId xmlns:a16="http://schemas.microsoft.com/office/drawing/2014/main" id="{B5BDF61E-1C12-6D89-CA82-7581189F21EC}"/>
+          <p:cNvPr id="4" name="Content Placeholder 3" descr="ExpenseTrackerSequenceDiagram.png">
+            <a:extLst>
+              <a:ext uri="{FF2B5EF4-FFF2-40B4-BE49-F238E27FC236}">
+                <a16:creationId xmlns:a16="http://schemas.microsoft.com/office/drawing/2014/main" id="{F8168010-0ED0-2B38-2EB0-64CF898E93EC}"/>
               </a:ext>
             </a:extLst>
           </p:cNvPr>
           <p:cNvPicPr>
-            <a:picLocks noChangeAspect="1"/>
+            <a:picLocks noGrp="1" noChangeAspect="1"/>
           </p:cNvPicPr>
-          <p:nvPr/>
+          <p:nvPr>
+            <p:ph idx="1"/>
+          </p:nvPr>
         </p:nvPicPr>
         <p:blipFill>
-          <a:blip r:embed="rId5"/>
+          <a:blip r:embed="rId2"/>
           <a:stretch>
             <a:fillRect/>
           </a:stretch>
         </p:blipFill>
         <p:spPr>
           <a:xfrm>
-            <a:off x="6650739" y="2442236"/>
-            <a:ext cx="4570107" cy="3567632"/>
+            <a:off x="1920963" y="1719495"/>
+            <a:ext cx="8370667" cy="4440030"/>
           </a:xfrm>
-          <a:prstGeom prst="rect">
-            <a:avLst/>
-          </a:prstGeom>
         </p:spPr>
       </p:pic>
     </p:spTree>
     <p:extLst>
       <p:ext uri="{BB962C8B-B14F-4D97-AF65-F5344CB8AC3E}">
-        <p14:creationId xmlns:p14="http://schemas.microsoft.com/office/powerpoint/2010/main" val="1815362434"/>
+        <p14:creationId xmlns:p14="http://schemas.microsoft.com/office/powerpoint/2010/main" val="3397234664"/>
       </p:ext>
     </p:extLst>
   </p:cSld>

</xml_diff>